<commit_message>
Added activity 4.02 to alice_wonderland.ipynb.
</commit_message>
<xml_diff>
--- a/presentations/02_word_vectors.pptx
+++ b/presentations/02_word_vectors.pptx
@@ -9,26 +9,26 @@
   </p:notesMasterIdLst>
   <p:sldIdLst>
     <p:sldId id="326" r:id="rId2"/>
-    <p:sldId id="352" r:id="rId3"/>
-    <p:sldId id="328" r:id="rId4"/>
-    <p:sldId id="330" r:id="rId5"/>
-    <p:sldId id="331" r:id="rId6"/>
-    <p:sldId id="332" r:id="rId7"/>
-    <p:sldId id="353" r:id="rId8"/>
-    <p:sldId id="354" r:id="rId9"/>
-    <p:sldId id="333" r:id="rId10"/>
-    <p:sldId id="334" r:id="rId11"/>
-    <p:sldId id="302" r:id="rId12"/>
-    <p:sldId id="305" r:id="rId13"/>
-    <p:sldId id="303" r:id="rId14"/>
-    <p:sldId id="304" r:id="rId15"/>
-    <p:sldId id="309" r:id="rId16"/>
-    <p:sldId id="310" r:id="rId17"/>
+    <p:sldId id="328" r:id="rId3"/>
+    <p:sldId id="330" r:id="rId4"/>
+    <p:sldId id="331" r:id="rId5"/>
+    <p:sldId id="332" r:id="rId6"/>
+    <p:sldId id="353" r:id="rId7"/>
+    <p:sldId id="354" r:id="rId8"/>
+    <p:sldId id="333" r:id="rId9"/>
+    <p:sldId id="334" r:id="rId10"/>
+    <p:sldId id="302" r:id="rId11"/>
+    <p:sldId id="305" r:id="rId12"/>
+    <p:sldId id="303" r:id="rId13"/>
+    <p:sldId id="304" r:id="rId14"/>
+    <p:sldId id="309" r:id="rId15"/>
+    <p:sldId id="310" r:id="rId16"/>
+    <p:sldId id="300" r:id="rId17"/>
     <p:sldId id="308" r:id="rId18"/>
     <p:sldId id="323" r:id="rId19"/>
     <p:sldId id="327" r:id="rId20"/>
     <p:sldId id="329" r:id="rId21"/>
-    <p:sldId id="300" r:id="rId22"/>
+    <p:sldId id="352" r:id="rId22"/>
     <p:sldId id="307" r:id="rId23"/>
   </p:sldIdLst>
   <p:sldSz cx="12192000" cy="6858000"/>
@@ -229,7 +229,7 @@
           <a:p>
             <a:fld id="{FD93C9B2-20F6-4DB1-B471-224337D0AC79}" type="datetimeFigureOut">
               <a:rPr lang="en-US" smtClean="0"/>
-              <a:t>8/29/2022</a:t>
+              <a:t>10/20/2022</a:t>
             </a:fld>
             <a:endParaRPr lang="en-US"/>
           </a:p>
@@ -549,13 +549,33 @@
                 <a:effectLst/>
                 <a:latin typeface="+mn-lt"/>
               </a:rPr>
-              <a:t>Last week, we talked about text representation, and our textbook presented three </a:t>
+              <a:t>Last week, we talked about text representation, and </a:t>
+            </a:r>
+            <a:r>
+              <a:rPr lang="en-US" sz="1200" b="0" i="1" dirty="0">
+                <a:solidFill>
+                  <a:srgbClr val="292929"/>
+                </a:solidFill>
+                <a:effectLst/>
+                <a:latin typeface="+mn-lt"/>
+              </a:rPr>
+              <a:t>The Deep Learning Workshop </a:t>
+            </a:r>
+            <a:r>
+              <a:rPr lang="en-US" sz="1200" b="0" i="0" dirty="0">
+                <a:solidFill>
+                  <a:srgbClr val="292929"/>
+                </a:solidFill>
+                <a:effectLst/>
+                <a:latin typeface="+mn-lt"/>
+              </a:rPr>
+              <a:t>textbook presents three </a:t>
             </a:r>
             <a:r>
               <a:rPr lang="en-US" sz="1200" b="0" i="0" u="none" strike="noStrike" baseline="0" dirty="0">
                 <a:latin typeface="+mn-lt"/>
               </a:rPr>
-              <a:t>“classical” approaches to accomplishing this task: </a:t>
+              <a:t>“classical” approaches to do this: </a:t>
             </a:r>
           </a:p>
           <a:p>
@@ -827,7 +847,7 @@
           <a:p>
             <a:fld id="{3148858F-F1DB-4027-9C85-CCA6849540DD}" type="slidenum">
               <a:rPr lang="en-US" smtClean="0"/>
-              <a:t>11</a:t>
+              <a:t>10</a:t>
             </a:fld>
             <a:endParaRPr lang="en-US"/>
           </a:p>
@@ -964,7 +984,7 @@
           <a:p>
             <a:fld id="{3148858F-F1DB-4027-9C85-CCA6849540DD}" type="slidenum">
               <a:rPr lang="en-US" smtClean="0"/>
-              <a:t>12</a:t>
+              <a:t>11</a:t>
             </a:fld>
             <a:endParaRPr lang="en-US"/>
           </a:p>
@@ -1036,7 +1056,7 @@
                 <a:effectLst/>
                 <a:latin typeface="+mn-lt"/>
               </a:rPr>
-              <a:t>The CBOW architecture takes the context of each word as the input and tries to predict the word for that context. Consider our example: </a:t>
+              <a:t>The CBOW architecture takes the context of each word as the input and tries to predict a missing word, given that context. Consider our example: </a:t>
             </a:r>
             <a:r>
               <a:rPr lang="en-US" b="0" i="1" dirty="0">
@@ -1056,7 +1076,7 @@
                 <a:effectLst/>
                 <a:latin typeface="+mn-lt"/>
               </a:rPr>
-              <a:t>Let the input to the Neural Network be the three words – </a:t>
+              <a:t>The first three words of that sentence are shown on the left, next to the first three nodes of the input layer.  The network’s goal is to predict the target word (</a:t>
             </a:r>
             <a:r>
               <a:rPr lang="en-US" b="0" i="1" dirty="0">
@@ -1066,7 +1086,7 @@
                 <a:effectLst/>
                 <a:latin typeface="+mn-lt"/>
               </a:rPr>
-              <a:t>have, a, good. </a:t>
+              <a:t>day</a:t>
             </a:r>
             <a:r>
               <a:rPr lang="en-US" b="0" i="0" dirty="0">
@@ -1076,7 +1096,7 @@
                 <a:effectLst/>
                 <a:latin typeface="+mn-lt"/>
               </a:rPr>
-              <a:t>In this example, we want to predict a target word (</a:t>
+              <a:t>), using these context words.  To do that,</a:t>
             </a:r>
             <a:r>
               <a:rPr lang="en-US" b="0" i="1" dirty="0">
@@ -1086,7 +1106,7 @@
                 <a:effectLst/>
                 <a:latin typeface="+mn-lt"/>
               </a:rPr>
-              <a:t>d</a:t>
+              <a:t> </a:t>
             </a:r>
             <a:r>
               <a:rPr lang="en-US" b="0" i="0" dirty="0">
@@ -1096,7 +1116,7 @@
                 <a:effectLst/>
                 <a:latin typeface="+mn-lt"/>
               </a:rPr>
-              <a:t>ay</a:t>
+              <a:t>we one-hot encode the input words and measure the output error compared to the one-hot encoding of the target word - the word </a:t>
             </a:r>
             <a:r>
               <a:rPr lang="en-US" b="0" i="1" dirty="0">
@@ -1106,7 +1126,7 @@
                 <a:effectLst/>
                 <a:latin typeface="+mn-lt"/>
               </a:rPr>
-              <a:t>) </a:t>
+              <a:t>d</a:t>
             </a:r>
             <a:r>
               <a:rPr lang="en-US" b="0" i="0" dirty="0">
@@ -1116,47 +1136,7 @@
                 <a:effectLst/>
                 <a:latin typeface="+mn-lt"/>
               </a:rPr>
-              <a:t>using these context words.  More specifically, we use one hot encoding of the input words and measure the output error compared to one hot encoding of the target word, </a:t>
-            </a:r>
-            <a:r>
-              <a:rPr lang="en-US" b="0" i="1" dirty="0">
-                <a:solidFill>
-                  <a:srgbClr val="292929"/>
-                </a:solidFill>
-                <a:effectLst/>
-                <a:latin typeface="+mn-lt"/>
-              </a:rPr>
-              <a:t>d</a:t>
-            </a:r>
-            <a:r>
-              <a:rPr lang="en-US" b="0" i="0" dirty="0">
-                <a:solidFill>
-                  <a:srgbClr val="292929"/>
-                </a:solidFill>
-                <a:effectLst/>
-                <a:latin typeface="+mn-lt"/>
-              </a:rPr>
-              <a:t>ay in this case.</a:t>
-            </a:r>
-            <a:r>
-              <a:rPr lang="en-US" b="0" i="1" dirty="0">
-                <a:solidFill>
-                  <a:srgbClr val="292929"/>
-                </a:solidFill>
-                <a:effectLst/>
-                <a:latin typeface="+mn-lt"/>
-              </a:rPr>
-              <a:t> </a:t>
-            </a:r>
-            <a:r>
-              <a:rPr lang="en-US" b="0" i="0" dirty="0">
-                <a:solidFill>
-                  <a:srgbClr val="292929"/>
-                </a:solidFill>
-                <a:effectLst/>
-                <a:latin typeface="+mn-lt"/>
-              </a:rPr>
-              <a:t>In the process of predicting the target word, we learn its vector representation.</a:t>
+              <a:t>ay in this example.  And in the process of predicting the target word, we learn its vector representation.</a:t>
             </a:r>
           </a:p>
           <a:p>
@@ -1179,7 +1159,7 @@
                 <a:effectLst/>
                 <a:latin typeface="+mn-lt"/>
               </a:rPr>
-              <a:t>Let’s look deeper into the actual architecture.</a:t>
+              <a:t>Let’s take a closer look at the architecture.</a:t>
             </a:r>
           </a:p>
           <a:p>
@@ -1358,7 +1338,7 @@
           <a:p>
             <a:fld id="{3148858F-F1DB-4027-9C85-CCA6849540DD}" type="slidenum">
               <a:rPr lang="en-US" smtClean="0"/>
-              <a:t>13</a:t>
+              <a:t>12</a:t>
             </a:fld>
             <a:endParaRPr lang="en-US"/>
           </a:p>
@@ -1462,7 +1442,7 @@
           <a:p>
             <a:fld id="{3148858F-F1DB-4027-9C85-CCA6849540DD}" type="slidenum">
               <a:rPr lang="en-US" smtClean="0"/>
-              <a:t>14</a:t>
+              <a:t>13</a:t>
             </a:fld>
             <a:endParaRPr lang="en-US"/>
           </a:p>
@@ -1579,7 +1559,7 @@
           <a:p>
             <a:fld id="{3148858F-F1DB-4027-9C85-CCA6849540DD}" type="slidenum">
               <a:rPr lang="en-US" smtClean="0"/>
-              <a:t>15</a:t>
+              <a:t>14</a:t>
             </a:fld>
             <a:endParaRPr lang="en-US"/>
           </a:p>
@@ -1651,7 +1631,7 @@
                 <a:effectLst/>
                 <a:latin typeface="+mn-lt"/>
               </a:rPr>
-              <a:t>With the Skip-Gram architecture, a single target word is used to predict all its context words. Skip Gram works well with small amounts of data and is found to represent rare words well.</a:t>
+              <a:t>With the Skip-Gram architecture, a single target word is used to predict all its context words. Skip Gram works well with small amounts of data as well as rare words.</a:t>
             </a:r>
           </a:p>
         </p:txBody>
@@ -1673,7 +1653,7 @@
           <a:p>
             <a:fld id="{3148858F-F1DB-4027-9C85-CCA6849540DD}" type="slidenum">
               <a:rPr lang="en-US" smtClean="0"/>
-              <a:t>16</a:t>
+              <a:t>15</a:t>
             </a:fld>
             <a:endParaRPr lang="en-US"/>
           </a:p>
@@ -1736,132 +1716,6 @@
           <a:bodyPr/>
           <a:lstStyle/>
           <a:p>
-            <a:pPr marL="0" marR="0">
-              <a:spcBef>
-                <a:spcPts val="0"/>
-              </a:spcBef>
-              <a:spcAft>
-                <a:spcPts val="0"/>
-              </a:spcAft>
-            </a:pPr>
-            <a:r>
-              <a:rPr lang="en-US" sz="1200" dirty="0">
-                <a:effectLst/>
-                <a:latin typeface="+mn-lt"/>
-                <a:ea typeface="Calibri" panose="020F0502020204030204" pitchFamily="34" charset="0"/>
-              </a:rPr>
-              <a:t>Let’s wrap up with a quick (high-level) review.  Word embedding is a process whereby words that appear close together in a text are moved closer together in a vector space.  The process is iterative, moving synonyms close together because synonyms have the same words around them.  </a:t>
-            </a:r>
-          </a:p>
-          <a:p>
-            <a:pPr marL="0" marR="0">
-              <a:spcBef>
-                <a:spcPts val="0"/>
-              </a:spcBef>
-              <a:spcAft>
-                <a:spcPts val="0"/>
-              </a:spcAft>
-            </a:pPr>
-            <a:endParaRPr lang="en-US" sz="1200" dirty="0">
-              <a:effectLst/>
-              <a:latin typeface="+mn-lt"/>
-              <a:ea typeface="Calibri" panose="020F0502020204030204" pitchFamily="34" charset="0"/>
-            </a:endParaRPr>
-          </a:p>
-          <a:p>
-            <a:pPr marL="0" marR="0">
-              <a:spcBef>
-                <a:spcPts val="0"/>
-              </a:spcBef>
-              <a:spcAft>
-                <a:spcPts val="0"/>
-              </a:spcAft>
-            </a:pPr>
-            <a:r>
-              <a:rPr lang="en-US" sz="1200" dirty="0">
-                <a:effectLst/>
-                <a:latin typeface="+mn-lt"/>
-                <a:ea typeface="Calibri" panose="020F0502020204030204" pitchFamily="34" charset="0"/>
-              </a:rPr>
-              <a:t>Consider, for example, these sentences – “Grapefruit is my favorite citrus.  Grapefruits grow on a tree.  The orange is also a citrus.”  Now you can see how processing thousands of sentences like these would create a connection between citrus, orange, and grapefruit.  Just as juice, fruit, and tree are similar. All based on word proximity.</a:t>
-            </a:r>
-          </a:p>
-          <a:p>
-            <a:pPr marL="0" marR="0">
-              <a:spcBef>
-                <a:spcPts val="0"/>
-              </a:spcBef>
-              <a:spcAft>
-                <a:spcPts val="0"/>
-              </a:spcAft>
-            </a:pPr>
-            <a:r>
-              <a:rPr lang="en-US" sz="1200" dirty="0">
-                <a:effectLst/>
-                <a:latin typeface="+mn-lt"/>
-                <a:ea typeface="Calibri" panose="020F0502020204030204" pitchFamily="34" charset="0"/>
-              </a:rPr>
-              <a:t>  </a:t>
-            </a:r>
-          </a:p>
-          <a:p>
-            <a:pPr marL="0" marR="0">
-              <a:spcBef>
-                <a:spcPts val="0"/>
-              </a:spcBef>
-              <a:spcAft>
-                <a:spcPts val="0"/>
-              </a:spcAft>
-            </a:pPr>
-            <a:r>
-              <a:rPr lang="en-US" sz="1200" dirty="0">
-                <a:effectLst/>
-                <a:latin typeface="+mn-lt"/>
-                <a:ea typeface="Calibri" panose="020F0502020204030204" pitchFamily="34" charset="0"/>
-              </a:rPr>
-              <a:t>The main problem with this approach is it only creates 1 embedding per word… hence, more recent transformer models such as BERT and GPT support contextualized embeddings; that is, multiple embeddings per word, to represent different meanings of a word.  Our transformer workshop covers this new architecture in-depth.</a:t>
-            </a:r>
-          </a:p>
-          <a:p>
-            <a:pPr marL="0" marR="0">
-              <a:spcBef>
-                <a:spcPts val="0"/>
-              </a:spcBef>
-              <a:spcAft>
-                <a:spcPts val="0"/>
-              </a:spcAft>
-            </a:pPr>
-            <a:r>
-              <a:rPr lang="en-US" sz="1200" dirty="0">
-                <a:effectLst/>
-                <a:latin typeface="+mn-lt"/>
-                <a:ea typeface="Calibri" panose="020F0502020204030204" pitchFamily="34" charset="0"/>
-              </a:rPr>
-              <a:t> </a:t>
-            </a:r>
-          </a:p>
-          <a:p>
-            <a:pPr marL="0" marR="0">
-              <a:spcBef>
-                <a:spcPts val="0"/>
-              </a:spcBef>
-              <a:spcAft>
-                <a:spcPts val="0"/>
-              </a:spcAft>
-            </a:pPr>
-            <a:r>
-              <a:rPr lang="en-US" sz="1200" dirty="0">
-                <a:effectLst/>
-                <a:latin typeface="+mn-lt"/>
-                <a:ea typeface="Calibri" panose="020F0502020204030204" pitchFamily="34" charset="0"/>
-              </a:rPr>
-              <a:t>(E. Stubbs Email: 05.21.21)</a:t>
-            </a:r>
-            <a:endParaRPr lang="en-US" sz="1200" dirty="0">
-              <a:latin typeface="+mn-lt"/>
-            </a:endParaRPr>
-          </a:p>
-          <a:p>
             <a:pPr marL="0" marR="0" lvl="0" indent="0" algn="l" defTabSz="914400" rtl="0" eaLnBrk="1" fontAlgn="auto" latinLnBrk="0" hangingPunct="1">
               <a:lnSpc>
                 <a:spcPct val="100000"/>
@@ -1879,16 +1733,235 @@
               <a:tabLst/>
               <a:defRPr/>
             </a:pPr>
-            <a:endParaRPr lang="en-US" dirty="0"/>
-          </a:p>
-          <a:p>
-            <a:pPr algn="l"/>
+            <a:r>
+              <a:rPr lang="en-US" sz="1200" dirty="0">
+                <a:effectLst/>
+                <a:latin typeface="+mn-lt"/>
+                <a:ea typeface="Calibri" panose="020F0502020204030204" pitchFamily="34" charset="0"/>
+              </a:rPr>
+              <a:t>We have one final concept to introduce.  Again, the basic idea behind word embeddings is that we want words which appear in similar contexts to be spatially close to each other.  M</a:t>
+            </a:r>
+            <a:r>
+              <a:rPr lang="en-US" b="0" i="0" dirty="0">
+                <a:solidFill>
+                  <a:srgbClr val="292929"/>
+                </a:solidFill>
+                <a:effectLst/>
+                <a:latin typeface="+mn-lt"/>
+              </a:rPr>
+              <a:t>athematically, what we want is for the cosine of the angle between such vectors to be close to 1.  That is, the angle close to 0.  In this image:</a:t>
+            </a:r>
+          </a:p>
+          <a:p>
+            <a:pPr marL="228600" marR="0" lvl="0" indent="-228600" algn="l" defTabSz="914400" rtl="0" eaLnBrk="1" fontAlgn="auto" latinLnBrk="0" hangingPunct="1">
+              <a:lnSpc>
+                <a:spcPct val="100000"/>
+              </a:lnSpc>
+              <a:spcBef>
+                <a:spcPts val="0"/>
+              </a:spcBef>
+              <a:spcAft>
+                <a:spcPts val="0"/>
+              </a:spcAft>
+              <a:buClrTx/>
+              <a:buSzTx/>
+              <a:buFontTx/>
+              <a:buAutoNum type="arabicPeriod"/>
+              <a:tabLst/>
+              <a:defRPr/>
+            </a:pPr>
+            <a:r>
+              <a:rPr lang="en-US" b="0" i="0" dirty="0">
+                <a:solidFill>
+                  <a:srgbClr val="292929"/>
+                </a:solidFill>
+                <a:effectLst/>
+                <a:latin typeface="+mn-lt"/>
+              </a:rPr>
+              <a:t>Po the Panda is the word vector for ‘good’ </a:t>
+            </a:r>
+          </a:p>
+          <a:p>
+            <a:pPr marL="228600" marR="0" lvl="0" indent="-228600" algn="l" defTabSz="914400" rtl="0" eaLnBrk="1" fontAlgn="auto" latinLnBrk="0" hangingPunct="1">
+              <a:lnSpc>
+                <a:spcPct val="100000"/>
+              </a:lnSpc>
+              <a:spcBef>
+                <a:spcPts val="0"/>
+              </a:spcBef>
+              <a:spcAft>
+                <a:spcPts val="0"/>
+              </a:spcAft>
+              <a:buClrTx/>
+              <a:buSzTx/>
+              <a:buFontTx/>
+              <a:buAutoNum type="arabicPeriod"/>
+              <a:tabLst/>
+              <a:defRPr/>
+            </a:pPr>
+            <a:r>
+              <a:rPr lang="en-US" b="0" i="0" dirty="0">
+                <a:solidFill>
+                  <a:srgbClr val="292929"/>
+                </a:solidFill>
+                <a:effectLst/>
+                <a:latin typeface="+mn-lt"/>
+              </a:rPr>
+              <a:t>While Master Tigress is the word vector for ‘great’.</a:t>
+            </a:r>
+          </a:p>
+          <a:p>
+            <a:pPr marL="0" marR="0" lvl="0" indent="0" algn="l" defTabSz="914400" rtl="0" eaLnBrk="1" fontAlgn="auto" latinLnBrk="0" hangingPunct="1">
+              <a:lnSpc>
+                <a:spcPct val="100000"/>
+              </a:lnSpc>
+              <a:spcBef>
+                <a:spcPts val="0"/>
+              </a:spcBef>
+              <a:spcAft>
+                <a:spcPts val="0"/>
+              </a:spcAft>
+              <a:buClrTx/>
+              <a:buSzTx/>
+              <a:buFontTx/>
+              <a:buNone/>
+              <a:tabLst/>
+              <a:defRPr/>
+            </a:pPr>
             <a:endParaRPr lang="en-US" b="0" i="0" dirty="0">
               <a:solidFill>
-                <a:srgbClr val="3C3C3B"/>
+                <a:srgbClr val="292929"/>
               </a:solidFill>
               <a:effectLst/>
-              <a:latin typeface="Lato"/>
+              <a:latin typeface="+mn-lt"/>
+            </a:endParaRPr>
+          </a:p>
+          <a:p>
+            <a:pPr marL="0" marR="0" lvl="0" indent="0" algn="l" defTabSz="914400" rtl="0" eaLnBrk="1" fontAlgn="auto" latinLnBrk="0" hangingPunct="1">
+              <a:lnSpc>
+                <a:spcPct val="100000"/>
+              </a:lnSpc>
+              <a:spcBef>
+                <a:spcPts val="0"/>
+              </a:spcBef>
+              <a:spcAft>
+                <a:spcPts val="0"/>
+              </a:spcAft>
+              <a:buClrTx/>
+              <a:buSzTx/>
+              <a:buFontTx/>
+              <a:buNone/>
+              <a:tabLst/>
+              <a:defRPr/>
+            </a:pPr>
+            <a:r>
+              <a:rPr lang="en-US" b="0" i="0" dirty="0">
+                <a:solidFill>
+                  <a:srgbClr val="292929"/>
+                </a:solidFill>
+                <a:effectLst/>
+                <a:latin typeface="+mn-lt"/>
+              </a:rPr>
+              <a:t>In one hot encoding representations, all the words are independent of each other.  But with word embeddings, that is not the case.  Here we introduce some </a:t>
+            </a:r>
+            <a:r>
+              <a:rPr lang="en-US" b="0" i="1" dirty="0">
+                <a:solidFill>
+                  <a:srgbClr val="292929"/>
+                </a:solidFill>
+                <a:effectLst/>
+                <a:latin typeface="+mn-lt"/>
+              </a:rPr>
+              <a:t>dependence</a:t>
+            </a:r>
+            <a:r>
+              <a:rPr lang="en-US" b="0" i="0" dirty="0">
+                <a:solidFill>
+                  <a:srgbClr val="292929"/>
+                </a:solidFill>
+                <a:effectLst/>
+                <a:latin typeface="+mn-lt"/>
+              </a:rPr>
+              <a:t> of one word on the other words. The goal is to generate an </a:t>
+            </a:r>
+            <a:r>
+              <a:rPr lang="en-US" b="1" i="0" dirty="0">
+                <a:solidFill>
+                  <a:srgbClr val="292929"/>
+                </a:solidFill>
+                <a:effectLst/>
+                <a:latin typeface="+mn-lt"/>
+              </a:rPr>
+              <a:t>embedding </a:t>
+            </a:r>
+            <a:r>
+              <a:rPr lang="en-US" b="0" i="0" dirty="0">
+                <a:solidFill>
+                  <a:srgbClr val="292929"/>
+                </a:solidFill>
+                <a:effectLst/>
+                <a:latin typeface="+mn-lt"/>
+              </a:rPr>
+              <a:t>for each word in a vocabulary, a unique location in a high-dimensional space that captures its relationship to other words in that vocabulary.</a:t>
+            </a:r>
+            <a:endParaRPr lang="en-US" b="1" i="0" dirty="0">
+              <a:solidFill>
+                <a:srgbClr val="292929"/>
+              </a:solidFill>
+              <a:effectLst/>
+              <a:latin typeface="+mn-lt"/>
+            </a:endParaRPr>
+          </a:p>
+          <a:p>
+            <a:pPr marL="0" marR="0" lvl="0" indent="0" algn="l" defTabSz="914400" rtl="0" eaLnBrk="1" fontAlgn="auto" latinLnBrk="0" hangingPunct="1">
+              <a:lnSpc>
+                <a:spcPct val="100000"/>
+              </a:lnSpc>
+              <a:spcBef>
+                <a:spcPts val="0"/>
+              </a:spcBef>
+              <a:spcAft>
+                <a:spcPts val="0"/>
+              </a:spcAft>
+              <a:buClrTx/>
+              <a:buSzTx/>
+              <a:buFontTx/>
+              <a:buNone/>
+              <a:tabLst/>
+              <a:defRPr/>
+            </a:pPr>
+            <a:endParaRPr lang="en-US" b="0" i="0" dirty="0">
+              <a:solidFill>
+                <a:srgbClr val="292929"/>
+              </a:solidFill>
+              <a:effectLst/>
+              <a:latin typeface="charter"/>
+            </a:endParaRPr>
+          </a:p>
+          <a:p>
+            <a:pPr marL="0" marR="0" lvl="0" indent="0" algn="l" defTabSz="914400" rtl="0" eaLnBrk="1" fontAlgn="auto" latinLnBrk="0" hangingPunct="1">
+              <a:lnSpc>
+                <a:spcPct val="100000"/>
+              </a:lnSpc>
+              <a:spcBef>
+                <a:spcPts val="0"/>
+              </a:spcBef>
+              <a:spcAft>
+                <a:spcPts val="0"/>
+              </a:spcAft>
+              <a:buClrTx/>
+              <a:buSzTx/>
+              <a:buFontTx/>
+              <a:buNone/>
+              <a:tabLst/>
+              <a:defRPr/>
+            </a:pPr>
+            <a:endParaRPr lang="en-US" b="0" i="0" dirty="0">
+              <a:solidFill>
+                <a:srgbClr val="292929"/>
+              </a:solidFill>
+              <a:effectLst/>
+              <a:latin typeface="charter"/>
             </a:endParaRPr>
           </a:p>
           <a:p>
@@ -1914,7 +1987,7 @@
           <a:p>
             <a:fld id="{3148858F-F1DB-4027-9C85-CCA6849540DD}" type="slidenum">
               <a:rPr lang="en-US" smtClean="0"/>
-              <a:t>17</a:t>
+              <a:t>16</a:t>
             </a:fld>
             <a:endParaRPr lang="en-US"/>
           </a:p>
@@ -1923,7 +1996,7 @@
     </p:spTree>
     <p:extLst>
       <p:ext uri="{BB962C8B-B14F-4D97-AF65-F5344CB8AC3E}">
-        <p14:creationId xmlns:p14="http://schemas.microsoft.com/office/powerpoint/2010/main" val="3603398227"/>
+        <p14:creationId xmlns:p14="http://schemas.microsoft.com/office/powerpoint/2010/main" val="1453454417"/>
       </p:ext>
     </p:extLst>
   </p:cSld>
@@ -1977,6 +2050,247 @@
           <a:bodyPr/>
           <a:lstStyle/>
           <a:p>
+            <a:pPr marL="0" marR="0">
+              <a:spcBef>
+                <a:spcPts val="0"/>
+              </a:spcBef>
+              <a:spcAft>
+                <a:spcPts val="0"/>
+              </a:spcAft>
+            </a:pPr>
+            <a:r>
+              <a:rPr lang="en-US" sz="1200" dirty="0">
+                <a:effectLst/>
+                <a:latin typeface="+mn-lt"/>
+                <a:ea typeface="Calibri" panose="020F0502020204030204" pitchFamily="34" charset="0"/>
+              </a:rPr>
+              <a:t>Let’s wrap up with a quick review.  Word embedding is a process whereby words that appear close together in a text are moved closer together in a vector space.  The process is iterative, moving synonyms close together because synonyms have the same words around them.  </a:t>
+            </a:r>
+          </a:p>
+          <a:p>
+            <a:pPr marL="0" marR="0">
+              <a:spcBef>
+                <a:spcPts val="0"/>
+              </a:spcBef>
+              <a:spcAft>
+                <a:spcPts val="0"/>
+              </a:spcAft>
+            </a:pPr>
+            <a:endParaRPr lang="en-US" sz="1200" dirty="0">
+              <a:effectLst/>
+              <a:latin typeface="+mn-lt"/>
+              <a:ea typeface="Calibri" panose="020F0502020204030204" pitchFamily="34" charset="0"/>
+            </a:endParaRPr>
+          </a:p>
+          <a:p>
+            <a:pPr marL="0" marR="0">
+              <a:spcBef>
+                <a:spcPts val="0"/>
+              </a:spcBef>
+              <a:spcAft>
+                <a:spcPts val="0"/>
+              </a:spcAft>
+            </a:pPr>
+            <a:r>
+              <a:rPr lang="en-US" sz="1200" dirty="0">
+                <a:effectLst/>
+                <a:latin typeface="+mn-lt"/>
+                <a:ea typeface="Calibri" panose="020F0502020204030204" pitchFamily="34" charset="0"/>
+              </a:rPr>
+              <a:t>Consider, for example, these sentences – “Grapefruit is my favorite citrus.  Grapefruits grow on a tree.  The orange is also a citrus.”  Now you can see how processing thousands of sentences like these would create a connection between citrus, orange, and grapefruit.  Just as juice, fruit, and tree are similar. All based on word proximity.</a:t>
+            </a:r>
+          </a:p>
+          <a:p>
+            <a:pPr marL="0" marR="0">
+              <a:spcBef>
+                <a:spcPts val="0"/>
+              </a:spcBef>
+              <a:spcAft>
+                <a:spcPts val="0"/>
+              </a:spcAft>
+            </a:pPr>
+            <a:r>
+              <a:rPr lang="en-US" sz="1200" dirty="0">
+                <a:effectLst/>
+                <a:latin typeface="+mn-lt"/>
+                <a:ea typeface="Calibri" panose="020F0502020204030204" pitchFamily="34" charset="0"/>
+              </a:rPr>
+              <a:t>  </a:t>
+            </a:r>
+          </a:p>
+          <a:p>
+            <a:pPr marL="0" marR="0">
+              <a:spcBef>
+                <a:spcPts val="0"/>
+              </a:spcBef>
+              <a:spcAft>
+                <a:spcPts val="0"/>
+              </a:spcAft>
+            </a:pPr>
+            <a:r>
+              <a:rPr lang="en-US" sz="1200" dirty="0">
+                <a:effectLst/>
+                <a:latin typeface="+mn-lt"/>
+                <a:ea typeface="Calibri" panose="020F0502020204030204" pitchFamily="34" charset="0"/>
+              </a:rPr>
+              <a:t>The main problem with this approach is it only creates 1 embedding per word… hence, more recent transformer models such as BERT and GPT support contextualized embeddings; that is, multiple embeddings per word, to represent different meanings of a word.  Our transformer workshop covers this new architecture in-depth.</a:t>
+            </a:r>
+          </a:p>
+          <a:p>
+            <a:pPr marL="0" marR="0">
+              <a:spcBef>
+                <a:spcPts val="0"/>
+              </a:spcBef>
+              <a:spcAft>
+                <a:spcPts val="0"/>
+              </a:spcAft>
+            </a:pPr>
+            <a:r>
+              <a:rPr lang="en-US" sz="1200" dirty="0">
+                <a:effectLst/>
+                <a:latin typeface="+mn-lt"/>
+                <a:ea typeface="Calibri" panose="020F0502020204030204" pitchFamily="34" charset="0"/>
+              </a:rPr>
+              <a:t> </a:t>
+            </a:r>
+          </a:p>
+          <a:p>
+            <a:pPr marL="0" marR="0">
+              <a:spcBef>
+                <a:spcPts val="0"/>
+              </a:spcBef>
+              <a:spcAft>
+                <a:spcPts val="0"/>
+              </a:spcAft>
+            </a:pPr>
+            <a:r>
+              <a:rPr lang="en-US" sz="1200" dirty="0">
+                <a:effectLst/>
+                <a:latin typeface="+mn-lt"/>
+                <a:ea typeface="Calibri" panose="020F0502020204030204" pitchFamily="34" charset="0"/>
+              </a:rPr>
+              <a:t>(E. Stubbs Email: 05.21.21)</a:t>
+            </a:r>
+            <a:endParaRPr lang="en-US" sz="1200" dirty="0">
+              <a:latin typeface="+mn-lt"/>
+            </a:endParaRPr>
+          </a:p>
+          <a:p>
+            <a:pPr marL="0" marR="0" lvl="0" indent="0" algn="l" defTabSz="914400" rtl="0" eaLnBrk="1" fontAlgn="auto" latinLnBrk="0" hangingPunct="1">
+              <a:lnSpc>
+                <a:spcPct val="100000"/>
+              </a:lnSpc>
+              <a:spcBef>
+                <a:spcPts val="0"/>
+              </a:spcBef>
+              <a:spcAft>
+                <a:spcPts val="0"/>
+              </a:spcAft>
+              <a:buClrTx/>
+              <a:buSzTx/>
+              <a:buFontTx/>
+              <a:buNone/>
+              <a:tabLst/>
+              <a:defRPr/>
+            </a:pPr>
+            <a:endParaRPr lang="en-US" dirty="0"/>
+          </a:p>
+          <a:p>
+            <a:pPr algn="l"/>
+            <a:endParaRPr lang="en-US" b="0" i="0" dirty="0">
+              <a:solidFill>
+                <a:srgbClr val="3C3C3B"/>
+              </a:solidFill>
+              <a:effectLst/>
+              <a:latin typeface="Lato"/>
+            </a:endParaRPr>
+          </a:p>
+          <a:p>
+            <a:pPr algn="l"/>
+            <a:endParaRPr lang="en-US" dirty="0"/>
+          </a:p>
+        </p:txBody>
+      </p:sp>
+      <p:sp>
+        <p:nvSpPr>
+          <p:cNvPr id="4" name="Slide Number Placeholder 3"/>
+          <p:cNvSpPr>
+            <a:spLocks noGrp="1"/>
+          </p:cNvSpPr>
+          <p:nvPr>
+            <p:ph type="sldNum" sz="quarter" idx="5"/>
+          </p:nvPr>
+        </p:nvSpPr>
+        <p:spPr/>
+        <p:txBody>
+          <a:bodyPr/>
+          <a:lstStyle/>
+          <a:p>
+            <a:fld id="{3148858F-F1DB-4027-9C85-CCA6849540DD}" type="slidenum">
+              <a:rPr lang="en-US" smtClean="0"/>
+              <a:t>17</a:t>
+            </a:fld>
+            <a:endParaRPr lang="en-US"/>
+          </a:p>
+        </p:txBody>
+      </p:sp>
+    </p:spTree>
+    <p:extLst>
+      <p:ext uri="{BB962C8B-B14F-4D97-AF65-F5344CB8AC3E}">
+        <p14:creationId xmlns:p14="http://schemas.microsoft.com/office/powerpoint/2010/main" val="3603398227"/>
+      </p:ext>
+    </p:extLst>
+  </p:cSld>
+  <p:clrMapOvr>
+    <a:masterClrMapping/>
+  </p:clrMapOvr>
+</p:notes>
+</file>
+
+<file path=ppt/notesSlides/notesSlide18.xml><?xml version="1.0" encoding="utf-8"?>
+<p:notes xmlns:a="http://schemas.openxmlformats.org/drawingml/2006/main" xmlns:r="http://schemas.openxmlformats.org/officeDocument/2006/relationships" xmlns:p="http://schemas.openxmlformats.org/presentationml/2006/main">
+  <p:cSld>
+    <p:spTree>
+      <p:nvGrpSpPr>
+        <p:cNvPr id="1" name=""/>
+        <p:cNvGrpSpPr/>
+        <p:nvPr/>
+      </p:nvGrpSpPr>
+      <p:grpSpPr>
+        <a:xfrm>
+          <a:off x="0" y="0"/>
+          <a:ext cx="0" cy="0"/>
+          <a:chOff x="0" y="0"/>
+          <a:chExt cx="0" cy="0"/>
+        </a:xfrm>
+      </p:grpSpPr>
+      <p:sp>
+        <p:nvSpPr>
+          <p:cNvPr id="2" name="Slide Image Placeholder 1"/>
+          <p:cNvSpPr>
+            <a:spLocks noGrp="1" noRot="1" noChangeAspect="1"/>
+          </p:cNvSpPr>
+          <p:nvPr>
+            <p:ph type="sldImg"/>
+          </p:nvPr>
+        </p:nvSpPr>
+        <p:spPr/>
+      </p:sp>
+      <p:sp>
+        <p:nvSpPr>
+          <p:cNvPr id="3" name="Notes Placeholder 2"/>
+          <p:cNvSpPr>
+            <a:spLocks noGrp="1"/>
+          </p:cNvSpPr>
+          <p:nvPr>
+            <p:ph type="body" idx="1"/>
+          </p:nvPr>
+        </p:nvSpPr>
+        <p:spPr/>
+        <p:txBody>
+          <a:bodyPr/>
+          <a:lstStyle/>
+          <a:p>
             <a:pPr marL="0" marR="0" lvl="0" indent="0" algn="l" defTabSz="914400" rtl="0" eaLnBrk="1" fontAlgn="auto" latinLnBrk="0" hangingPunct="1">
               <a:lnSpc>
                 <a:spcPct val="100000"/>
@@ -2196,7 +2510,7 @@
 </p:notes>
 </file>
 
-<file path=ppt/notesSlides/notesSlide18.xml><?xml version="1.0" encoding="utf-8"?>
+<file path=ppt/notesSlides/notesSlide19.xml><?xml version="1.0" encoding="utf-8"?>
 <p:notes xmlns:a="http://schemas.openxmlformats.org/drawingml/2006/main" xmlns:r="http://schemas.openxmlformats.org/officeDocument/2006/relationships" xmlns:p="http://schemas.openxmlformats.org/presentationml/2006/main">
   <p:cSld>
     <p:spTree>
@@ -2288,107 +2602,6 @@
     <p:extLst>
       <p:ext uri="{BB962C8B-B14F-4D97-AF65-F5344CB8AC3E}">
         <p14:creationId xmlns:p14="http://schemas.microsoft.com/office/powerpoint/2010/main" val="1974960137"/>
-      </p:ext>
-    </p:extLst>
-  </p:cSld>
-  <p:clrMapOvr>
-    <a:masterClrMapping/>
-  </p:clrMapOvr>
-</p:notes>
-</file>
-
-<file path=ppt/notesSlides/notesSlide19.xml><?xml version="1.0" encoding="utf-8"?>
-<p:notes xmlns:a="http://schemas.openxmlformats.org/drawingml/2006/main" xmlns:r="http://schemas.openxmlformats.org/officeDocument/2006/relationships" xmlns:p="http://schemas.openxmlformats.org/presentationml/2006/main">
-  <p:cSld>
-    <p:spTree>
-      <p:nvGrpSpPr>
-        <p:cNvPr id="1" name=""/>
-        <p:cNvGrpSpPr/>
-        <p:nvPr/>
-      </p:nvGrpSpPr>
-      <p:grpSpPr>
-        <a:xfrm>
-          <a:off x="0" y="0"/>
-          <a:ext cx="0" cy="0"/>
-          <a:chOff x="0" y="0"/>
-          <a:chExt cx="0" cy="0"/>
-        </a:xfrm>
-      </p:grpSpPr>
-      <p:sp>
-        <p:nvSpPr>
-          <p:cNvPr id="2" name="Slide Image Placeholder 1"/>
-          <p:cNvSpPr>
-            <a:spLocks noGrp="1" noRot="1" noChangeAspect="1"/>
-          </p:cNvSpPr>
-          <p:nvPr>
-            <p:ph type="sldImg"/>
-          </p:nvPr>
-        </p:nvSpPr>
-        <p:spPr/>
-      </p:sp>
-      <p:sp>
-        <p:nvSpPr>
-          <p:cNvPr id="3" name="Notes Placeholder 2"/>
-          <p:cNvSpPr>
-            <a:spLocks noGrp="1"/>
-          </p:cNvSpPr>
-          <p:nvPr>
-            <p:ph type="body" idx="1"/>
-          </p:nvPr>
-        </p:nvSpPr>
-        <p:spPr/>
-        <p:txBody>
-          <a:bodyPr/>
-          <a:lstStyle/>
-          <a:p>
-            <a:pPr marL="0" marR="0" lvl="0" indent="0" algn="l" defTabSz="914400" rtl="0" eaLnBrk="1" fontAlgn="auto" latinLnBrk="0" hangingPunct="1">
-              <a:lnSpc>
-                <a:spcPct val="100000"/>
-              </a:lnSpc>
-              <a:spcBef>
-                <a:spcPts val="0"/>
-              </a:spcBef>
-              <a:spcAft>
-                <a:spcPts val="0"/>
-              </a:spcAft>
-              <a:buClrTx/>
-              <a:buSzTx/>
-              <a:buFontTx/>
-              <a:buNone/>
-              <a:tabLst/>
-              <a:defRPr/>
-            </a:pPr>
-            <a:endParaRPr lang="en-US" dirty="0"/>
-          </a:p>
-        </p:txBody>
-      </p:sp>
-      <p:sp>
-        <p:nvSpPr>
-          <p:cNvPr id="4" name="Slide Number Placeholder 3"/>
-          <p:cNvSpPr>
-            <a:spLocks noGrp="1"/>
-          </p:cNvSpPr>
-          <p:nvPr>
-            <p:ph type="sldNum" sz="quarter" idx="5"/>
-          </p:nvPr>
-        </p:nvSpPr>
-        <p:spPr/>
-        <p:txBody>
-          <a:bodyPr/>
-          <a:lstStyle/>
-          <a:p>
-            <a:fld id="{3148858F-F1DB-4027-9C85-CCA6849540DD}" type="slidenum">
-              <a:rPr lang="en-US" smtClean="0"/>
-              <a:t>20</a:t>
-            </a:fld>
-            <a:endParaRPr lang="en-US"/>
-          </a:p>
-        </p:txBody>
-      </p:sp>
-    </p:spTree>
-    <p:extLst>
-      <p:ext uri="{BB962C8B-B14F-4D97-AF65-F5344CB8AC3E}">
-        <p14:creationId xmlns:p14="http://schemas.microsoft.com/office/powerpoint/2010/main" val="786363220"/>
       </p:ext>
     </p:extLst>
   </p:cSld>
@@ -2471,7 +2684,7 @@
                 <a:effectLst/>
                 <a:latin typeface="+mn-lt"/>
               </a:rPr>
-              <a:t>token embedding </a:t>
+              <a:t>token embedding) </a:t>
             </a:r>
             <a:r>
               <a:rPr lang="en-US" b="0" i="0" dirty="0">
@@ -2481,7 +2694,7 @@
                 <a:effectLst/>
                 <a:latin typeface="+mn-lt"/>
               </a:rPr>
-              <a:t>when we use it on the more general idea of a token) is a bit abstract.  So, let’s begin with a concrete story.</a:t>
+              <a:t>is a bit abstract.  So, let’s begin with a concrete story.</a:t>
             </a:r>
           </a:p>
           <a:p>
@@ -2604,7 +2817,7 @@
           <a:p>
             <a:fld id="{3148858F-F1DB-4027-9C85-CCA6849540DD}" type="slidenum">
               <a:rPr lang="en-US" smtClean="0"/>
-              <a:t>3</a:t>
+              <a:t>2</a:t>
             </a:fld>
             <a:endParaRPr lang="en-US"/>
           </a:p>
@@ -2684,233 +2897,6 @@
               <a:tabLst/>
               <a:defRPr/>
             </a:pPr>
-            <a:r>
-              <a:rPr lang="en-US" b="0" i="0" dirty="0">
-                <a:solidFill>
-                  <a:srgbClr val="292929"/>
-                </a:solidFill>
-                <a:effectLst/>
-                <a:latin typeface="+mn-lt"/>
-              </a:rPr>
-              <a:t>Instead, our objective is to have words with similar context occupy close spatial positions. Mathematically, the cosine of the angle between such vectors should be close to 1, i.e., angle close to 0.  In this image, Po the Panda is ‘good’ while Master Tigress is ‘great’.</a:t>
-            </a:r>
-          </a:p>
-          <a:p>
-            <a:pPr marL="0" marR="0" lvl="0" indent="0" algn="l" defTabSz="914400" rtl="0" eaLnBrk="1" fontAlgn="auto" latinLnBrk="0" hangingPunct="1">
-              <a:lnSpc>
-                <a:spcPct val="100000"/>
-              </a:lnSpc>
-              <a:spcBef>
-                <a:spcPts val="0"/>
-              </a:spcBef>
-              <a:spcAft>
-                <a:spcPts val="0"/>
-              </a:spcAft>
-              <a:buClrTx/>
-              <a:buSzTx/>
-              <a:buFontTx/>
-              <a:buNone/>
-              <a:tabLst/>
-              <a:defRPr/>
-            </a:pPr>
-            <a:endParaRPr lang="en-US" b="0" i="0" dirty="0">
-              <a:solidFill>
-                <a:srgbClr val="292929"/>
-              </a:solidFill>
-              <a:effectLst/>
-              <a:latin typeface="+mn-lt"/>
-            </a:endParaRPr>
-          </a:p>
-          <a:p>
-            <a:pPr marL="0" marR="0" lvl="0" indent="0" algn="l" defTabSz="914400" rtl="0" eaLnBrk="1" fontAlgn="auto" latinLnBrk="0" hangingPunct="1">
-              <a:lnSpc>
-                <a:spcPct val="100000"/>
-              </a:lnSpc>
-              <a:spcBef>
-                <a:spcPts val="0"/>
-              </a:spcBef>
-              <a:spcAft>
-                <a:spcPts val="0"/>
-              </a:spcAft>
-              <a:buClrTx/>
-              <a:buSzTx/>
-              <a:buFontTx/>
-              <a:buNone/>
-              <a:tabLst/>
-              <a:defRPr/>
-            </a:pPr>
-            <a:r>
-              <a:rPr lang="en-US" b="0" i="0" dirty="0">
-                <a:solidFill>
-                  <a:srgbClr val="292929"/>
-                </a:solidFill>
-                <a:effectLst/>
-                <a:latin typeface="+mn-lt"/>
-              </a:rPr>
-              <a:t>In a nutshell, this leads to the idea of generating </a:t>
-            </a:r>
-            <a:r>
-              <a:rPr lang="en-US" b="0" i="1" dirty="0">
-                <a:solidFill>
-                  <a:srgbClr val="292929"/>
-                </a:solidFill>
-                <a:effectLst/>
-                <a:latin typeface="+mn-lt"/>
-              </a:rPr>
-              <a:t>distributed representations</a:t>
-            </a:r>
-            <a:r>
-              <a:rPr lang="en-US" b="0" i="0" dirty="0">
-                <a:solidFill>
-                  <a:srgbClr val="292929"/>
-                </a:solidFill>
-                <a:effectLst/>
-                <a:latin typeface="+mn-lt"/>
-              </a:rPr>
-              <a:t>. Intuitively, we introduce some </a:t>
-            </a:r>
-            <a:r>
-              <a:rPr lang="en-US" b="0" i="1" dirty="0">
-                <a:solidFill>
-                  <a:srgbClr val="292929"/>
-                </a:solidFill>
-                <a:effectLst/>
-                <a:latin typeface="+mn-lt"/>
-              </a:rPr>
-              <a:t>dependence</a:t>
-            </a:r>
-            <a:r>
-              <a:rPr lang="en-US" b="0" i="0" dirty="0">
-                <a:solidFill>
-                  <a:srgbClr val="292929"/>
-                </a:solidFill>
-                <a:effectLst/>
-                <a:latin typeface="+mn-lt"/>
-              </a:rPr>
-              <a:t> of one word on the other words. The words in the context of this word would get a greater share of this </a:t>
-            </a:r>
-            <a:r>
-              <a:rPr lang="en-US" b="0" i="1" dirty="0">
-                <a:solidFill>
-                  <a:srgbClr val="292929"/>
-                </a:solidFill>
-                <a:effectLst/>
-                <a:latin typeface="+mn-lt"/>
-              </a:rPr>
-              <a:t>dependence.  </a:t>
-            </a:r>
-            <a:r>
-              <a:rPr lang="en-US" b="0" i="0" dirty="0">
-                <a:solidFill>
-                  <a:srgbClr val="292929"/>
-                </a:solidFill>
-                <a:effectLst/>
-                <a:latin typeface="+mn-lt"/>
-              </a:rPr>
-              <a:t>In one hot encoding representations, all the words are independent of each other</a:t>
-            </a:r>
-            <a:r>
-              <a:rPr lang="en-US" b="0" i="1" dirty="0">
-                <a:solidFill>
-                  <a:srgbClr val="292929"/>
-                </a:solidFill>
-                <a:effectLst/>
-                <a:latin typeface="+mn-lt"/>
-              </a:rPr>
-              <a:t>, </a:t>
-            </a:r>
-            <a:r>
-              <a:rPr lang="en-US" b="0" i="0" dirty="0">
-                <a:solidFill>
-                  <a:srgbClr val="292929"/>
-                </a:solidFill>
-                <a:effectLst/>
-                <a:latin typeface="+mn-lt"/>
-              </a:rPr>
-              <a:t>as mentioned earlier.  The goal is to generate an </a:t>
-            </a:r>
-            <a:r>
-              <a:rPr lang="en-US" b="1" i="0" dirty="0">
-                <a:solidFill>
-                  <a:srgbClr val="292929"/>
-                </a:solidFill>
-                <a:effectLst/>
-                <a:latin typeface="+mn-lt"/>
-              </a:rPr>
-              <a:t>embedding </a:t>
-            </a:r>
-            <a:r>
-              <a:rPr lang="en-US" b="0" i="0" dirty="0">
-                <a:solidFill>
-                  <a:srgbClr val="292929"/>
-                </a:solidFill>
-                <a:effectLst/>
-                <a:latin typeface="+mn-lt"/>
-              </a:rPr>
-              <a:t>for each word in a vocabulary, a unique location in a multi-dimensional space which captures its relationship to other words in that vocabulary.</a:t>
-            </a:r>
-            <a:endParaRPr lang="en-US" b="1" i="0" dirty="0">
-              <a:solidFill>
-                <a:srgbClr val="292929"/>
-              </a:solidFill>
-              <a:effectLst/>
-              <a:latin typeface="+mn-lt"/>
-            </a:endParaRPr>
-          </a:p>
-          <a:p>
-            <a:pPr marL="0" marR="0" lvl="0" indent="0" algn="l" defTabSz="914400" rtl="0" eaLnBrk="1" fontAlgn="auto" latinLnBrk="0" hangingPunct="1">
-              <a:lnSpc>
-                <a:spcPct val="100000"/>
-              </a:lnSpc>
-              <a:spcBef>
-                <a:spcPts val="0"/>
-              </a:spcBef>
-              <a:spcAft>
-                <a:spcPts val="0"/>
-              </a:spcAft>
-              <a:buClrTx/>
-              <a:buSzTx/>
-              <a:buFontTx/>
-              <a:buNone/>
-              <a:tabLst/>
-              <a:defRPr/>
-            </a:pPr>
-            <a:endParaRPr lang="en-US" b="0" i="0" dirty="0">
-              <a:solidFill>
-                <a:srgbClr val="292929"/>
-              </a:solidFill>
-              <a:effectLst/>
-              <a:latin typeface="charter"/>
-            </a:endParaRPr>
-          </a:p>
-          <a:p>
-            <a:pPr marL="0" marR="0" lvl="0" indent="0" algn="l" defTabSz="914400" rtl="0" eaLnBrk="1" fontAlgn="auto" latinLnBrk="0" hangingPunct="1">
-              <a:lnSpc>
-                <a:spcPct val="100000"/>
-              </a:lnSpc>
-              <a:spcBef>
-                <a:spcPts val="0"/>
-              </a:spcBef>
-              <a:spcAft>
-                <a:spcPts val="0"/>
-              </a:spcAft>
-              <a:buClrTx/>
-              <a:buSzTx/>
-              <a:buFontTx/>
-              <a:buNone/>
-              <a:tabLst/>
-              <a:defRPr/>
-            </a:pPr>
-            <a:endParaRPr lang="en-US" b="0" i="0" dirty="0">
-              <a:solidFill>
-                <a:srgbClr val="292929"/>
-              </a:solidFill>
-              <a:effectLst/>
-              <a:latin typeface="charter"/>
-            </a:endParaRPr>
-          </a:p>
-          <a:p>
-            <a:pPr algn="l"/>
             <a:endParaRPr lang="en-US" dirty="0"/>
           </a:p>
         </p:txBody>
@@ -2932,7 +2918,7 @@
           <a:p>
             <a:fld id="{3148858F-F1DB-4027-9C85-CCA6849540DD}" type="slidenum">
               <a:rPr lang="en-US" smtClean="0"/>
-              <a:t>21</a:t>
+              <a:t>20</a:t>
             </a:fld>
             <a:endParaRPr lang="en-US"/>
           </a:p>
@@ -2941,7 +2927,7 @@
     </p:spTree>
     <p:extLst>
       <p:ext uri="{BB962C8B-B14F-4D97-AF65-F5344CB8AC3E}">
-        <p14:creationId xmlns:p14="http://schemas.microsoft.com/office/powerpoint/2010/main" val="1453454417"/>
+        <p14:creationId xmlns:p14="http://schemas.microsoft.com/office/powerpoint/2010/main" val="786363220"/>
       </p:ext>
     </p:extLst>
   </p:cSld>
@@ -2994,21 +2980,6 @@
         <p:txBody>
           <a:bodyPr/>
           <a:lstStyle/>
-          <a:p>
-            <a:pPr algn="l"/>
-            <a:r>
-              <a:rPr lang="en-US" dirty="0">
-                <a:latin typeface="+mn-lt"/>
-              </a:rPr>
-              <a:t>In our last slide, the idea of a word’s unique location in a multi-dimensional space was mentioned.  Let’s make that idea concrete.</a:t>
-            </a:r>
-          </a:p>
-          <a:p>
-            <a:pPr algn="l"/>
-            <a:endParaRPr lang="en-US" dirty="0">
-              <a:latin typeface="+mn-lt"/>
-            </a:endParaRPr>
-          </a:p>
           <a:p>
             <a:pPr algn="l"/>
             <a:r>
@@ -3327,7 +3298,7 @@
           <a:p>
             <a:fld id="{3148858F-F1DB-4027-9C85-CCA6849540DD}" type="slidenum">
               <a:rPr lang="en-US" smtClean="0"/>
-              <a:t>4</a:t>
+              <a:t>3</a:t>
             </a:fld>
             <a:endParaRPr lang="en-US"/>
           </a:p>
@@ -3517,7 +3488,7 @@
           <a:p>
             <a:fld id="{3148858F-F1DB-4027-9C85-CCA6849540DD}" type="slidenum">
               <a:rPr lang="en-US" smtClean="0"/>
-              <a:t>5</a:t>
+              <a:t>4</a:t>
             </a:fld>
             <a:endParaRPr lang="en-US"/>
           </a:p>
@@ -3836,7 +3807,7 @@
           <a:p>
             <a:fld id="{3148858F-F1DB-4027-9C85-CCA6849540DD}" type="slidenum">
               <a:rPr lang="en-US" smtClean="0"/>
-              <a:t>6</a:t>
+              <a:t>5</a:t>
             </a:fld>
             <a:endParaRPr lang="en-US"/>
           </a:p>
@@ -4105,7 +4076,7 @@
           <a:p>
             <a:fld id="{3148858F-F1DB-4027-9C85-CCA6849540DD}" type="slidenum">
               <a:rPr lang="en-US" smtClean="0"/>
-              <a:t>7</a:t>
+              <a:t>6</a:t>
             </a:fld>
             <a:endParaRPr lang="en-US"/>
           </a:p>
@@ -4192,7 +4163,7 @@
           <a:p>
             <a:fld id="{3148858F-F1DB-4027-9C85-CCA6849540DD}" type="slidenum">
               <a:rPr lang="en-US" smtClean="0"/>
-              <a:t>8</a:t>
+              <a:t>7</a:t>
             </a:fld>
             <a:endParaRPr lang="en-US"/>
           </a:p>
@@ -4465,7 +4436,7 @@
           <a:p>
             <a:fld id="{3148858F-F1DB-4027-9C85-CCA6849540DD}" type="slidenum">
               <a:rPr lang="en-US" smtClean="0"/>
-              <a:t>9</a:t>
+              <a:t>8</a:t>
             </a:fld>
             <a:endParaRPr lang="en-US"/>
           </a:p>
@@ -4589,7 +4560,7 @@
           <a:p>
             <a:fld id="{3148858F-F1DB-4027-9C85-CCA6849540DD}" type="slidenum">
               <a:rPr lang="en-US" smtClean="0"/>
-              <a:t>10</a:t>
+              <a:t>9</a:t>
             </a:fld>
             <a:endParaRPr lang="en-US"/>
           </a:p>
@@ -4755,7 +4726,7 @@
           <a:p>
             <a:fld id="{C3F78080-8D0A-4BE8-A5B4-CB115102D524}" type="datetimeFigureOut">
               <a:rPr lang="en-US" smtClean="0"/>
-              <a:t>8/29/2022</a:t>
+              <a:t>10/20/2022</a:t>
             </a:fld>
             <a:endParaRPr lang="en-US"/>
           </a:p>
@@ -4953,7 +4924,7 @@
           <a:p>
             <a:fld id="{C3F78080-8D0A-4BE8-A5B4-CB115102D524}" type="datetimeFigureOut">
               <a:rPr lang="en-US" smtClean="0"/>
-              <a:t>8/29/2022</a:t>
+              <a:t>10/20/2022</a:t>
             </a:fld>
             <a:endParaRPr lang="en-US"/>
           </a:p>
@@ -5161,7 +5132,7 @@
           <a:p>
             <a:fld id="{C3F78080-8D0A-4BE8-A5B4-CB115102D524}" type="datetimeFigureOut">
               <a:rPr lang="en-US" smtClean="0"/>
-              <a:t>8/29/2022</a:t>
+              <a:t>10/20/2022</a:t>
             </a:fld>
             <a:endParaRPr lang="en-US"/>
           </a:p>
@@ -5359,7 +5330,7 @@
           <a:p>
             <a:fld id="{C3F78080-8D0A-4BE8-A5B4-CB115102D524}" type="datetimeFigureOut">
               <a:rPr lang="en-US" smtClean="0"/>
-              <a:t>8/29/2022</a:t>
+              <a:t>10/20/2022</a:t>
             </a:fld>
             <a:endParaRPr lang="en-US"/>
           </a:p>
@@ -5634,7 +5605,7 @@
           <a:p>
             <a:fld id="{C3F78080-8D0A-4BE8-A5B4-CB115102D524}" type="datetimeFigureOut">
               <a:rPr lang="en-US" smtClean="0"/>
-              <a:t>8/29/2022</a:t>
+              <a:t>10/20/2022</a:t>
             </a:fld>
             <a:endParaRPr lang="en-US"/>
           </a:p>
@@ -5899,7 +5870,7 @@
           <a:p>
             <a:fld id="{C3F78080-8D0A-4BE8-A5B4-CB115102D524}" type="datetimeFigureOut">
               <a:rPr lang="en-US" smtClean="0"/>
-              <a:t>8/29/2022</a:t>
+              <a:t>10/20/2022</a:t>
             </a:fld>
             <a:endParaRPr lang="en-US"/>
           </a:p>
@@ -6311,7 +6282,7 @@
           <a:p>
             <a:fld id="{C3F78080-8D0A-4BE8-A5B4-CB115102D524}" type="datetimeFigureOut">
               <a:rPr lang="en-US" smtClean="0"/>
-              <a:t>8/29/2022</a:t>
+              <a:t>10/20/2022</a:t>
             </a:fld>
             <a:endParaRPr lang="en-US"/>
           </a:p>
@@ -6452,7 +6423,7 @@
           <a:p>
             <a:fld id="{C3F78080-8D0A-4BE8-A5B4-CB115102D524}" type="datetimeFigureOut">
               <a:rPr lang="en-US" smtClean="0"/>
-              <a:t>8/29/2022</a:t>
+              <a:t>10/20/2022</a:t>
             </a:fld>
             <a:endParaRPr lang="en-US"/>
           </a:p>
@@ -6565,7 +6536,7 @@
           <a:p>
             <a:fld id="{C3F78080-8D0A-4BE8-A5B4-CB115102D524}" type="datetimeFigureOut">
               <a:rPr lang="en-US" smtClean="0"/>
-              <a:t>8/29/2022</a:t>
+              <a:t>10/20/2022</a:t>
             </a:fld>
             <a:endParaRPr lang="en-US"/>
           </a:p>
@@ -6876,7 +6847,7 @@
           <a:p>
             <a:fld id="{C3F78080-8D0A-4BE8-A5B4-CB115102D524}" type="datetimeFigureOut">
               <a:rPr lang="en-US" smtClean="0"/>
-              <a:t>8/29/2022</a:t>
+              <a:t>10/20/2022</a:t>
             </a:fld>
             <a:endParaRPr lang="en-US"/>
           </a:p>
@@ -7164,7 +7135,7 @@
           <a:p>
             <a:fld id="{C3F78080-8D0A-4BE8-A5B4-CB115102D524}" type="datetimeFigureOut">
               <a:rPr lang="en-US" smtClean="0"/>
-              <a:t>8/29/2022</a:t>
+              <a:t>10/20/2022</a:t>
             </a:fld>
             <a:endParaRPr lang="en-US"/>
           </a:p>
@@ -7405,7 +7376,7 @@
           <a:p>
             <a:fld id="{C3F78080-8D0A-4BE8-A5B4-CB115102D524}" type="datetimeFigureOut">
               <a:rPr lang="en-US" smtClean="0"/>
-              <a:t>8/29/2022</a:t>
+              <a:t>10/20/2022</a:t>
             </a:fld>
             <a:endParaRPr lang="en-US"/>
           </a:p>
@@ -7850,7 +7821,7 @@
           <a:p>
             <a:r>
               <a:rPr lang="en-US" dirty="0">
-                <a:latin typeface="Palatino Linotype" panose="02040502050505030304" pitchFamily="18" charset="0"/>
+                <a:latin typeface="Avenir Next LT Pro" panose="020B0504020202020204" pitchFamily="34" charset="0"/>
                 <a:cs typeface="Segoe UI" panose="020B0502040204020203" pitchFamily="34" charset="0"/>
               </a:rPr>
               <a:t>Word Embeddings and Word Vectors</a:t>
@@ -7938,214 +7909,6 @@
       </p:grpSpPr>
       <p:sp>
         <p:nvSpPr>
-          <p:cNvPr id="2" name="Title 1">
-            <a:extLst>
-              <a:ext uri="{FF2B5EF4-FFF2-40B4-BE49-F238E27FC236}">
-                <a16:creationId xmlns:a16="http://schemas.microsoft.com/office/drawing/2014/main" id="{0F853981-B13F-4917-804F-EBF0D4819E7E}"/>
-              </a:ext>
-            </a:extLst>
-          </p:cNvPr>
-          <p:cNvSpPr>
-            <a:spLocks noGrp="1"/>
-          </p:cNvSpPr>
-          <p:nvPr>
-            <p:ph type="title"/>
-          </p:nvPr>
-        </p:nvSpPr>
-        <p:spPr>
-          <a:xfrm>
-            <a:off x="0" y="3169585"/>
-            <a:ext cx="12192000" cy="518830"/>
-          </a:xfrm>
-          <a:noFill/>
-        </p:spPr>
-        <p:txBody>
-          <a:bodyPr>
-            <a:noAutofit/>
-          </a:bodyPr>
-          <a:lstStyle/>
-          <a:p>
-            <a:pPr algn="ctr"/>
-            <a:br>
-              <a:rPr lang="en-US" sz="3600" dirty="0">
-                <a:solidFill>
-                  <a:schemeClr val="tx1">
-                    <a:lumMod val="65000"/>
-                    <a:lumOff val="35000"/>
-                  </a:schemeClr>
-                </a:solidFill>
-                <a:latin typeface="Palatino Linotype" panose="02040502050505030304" pitchFamily="18" charset="0"/>
-              </a:rPr>
-            </a:br>
-            <a:br>
-              <a:rPr lang="en-US" sz="3600" dirty="0">
-                <a:solidFill>
-                  <a:schemeClr val="tx1">
-                    <a:lumMod val="65000"/>
-                    <a:lumOff val="35000"/>
-                  </a:schemeClr>
-                </a:solidFill>
-                <a:latin typeface="Palatino Linotype" panose="02040502050505030304" pitchFamily="18" charset="0"/>
-              </a:rPr>
-            </a:br>
-            <a:r>
-              <a:rPr lang="en-US" sz="3600" dirty="0">
-                <a:solidFill>
-                  <a:schemeClr val="tx1">
-                    <a:lumMod val="65000"/>
-                    <a:lumOff val="35000"/>
-                  </a:schemeClr>
-                </a:solidFill>
-                <a:latin typeface="Palatino Linotype" panose="02040502050505030304" pitchFamily="18" charset="0"/>
-              </a:rPr>
-              <a:t>Word Embedding Demo</a:t>
-            </a:r>
-            <a:endParaRPr lang="en-US" sz="3600" dirty="0">
-              <a:solidFill>
-                <a:schemeClr val="tx1">
-                  <a:lumMod val="65000"/>
-                  <a:lumOff val="35000"/>
-                </a:schemeClr>
-              </a:solidFill>
-              <a:latin typeface="Palatino Linotype" panose="02040502050505030304" pitchFamily="18" charset="0"/>
-              <a:cs typeface="Segoe UI Light" panose="020B0502040204020203" pitchFamily="34" charset="0"/>
-            </a:endParaRPr>
-          </a:p>
-        </p:txBody>
-      </p:sp>
-      <p:sp>
-        <p:nvSpPr>
-          <p:cNvPr id="3" name="Text Placeholder 2">
-            <a:extLst>
-              <a:ext uri="{FF2B5EF4-FFF2-40B4-BE49-F238E27FC236}">
-                <a16:creationId xmlns:a16="http://schemas.microsoft.com/office/drawing/2014/main" id="{098BC2D2-CCF7-4C63-8489-B46BF394FCA2}"/>
-              </a:ext>
-            </a:extLst>
-          </p:cNvPr>
-          <p:cNvSpPr>
-            <a:spLocks noGrp="1"/>
-          </p:cNvSpPr>
-          <p:nvPr>
-            <p:ph type="body" idx="1"/>
-          </p:nvPr>
-        </p:nvSpPr>
-        <p:spPr>
-          <a:xfrm>
-            <a:off x="0" y="4285400"/>
-            <a:ext cx="12192000" cy="518830"/>
-          </a:xfrm>
-        </p:spPr>
-        <p:txBody>
-          <a:bodyPr>
-            <a:normAutofit/>
-          </a:bodyPr>
-          <a:lstStyle/>
-          <a:p>
-            <a:endParaRPr lang="en-US" dirty="0">
-              <a:latin typeface="Palatino Linotype" panose="02040502050505030304" pitchFamily="18" charset="0"/>
-              <a:cs typeface="Segoe UI" panose="020B0502040204020203" pitchFamily="34" charset="0"/>
-            </a:endParaRPr>
-          </a:p>
-          <a:p>
-            <a:endParaRPr lang="en-US" dirty="0">
-              <a:latin typeface="Palatino Linotype" panose="02040502050505030304" pitchFamily="18" charset="0"/>
-              <a:cs typeface="Segoe UI" panose="020B0502040204020203" pitchFamily="34" charset="0"/>
-            </a:endParaRPr>
-          </a:p>
-          <a:p>
-            <a:endParaRPr lang="en-US" dirty="0">
-              <a:latin typeface="Palatino Linotype" panose="02040502050505030304" pitchFamily="18" charset="0"/>
-              <a:cs typeface="Segoe UI" panose="020B0502040204020203" pitchFamily="34" charset="0"/>
-            </a:endParaRPr>
-          </a:p>
-          <a:p>
-            <a:endParaRPr lang="en-US" dirty="0">
-              <a:latin typeface="Palatino Linotype" panose="02040502050505030304" pitchFamily="18" charset="0"/>
-              <a:cs typeface="Segoe UI" panose="020B0502040204020203" pitchFamily="34" charset="0"/>
-            </a:endParaRPr>
-          </a:p>
-          <a:p>
-            <a:endParaRPr lang="en-US" dirty="0">
-              <a:latin typeface="Palatino Linotype" panose="02040502050505030304" pitchFamily="18" charset="0"/>
-              <a:cs typeface="Segoe UI" panose="020B0502040204020203" pitchFamily="34" charset="0"/>
-            </a:endParaRPr>
-          </a:p>
-        </p:txBody>
-      </p:sp>
-      <p:pic>
-        <p:nvPicPr>
-          <p:cNvPr id="4" name="Picture 3">
-            <a:extLst>
-              <a:ext uri="{FF2B5EF4-FFF2-40B4-BE49-F238E27FC236}">
-                <a16:creationId xmlns:a16="http://schemas.microsoft.com/office/drawing/2014/main" id="{4CD7B1E7-8C1E-4394-BD29-073CEC503ACC}"/>
-              </a:ext>
-            </a:extLst>
-          </p:cNvPr>
-          <p:cNvPicPr>
-            <a:picLocks noChangeAspect="1"/>
-          </p:cNvPicPr>
-          <p:nvPr/>
-        </p:nvPicPr>
-        <p:blipFill>
-          <a:blip r:embed="rId3"/>
-          <a:stretch>
-            <a:fillRect/>
-          </a:stretch>
-        </p:blipFill>
-        <p:spPr>
-          <a:xfrm>
-            <a:off x="0" y="365760"/>
-            <a:ext cx="3233668" cy="805144"/>
-          </a:xfrm>
-          <a:prstGeom prst="rect">
-            <a:avLst/>
-          </a:prstGeom>
-        </p:spPr>
-      </p:pic>
-    </p:spTree>
-    <p:extLst>
-      <p:ext uri="{BB962C8B-B14F-4D97-AF65-F5344CB8AC3E}">
-        <p14:creationId xmlns:p14="http://schemas.microsoft.com/office/powerpoint/2010/main" val="3774553972"/>
-      </p:ext>
-    </p:extLst>
-  </p:cSld>
-  <p:clrMapOvr>
-    <a:masterClrMapping/>
-  </p:clrMapOvr>
-  <mc:AlternateContent xmlns:mc="http://schemas.openxmlformats.org/markup-compatibility/2006" xmlns:p14="http://schemas.microsoft.com/office/powerpoint/2010/main">
-    <mc:Choice Requires="p14">
-      <p:transition spd="med" p14:dur="700">
-        <p:fade/>
-      </p:transition>
-    </mc:Choice>
-    <mc:Fallback xmlns="">
-      <p:transition spd="med">
-        <p:fade/>
-      </p:transition>
-    </mc:Fallback>
-  </mc:AlternateContent>
-</p:sld>
-</file>
-
-<file path=ppt/slides/slide11.xml><?xml version="1.0" encoding="utf-8"?>
-<p:sld xmlns:a="http://schemas.openxmlformats.org/drawingml/2006/main" xmlns:r="http://schemas.openxmlformats.org/officeDocument/2006/relationships" xmlns:p="http://schemas.openxmlformats.org/presentationml/2006/main">
-  <p:cSld>
-    <p:spTree>
-      <p:nvGrpSpPr>
-        <p:cNvPr id="1" name=""/>
-        <p:cNvGrpSpPr/>
-        <p:nvPr/>
-      </p:nvGrpSpPr>
-      <p:grpSpPr>
-        <a:xfrm>
-          <a:off x="0" y="0"/>
-          <a:ext cx="0" cy="0"/>
-          <a:chOff x="0" y="0"/>
-          <a:chExt cx="0" cy="0"/>
-        </a:xfrm>
-      </p:grpSpPr>
-      <p:sp>
-        <p:nvSpPr>
           <p:cNvPr id="3" name="TextBox 2">
             <a:extLst>
               <a:ext uri="{FF2B5EF4-FFF2-40B4-BE49-F238E27FC236}">
@@ -8313,7 +8076,7 @@
 </p:sld>
 </file>
 
-<file path=ppt/slides/slide12.xml><?xml version="1.0" encoding="utf-8"?>
+<file path=ppt/slides/slide11.xml><?xml version="1.0" encoding="utf-8"?>
 <p:sld xmlns:a="http://schemas.openxmlformats.org/drawingml/2006/main" xmlns:r="http://schemas.openxmlformats.org/officeDocument/2006/relationships" xmlns:p="http://schemas.openxmlformats.org/presentationml/2006/main">
   <p:cSld>
     <p:spTree>
@@ -8429,7 +8192,7 @@
 </p:sld>
 </file>
 
-<file path=ppt/slides/slide13.xml><?xml version="1.0" encoding="utf-8"?>
+<file path=ppt/slides/slide12.xml><?xml version="1.0" encoding="utf-8"?>
 <p:sld xmlns:a="http://schemas.openxmlformats.org/drawingml/2006/main" xmlns:r="http://schemas.openxmlformats.org/officeDocument/2006/relationships" xmlns:p="http://schemas.openxmlformats.org/presentationml/2006/main">
   <p:cSld>
     <p:spTree>
@@ -8721,7 +8484,7 @@
 </p:sld>
 </file>
 
-<file path=ppt/slides/slide14.xml><?xml version="1.0" encoding="utf-8"?>
+<file path=ppt/slides/slide13.xml><?xml version="1.0" encoding="utf-8"?>
 <p:sld xmlns:a="http://schemas.openxmlformats.org/drawingml/2006/main" xmlns:r="http://schemas.openxmlformats.org/officeDocument/2006/relationships" xmlns:p="http://schemas.openxmlformats.org/presentationml/2006/main">
   <p:cSld>
     <p:spTree>
@@ -8867,7 +8630,7 @@
 </p:sld>
 </file>
 
-<file path=ppt/slides/slide15.xml><?xml version="1.0" encoding="utf-8"?>
+<file path=ppt/slides/slide14.xml><?xml version="1.0" encoding="utf-8"?>
 <p:sld xmlns:a="http://schemas.openxmlformats.org/drawingml/2006/main" xmlns:r="http://schemas.openxmlformats.org/officeDocument/2006/relationships" xmlns:p="http://schemas.openxmlformats.org/presentationml/2006/main">
   <p:cSld>
     <p:spTree>
@@ -9269,7 +9032,7 @@
 </p:sld>
 </file>
 
-<file path=ppt/slides/slide16.xml><?xml version="1.0" encoding="utf-8"?>
+<file path=ppt/slides/slide15.xml><?xml version="1.0" encoding="utf-8"?>
 <p:sld xmlns:a="http://schemas.openxmlformats.org/drawingml/2006/main" xmlns:r="http://schemas.openxmlformats.org/officeDocument/2006/relationships" xmlns:p="http://schemas.openxmlformats.org/presentationml/2006/main">
   <p:cSld>
     <p:spTree>
@@ -9679,6 +9442,388 @@
       </p:transition>
     </mc:Fallback>
   </mc:AlternateContent>
+</p:sld>
+</file>
+
+<file path=ppt/slides/slide16.xml><?xml version="1.0" encoding="utf-8"?>
+<p:sld xmlns:a="http://schemas.openxmlformats.org/drawingml/2006/main" xmlns:r="http://schemas.openxmlformats.org/officeDocument/2006/relationships" xmlns:p="http://schemas.openxmlformats.org/presentationml/2006/main">
+  <p:cSld>
+    <p:spTree>
+      <p:nvGrpSpPr>
+        <p:cNvPr id="1" name=""/>
+        <p:cNvGrpSpPr/>
+        <p:nvPr/>
+      </p:nvGrpSpPr>
+      <p:grpSpPr>
+        <a:xfrm>
+          <a:off x="0" y="0"/>
+          <a:ext cx="0" cy="0"/>
+          <a:chOff x="0" y="0"/>
+          <a:chExt cx="0" cy="0"/>
+        </a:xfrm>
+      </p:grpSpPr>
+      <p:pic>
+        <p:nvPicPr>
+          <p:cNvPr id="10" name="Picture 9">
+            <a:extLst>
+              <a:ext uri="{FF2B5EF4-FFF2-40B4-BE49-F238E27FC236}">
+                <a16:creationId xmlns:a16="http://schemas.microsoft.com/office/drawing/2014/main" id="{BCF66A3E-F248-4169-B6FA-5E416D7451DC}"/>
+              </a:ext>
+            </a:extLst>
+          </p:cNvPr>
+          <p:cNvPicPr>
+            <a:picLocks noChangeAspect="1"/>
+          </p:cNvPicPr>
+          <p:nvPr/>
+        </p:nvPicPr>
+        <p:blipFill>
+          <a:blip r:embed="rId3"/>
+          <a:stretch>
+            <a:fillRect/>
+          </a:stretch>
+        </p:blipFill>
+        <p:spPr>
+          <a:xfrm>
+            <a:off x="2233116" y="743878"/>
+            <a:ext cx="7725768" cy="5370244"/>
+          </a:xfrm>
+          <a:prstGeom prst="rect">
+            <a:avLst/>
+          </a:prstGeom>
+        </p:spPr>
+      </p:pic>
+      <p:sp>
+        <p:nvSpPr>
+          <p:cNvPr id="11" name="TextBox 10">
+            <a:extLst>
+              <a:ext uri="{FF2B5EF4-FFF2-40B4-BE49-F238E27FC236}">
+                <a16:creationId xmlns:a16="http://schemas.microsoft.com/office/drawing/2014/main" id="{B74C8368-9E27-4C68-8BFF-709B746502CB}"/>
+              </a:ext>
+            </a:extLst>
+          </p:cNvPr>
+          <p:cNvSpPr txBox="1"/>
+          <p:nvPr/>
+        </p:nvSpPr>
+        <p:spPr>
+          <a:xfrm>
+            <a:off x="0" y="309967"/>
+            <a:ext cx="12191999" cy="646331"/>
+          </a:xfrm>
+          <a:prstGeom prst="rect">
+            <a:avLst/>
+          </a:prstGeom>
+          <a:noFill/>
+        </p:spPr>
+        <p:txBody>
+          <a:bodyPr wrap="square" rtlCol="0">
+            <a:spAutoFit/>
+          </a:bodyPr>
+          <a:lstStyle/>
+          <a:p>
+            <a:pPr algn="ctr"/>
+            <a:r>
+              <a:rPr lang="en-US" sz="3600" dirty="0">
+                <a:solidFill>
+                  <a:schemeClr val="tx1">
+                    <a:lumMod val="75000"/>
+                    <a:lumOff val="25000"/>
+                  </a:schemeClr>
+                </a:solidFill>
+                <a:latin typeface="Avenir Next LT Pro" panose="020B0504020202020204" pitchFamily="34" charset="0"/>
+              </a:rPr>
+              <a:t>Cosine Similarity</a:t>
+            </a:r>
+          </a:p>
+        </p:txBody>
+      </p:sp>
+      <p:sp>
+        <p:nvSpPr>
+          <p:cNvPr id="4" name="TextBox 3">
+            <a:extLst>
+              <a:ext uri="{FF2B5EF4-FFF2-40B4-BE49-F238E27FC236}">
+                <a16:creationId xmlns:a16="http://schemas.microsoft.com/office/drawing/2014/main" id="{3DF683BE-614B-46D2-A7B2-4DF802B8210B}"/>
+              </a:ext>
+            </a:extLst>
+          </p:cNvPr>
+          <p:cNvSpPr txBox="1"/>
+          <p:nvPr/>
+        </p:nvSpPr>
+        <p:spPr>
+          <a:xfrm>
+            <a:off x="0" y="6550223"/>
+            <a:ext cx="12192000" cy="307777"/>
+          </a:xfrm>
+          <a:prstGeom prst="rect">
+            <a:avLst/>
+          </a:prstGeom>
+          <a:noFill/>
+        </p:spPr>
+        <p:txBody>
+          <a:bodyPr wrap="square" rtlCol="0">
+            <a:spAutoFit/>
+          </a:bodyPr>
+          <a:lstStyle/>
+          <a:p>
+            <a:r>
+              <a:rPr lang="en-US" sz="1400" dirty="0">
+                <a:solidFill>
+                  <a:schemeClr val="tx1">
+                    <a:lumMod val="65000"/>
+                    <a:lumOff val="35000"/>
+                  </a:schemeClr>
+                </a:solidFill>
+                <a:latin typeface="+mj-lt"/>
+                <a:ea typeface="Verdana" panose="020B0604030504040204" pitchFamily="34" charset="0"/>
+              </a:rPr>
+              <a:t>Source: Karani, D. (2018). Retrieved: https://towardsdatascience.com/introduction-to-word-embedding-and-word2vec-652d0c2060fa</a:t>
+            </a:r>
+          </a:p>
+        </p:txBody>
+      </p:sp>
+      <p:sp>
+        <p:nvSpPr>
+          <p:cNvPr id="5" name="TextBox 4">
+            <a:extLst>
+              <a:ext uri="{FF2B5EF4-FFF2-40B4-BE49-F238E27FC236}">
+                <a16:creationId xmlns:a16="http://schemas.microsoft.com/office/drawing/2014/main" id="{80F6812D-CC21-262F-8922-536E8E9A1DAD}"/>
+              </a:ext>
+            </a:extLst>
+          </p:cNvPr>
+          <p:cNvSpPr txBox="1"/>
+          <p:nvPr/>
+        </p:nvSpPr>
+        <p:spPr>
+          <a:xfrm>
+            <a:off x="4728407" y="1159376"/>
+            <a:ext cx="1367592" cy="461665"/>
+          </a:xfrm>
+          <a:prstGeom prst="rect">
+            <a:avLst/>
+          </a:prstGeom>
+          <a:noFill/>
+        </p:spPr>
+        <p:txBody>
+          <a:bodyPr wrap="square" rtlCol="0">
+            <a:spAutoFit/>
+          </a:bodyPr>
+          <a:lstStyle/>
+          <a:p>
+            <a:pPr algn="ctr"/>
+            <a:r>
+              <a:rPr lang="en-US" sz="2400" dirty="0">
+                <a:solidFill>
+                  <a:srgbClr val="68BA7D"/>
+                </a:solidFill>
+                <a:latin typeface="Avenir Next LT Pro" panose="020B0504020202020204" pitchFamily="34" charset="0"/>
+              </a:rPr>
+              <a:t>“Good”</a:t>
+            </a:r>
+          </a:p>
+        </p:txBody>
+      </p:sp>
+      <p:sp>
+        <p:nvSpPr>
+          <p:cNvPr id="6" name="TextBox 5">
+            <a:extLst>
+              <a:ext uri="{FF2B5EF4-FFF2-40B4-BE49-F238E27FC236}">
+                <a16:creationId xmlns:a16="http://schemas.microsoft.com/office/drawing/2014/main" id="{5E2C5F36-AADA-A613-D226-2CEFCA4436A9}"/>
+              </a:ext>
+            </a:extLst>
+          </p:cNvPr>
+          <p:cNvSpPr txBox="1"/>
+          <p:nvPr/>
+        </p:nvSpPr>
+        <p:spPr>
+          <a:xfrm>
+            <a:off x="6589292" y="4244322"/>
+            <a:ext cx="1367593" cy="461665"/>
+          </a:xfrm>
+          <a:prstGeom prst="rect">
+            <a:avLst/>
+          </a:prstGeom>
+          <a:noFill/>
+        </p:spPr>
+        <p:txBody>
+          <a:bodyPr wrap="square" rtlCol="0">
+            <a:spAutoFit/>
+          </a:bodyPr>
+          <a:lstStyle/>
+          <a:p>
+            <a:pPr algn="ctr"/>
+            <a:r>
+              <a:rPr lang="en-US" sz="2400" dirty="0">
+                <a:solidFill>
+                  <a:srgbClr val="68BA7D"/>
+                </a:solidFill>
+                <a:latin typeface="Avenir Next LT Pro" panose="020B0504020202020204" pitchFamily="34" charset="0"/>
+              </a:rPr>
+              <a:t>“Great”</a:t>
+            </a:r>
+          </a:p>
+        </p:txBody>
+      </p:sp>
+    </p:spTree>
+    <p:extLst>
+      <p:ext uri="{BB962C8B-B14F-4D97-AF65-F5344CB8AC3E}">
+        <p14:creationId xmlns:p14="http://schemas.microsoft.com/office/powerpoint/2010/main" val="323989571"/>
+      </p:ext>
+    </p:extLst>
+  </p:cSld>
+  <p:clrMapOvr>
+    <a:masterClrMapping/>
+  </p:clrMapOvr>
+  <mc:AlternateContent xmlns:mc="http://schemas.openxmlformats.org/markup-compatibility/2006" xmlns:p14="http://schemas.microsoft.com/office/powerpoint/2010/main">
+    <mc:Choice Requires="p14">
+      <p:transition spd="med" p14:dur="700">
+        <p:fade/>
+      </p:transition>
+    </mc:Choice>
+    <mc:Fallback xmlns="">
+      <p:transition spd="med">
+        <p:fade/>
+      </p:transition>
+    </mc:Fallback>
+  </mc:AlternateContent>
+  <p:timing>
+    <p:tnLst>
+      <p:par>
+        <p:cTn id="1" dur="indefinite" restart="never" nodeType="tmRoot">
+          <p:childTnLst>
+            <p:seq concurrent="1" nextAc="seek">
+              <p:cTn id="2" dur="indefinite" nodeType="mainSeq">
+                <p:childTnLst>
+                  <p:par>
+                    <p:cTn id="3" fill="hold">
+                      <p:stCondLst>
+                        <p:cond delay="indefinite"/>
+                      </p:stCondLst>
+                      <p:childTnLst>
+                        <p:par>
+                          <p:cTn id="4" fill="hold">
+                            <p:stCondLst>
+                              <p:cond delay="0"/>
+                            </p:stCondLst>
+                            <p:childTnLst>
+                              <p:par>
+                                <p:cTn id="5" presetID="10" presetClass="entr" presetSubtype="0" fill="hold" grpId="0" nodeType="clickEffect">
+                                  <p:stCondLst>
+                                    <p:cond delay="0"/>
+                                  </p:stCondLst>
+                                  <p:childTnLst>
+                                    <p:set>
+                                      <p:cBhvr>
+                                        <p:cTn id="6" dur="1" fill="hold">
+                                          <p:stCondLst>
+                                            <p:cond delay="0"/>
+                                          </p:stCondLst>
+                                        </p:cTn>
+                                        <p:tgtEl>
+                                          <p:spTgt spid="5"/>
+                                        </p:tgtEl>
+                                        <p:attrNameLst>
+                                          <p:attrName>style.visibility</p:attrName>
+                                        </p:attrNameLst>
+                                      </p:cBhvr>
+                                      <p:to>
+                                        <p:strVal val="visible"/>
+                                      </p:to>
+                                    </p:set>
+                                    <p:animEffect transition="in" filter="fade">
+                                      <p:cBhvr>
+                                        <p:cTn id="7" dur="500"/>
+                                        <p:tgtEl>
+                                          <p:spTgt spid="5"/>
+                                        </p:tgtEl>
+                                      </p:cBhvr>
+                                    </p:animEffect>
+                                  </p:childTnLst>
+                                </p:cTn>
+                              </p:par>
+                            </p:childTnLst>
+                          </p:cTn>
+                        </p:par>
+                      </p:childTnLst>
+                    </p:cTn>
+                  </p:par>
+                  <p:par>
+                    <p:cTn id="8" fill="hold">
+                      <p:stCondLst>
+                        <p:cond delay="indefinite"/>
+                      </p:stCondLst>
+                      <p:childTnLst>
+                        <p:par>
+                          <p:cTn id="9" fill="hold">
+                            <p:stCondLst>
+                              <p:cond delay="0"/>
+                            </p:stCondLst>
+                            <p:childTnLst>
+                              <p:par>
+                                <p:cTn id="10" presetID="10" presetClass="entr" presetSubtype="0" fill="hold" grpId="0" nodeType="clickEffect">
+                                  <p:stCondLst>
+                                    <p:cond delay="0"/>
+                                  </p:stCondLst>
+                                  <p:childTnLst>
+                                    <p:set>
+                                      <p:cBhvr>
+                                        <p:cTn id="11" dur="1" fill="hold">
+                                          <p:stCondLst>
+                                            <p:cond delay="0"/>
+                                          </p:stCondLst>
+                                        </p:cTn>
+                                        <p:tgtEl>
+                                          <p:spTgt spid="6"/>
+                                        </p:tgtEl>
+                                        <p:attrNameLst>
+                                          <p:attrName>style.visibility</p:attrName>
+                                        </p:attrNameLst>
+                                      </p:cBhvr>
+                                      <p:to>
+                                        <p:strVal val="visible"/>
+                                      </p:to>
+                                    </p:set>
+                                    <p:animEffect transition="in" filter="fade">
+                                      <p:cBhvr>
+                                        <p:cTn id="12" dur="500"/>
+                                        <p:tgtEl>
+                                          <p:spTgt spid="6"/>
+                                        </p:tgtEl>
+                                      </p:cBhvr>
+                                    </p:animEffect>
+                                  </p:childTnLst>
+                                </p:cTn>
+                              </p:par>
+                            </p:childTnLst>
+                          </p:cTn>
+                        </p:par>
+                      </p:childTnLst>
+                    </p:cTn>
+                  </p:par>
+                </p:childTnLst>
+              </p:cTn>
+              <p:prevCondLst>
+                <p:cond evt="onPrev" delay="0">
+                  <p:tgtEl>
+                    <p:sldTgt/>
+                  </p:tgtEl>
+                </p:cond>
+              </p:prevCondLst>
+              <p:nextCondLst>
+                <p:cond evt="onNext" delay="0">
+                  <p:tgtEl>
+                    <p:sldTgt/>
+                  </p:tgtEl>
+                </p:cond>
+              </p:nextCondLst>
+            </p:seq>
+          </p:childTnLst>
+        </p:cTn>
+      </p:par>
+    </p:tnLst>
+    <p:bldLst>
+      <p:bldP spid="5" grpId="0"/>
+      <p:bldP spid="6" grpId="0"/>
+    </p:bldLst>
+  </p:timing>
 </p:sld>
 </file>
 
@@ -10710,774 +10855,196 @@
           <a:chExt cx="0" cy="0"/>
         </a:xfrm>
       </p:grpSpPr>
-      <p:sp>
-        <p:nvSpPr>
-          <p:cNvPr id="2" name="Title 1">
+      <p:pic>
+        <p:nvPicPr>
+          <p:cNvPr id="1026" name="Picture 2" descr="F20001">
             <a:extLst>
               <a:ext uri="{FF2B5EF4-FFF2-40B4-BE49-F238E27FC236}">
-                <a16:creationId xmlns:a16="http://schemas.microsoft.com/office/drawing/2014/main" id="{0E138177-E2EE-ACAC-A57C-F03FA29EC836}"/>
+                <a16:creationId xmlns:a16="http://schemas.microsoft.com/office/drawing/2014/main" id="{EA5D6BAF-10A3-4BA7-991F-B8293661AC91}"/>
               </a:ext>
             </a:extLst>
           </p:cNvPr>
-          <p:cNvSpPr>
-            <a:spLocks noGrp="1"/>
-          </p:cNvSpPr>
-          <p:nvPr>
-            <p:ph type="title"/>
-          </p:nvPr>
-        </p:nvSpPr>
-        <p:spPr/>
-        <p:txBody>
-          <a:bodyPr/>
-          <a:lstStyle/>
-          <a:p>
-            <a:r>
-              <a:rPr lang="en-US" dirty="0">
-                <a:solidFill>
-                  <a:schemeClr val="tx1">
-                    <a:lumMod val="75000"/>
-                    <a:lumOff val="25000"/>
-                  </a:schemeClr>
-                </a:solidFill>
-                <a:latin typeface="Palatino Linotype" panose="02040502050505030304" pitchFamily="18" charset="0"/>
-              </a:rPr>
-              <a:t>Lesson Overview</a:t>
-            </a:r>
-          </a:p>
-        </p:txBody>
-      </p:sp>
-      <p:sp>
-        <p:nvSpPr>
-          <p:cNvPr id="3" name="Content Placeholder 2">
+          <p:cNvPicPr>
+            <a:picLocks noChangeAspect="1" noChangeArrowheads="1"/>
+          </p:cNvPicPr>
+          <p:nvPr/>
+        </p:nvPicPr>
+        <p:blipFill>
+          <a:blip r:embed="rId3">
             <a:extLst>
-              <a:ext uri="{FF2B5EF4-FFF2-40B4-BE49-F238E27FC236}">
-                <a16:creationId xmlns:a16="http://schemas.microsoft.com/office/drawing/2014/main" id="{8626DB86-54B4-A1E2-6C25-C049F364ED25}"/>
+              <a:ext uri="{28A0092B-C50C-407E-A947-70E740481C1C}">
+                <a14:useLocalDpi xmlns:a14="http://schemas.microsoft.com/office/drawing/2010/main" val="0"/>
               </a:ext>
             </a:extLst>
-          </p:cNvPr>
-          <p:cNvSpPr>
-            <a:spLocks noGrp="1"/>
-          </p:cNvSpPr>
-          <p:nvPr>
-            <p:ph idx="1"/>
-          </p:nvPr>
-        </p:nvSpPr>
-        <p:spPr>
+          </a:blip>
+          <a:srcRect/>
+          <a:stretch>
+            <a:fillRect/>
+          </a:stretch>
+        </p:blipFill>
+        <p:spPr bwMode="auto">
           <a:xfrm>
-            <a:off x="1013564" y="1825626"/>
-            <a:ext cx="10515600" cy="504215"/>
-          </a:xfrm>
-        </p:spPr>
-        <p:txBody>
-          <a:bodyPr/>
-          <a:lstStyle/>
-          <a:p>
-            <a:pPr>
-              <a:buFont typeface="Wingdings" panose="05000000000000000000" pitchFamily="2" charset="2"/>
-              <a:buChar char="Ø"/>
-            </a:pPr>
-            <a:r>
-              <a:rPr lang="en-US" dirty="0">
-                <a:solidFill>
-                  <a:schemeClr val="tx1">
-                    <a:lumMod val="75000"/>
-                    <a:lumOff val="25000"/>
-                  </a:schemeClr>
-                </a:solidFill>
-              </a:rPr>
-              <a:t> </a:t>
-            </a:r>
-            <a:r>
-              <a:rPr lang="en-US" dirty="0">
-                <a:solidFill>
-                  <a:schemeClr val="tx1">
-                    <a:lumMod val="75000"/>
-                    <a:lumOff val="25000"/>
-                  </a:schemeClr>
-                </a:solidFill>
-                <a:latin typeface="Palatino Linotype" panose="02040502050505030304" pitchFamily="18" charset="0"/>
-              </a:rPr>
-              <a:t>Learning Objective 1</a:t>
-            </a:r>
-          </a:p>
-        </p:txBody>
-      </p:sp>
-      <p:sp>
-        <p:nvSpPr>
-          <p:cNvPr id="5" name="Content Placeholder 2">
-            <a:extLst>
-              <a:ext uri="{FF2B5EF4-FFF2-40B4-BE49-F238E27FC236}">
-                <a16:creationId xmlns:a16="http://schemas.microsoft.com/office/drawing/2014/main" id="{7070644F-62DF-8674-4A8A-C2FA1554028E}"/>
-              </a:ext>
-            </a:extLst>
-          </p:cNvPr>
-          <p:cNvSpPr txBox="1">
-            <a:spLocks/>
-          </p:cNvSpPr>
-          <p:nvPr/>
-        </p:nvSpPr>
-        <p:spPr>
-          <a:xfrm>
-            <a:off x="1013564" y="2464778"/>
-            <a:ext cx="10515600" cy="504215"/>
+            <a:off x="2790825" y="704850"/>
+            <a:ext cx="6610350" cy="5448300"/>
           </a:xfrm>
           <a:prstGeom prst="rect">
             <a:avLst/>
           </a:prstGeom>
+          <a:noFill/>
+          <a:extLst>
+            <a:ext uri="{909E8E84-426E-40DD-AFC4-6F175D3DCCD1}">
+              <a14:hiddenFill xmlns:a14="http://schemas.microsoft.com/office/drawing/2010/main">
+                <a:solidFill>
+                  <a:srgbClr val="FFFFFF"/>
+                </a:solidFill>
+              </a14:hiddenFill>
+            </a:ext>
+          </a:extLst>
         </p:spPr>
-        <p:txBody>
-          <a:bodyPr vert="horz" lIns="91440" tIns="45720" rIns="91440" bIns="45720" rtlCol="0">
-            <a:normAutofit/>
-          </a:bodyPr>
-          <a:lstStyle>
-            <a:lvl1pPr marL="228600" indent="-228600" algn="l" defTabSz="914400" rtl="0" eaLnBrk="1" latinLnBrk="0" hangingPunct="1">
-              <a:lnSpc>
-                <a:spcPct val="90000"/>
-              </a:lnSpc>
-              <a:spcBef>
-                <a:spcPts val="1000"/>
-              </a:spcBef>
-              <a:buFont typeface="Arial" panose="020B0604020202020204" pitchFamily="34" charset="0"/>
-              <a:buChar char="•"/>
-              <a:defRPr sz="2800" kern="1200">
-                <a:solidFill>
-                  <a:schemeClr val="tx1"/>
-                </a:solidFill>
-                <a:latin typeface="+mn-lt"/>
-                <a:ea typeface="+mn-ea"/>
-                <a:cs typeface="+mn-cs"/>
-              </a:defRPr>
-            </a:lvl1pPr>
-            <a:lvl2pPr marL="685800" indent="-228600" algn="l" defTabSz="914400" rtl="0" eaLnBrk="1" latinLnBrk="0" hangingPunct="1">
-              <a:lnSpc>
-                <a:spcPct val="90000"/>
-              </a:lnSpc>
-              <a:spcBef>
-                <a:spcPts val="500"/>
-              </a:spcBef>
-              <a:buFont typeface="Arial" panose="020B0604020202020204" pitchFamily="34" charset="0"/>
-              <a:buChar char="•"/>
-              <a:defRPr sz="2400" kern="1200">
-                <a:solidFill>
-                  <a:schemeClr val="tx1"/>
-                </a:solidFill>
-                <a:latin typeface="+mn-lt"/>
-                <a:ea typeface="+mn-ea"/>
-                <a:cs typeface="+mn-cs"/>
-              </a:defRPr>
-            </a:lvl2pPr>
-            <a:lvl3pPr marL="1143000" indent="-228600" algn="l" defTabSz="914400" rtl="0" eaLnBrk="1" latinLnBrk="0" hangingPunct="1">
-              <a:lnSpc>
-                <a:spcPct val="90000"/>
-              </a:lnSpc>
-              <a:spcBef>
-                <a:spcPts val="500"/>
-              </a:spcBef>
-              <a:buFont typeface="Arial" panose="020B0604020202020204" pitchFamily="34" charset="0"/>
-              <a:buChar char="•"/>
-              <a:defRPr sz="2000" kern="1200">
-                <a:solidFill>
-                  <a:schemeClr val="tx1"/>
-                </a:solidFill>
-                <a:latin typeface="+mn-lt"/>
-                <a:ea typeface="+mn-ea"/>
-                <a:cs typeface="+mn-cs"/>
-              </a:defRPr>
-            </a:lvl3pPr>
-            <a:lvl4pPr marL="1600200" indent="-228600" algn="l" defTabSz="914400" rtl="0" eaLnBrk="1" latinLnBrk="0" hangingPunct="1">
-              <a:lnSpc>
-                <a:spcPct val="90000"/>
-              </a:lnSpc>
-              <a:spcBef>
-                <a:spcPts val="500"/>
-              </a:spcBef>
-              <a:buFont typeface="Arial" panose="020B0604020202020204" pitchFamily="34" charset="0"/>
-              <a:buChar char="•"/>
-              <a:defRPr sz="1800" kern="1200">
-                <a:solidFill>
-                  <a:schemeClr val="tx1"/>
-                </a:solidFill>
-                <a:latin typeface="+mn-lt"/>
-                <a:ea typeface="+mn-ea"/>
-                <a:cs typeface="+mn-cs"/>
-              </a:defRPr>
-            </a:lvl4pPr>
-            <a:lvl5pPr marL="2057400" indent="-228600" algn="l" defTabSz="914400" rtl="0" eaLnBrk="1" latinLnBrk="0" hangingPunct="1">
-              <a:lnSpc>
-                <a:spcPct val="90000"/>
-              </a:lnSpc>
-              <a:spcBef>
-                <a:spcPts val="500"/>
-              </a:spcBef>
-              <a:buFont typeface="Arial" panose="020B0604020202020204" pitchFamily="34" charset="0"/>
-              <a:buChar char="•"/>
-              <a:defRPr sz="1800" kern="1200">
-                <a:solidFill>
-                  <a:schemeClr val="tx1"/>
-                </a:solidFill>
-                <a:latin typeface="+mn-lt"/>
-                <a:ea typeface="+mn-ea"/>
-                <a:cs typeface="+mn-cs"/>
-              </a:defRPr>
-            </a:lvl5pPr>
-            <a:lvl6pPr marL="2514600" indent="-228600" algn="l" defTabSz="914400" rtl="0" eaLnBrk="1" latinLnBrk="0" hangingPunct="1">
-              <a:lnSpc>
-                <a:spcPct val="90000"/>
-              </a:lnSpc>
-              <a:spcBef>
-                <a:spcPts val="500"/>
-              </a:spcBef>
-              <a:buFont typeface="Arial" panose="020B0604020202020204" pitchFamily="34" charset="0"/>
-              <a:buChar char="•"/>
-              <a:defRPr sz="1800" kern="1200">
-                <a:solidFill>
-                  <a:schemeClr val="tx1"/>
-                </a:solidFill>
-                <a:latin typeface="+mn-lt"/>
-                <a:ea typeface="+mn-ea"/>
-                <a:cs typeface="+mn-cs"/>
-              </a:defRPr>
-            </a:lvl6pPr>
-            <a:lvl7pPr marL="2971800" indent="-228600" algn="l" defTabSz="914400" rtl="0" eaLnBrk="1" latinLnBrk="0" hangingPunct="1">
-              <a:lnSpc>
-                <a:spcPct val="90000"/>
-              </a:lnSpc>
-              <a:spcBef>
-                <a:spcPts val="500"/>
-              </a:spcBef>
-              <a:buFont typeface="Arial" panose="020B0604020202020204" pitchFamily="34" charset="0"/>
-              <a:buChar char="•"/>
-              <a:defRPr sz="1800" kern="1200">
-                <a:solidFill>
-                  <a:schemeClr val="tx1"/>
-                </a:solidFill>
-                <a:latin typeface="+mn-lt"/>
-                <a:ea typeface="+mn-ea"/>
-                <a:cs typeface="+mn-cs"/>
-              </a:defRPr>
-            </a:lvl7pPr>
-            <a:lvl8pPr marL="3429000" indent="-228600" algn="l" defTabSz="914400" rtl="0" eaLnBrk="1" latinLnBrk="0" hangingPunct="1">
-              <a:lnSpc>
-                <a:spcPct val="90000"/>
-              </a:lnSpc>
-              <a:spcBef>
-                <a:spcPts val="500"/>
-              </a:spcBef>
-              <a:buFont typeface="Arial" panose="020B0604020202020204" pitchFamily="34" charset="0"/>
-              <a:buChar char="•"/>
-              <a:defRPr sz="1800" kern="1200">
-                <a:solidFill>
-                  <a:schemeClr val="tx1"/>
-                </a:solidFill>
-                <a:latin typeface="+mn-lt"/>
-                <a:ea typeface="+mn-ea"/>
-                <a:cs typeface="+mn-cs"/>
-              </a:defRPr>
-            </a:lvl8pPr>
-            <a:lvl9pPr marL="3886200" indent="-228600" algn="l" defTabSz="914400" rtl="0" eaLnBrk="1" latinLnBrk="0" hangingPunct="1">
-              <a:lnSpc>
-                <a:spcPct val="90000"/>
-              </a:lnSpc>
-              <a:spcBef>
-                <a:spcPts val="500"/>
-              </a:spcBef>
-              <a:buFont typeface="Arial" panose="020B0604020202020204" pitchFamily="34" charset="0"/>
-              <a:buChar char="•"/>
-              <a:defRPr sz="1800" kern="1200">
-                <a:solidFill>
-                  <a:schemeClr val="tx1"/>
-                </a:solidFill>
-                <a:latin typeface="+mn-lt"/>
-                <a:ea typeface="+mn-ea"/>
-                <a:cs typeface="+mn-cs"/>
-              </a:defRPr>
-            </a:lvl9pPr>
-          </a:lstStyle>
-          <a:p>
-            <a:pPr>
-              <a:buFont typeface="Wingdings" panose="05000000000000000000" pitchFamily="2" charset="2"/>
-              <a:buChar char="Ø"/>
-            </a:pPr>
-            <a:r>
-              <a:rPr lang="en-US" dirty="0">
-                <a:solidFill>
-                  <a:schemeClr val="tx1">
-                    <a:lumMod val="75000"/>
-                    <a:lumOff val="25000"/>
-                  </a:schemeClr>
-                </a:solidFill>
-              </a:rPr>
-              <a:t> </a:t>
-            </a:r>
-            <a:r>
-              <a:rPr lang="en-US" dirty="0">
-                <a:solidFill>
-                  <a:schemeClr val="tx1">
-                    <a:lumMod val="75000"/>
-                    <a:lumOff val="25000"/>
-                  </a:schemeClr>
-                </a:solidFill>
-                <a:latin typeface="Palatino Linotype" panose="02040502050505030304" pitchFamily="18" charset="0"/>
-              </a:rPr>
-              <a:t>Learning Objective 1</a:t>
-            </a:r>
-          </a:p>
-        </p:txBody>
-      </p:sp>
-      <p:sp>
-        <p:nvSpPr>
-          <p:cNvPr id="6" name="Content Placeholder 2">
+      </p:pic>
+      <p:sp>
+        <p:nvSpPr>
+          <p:cNvPr id="6" name="TextBox 5">
             <a:extLst>
               <a:ext uri="{FF2B5EF4-FFF2-40B4-BE49-F238E27FC236}">
-                <a16:creationId xmlns:a16="http://schemas.microsoft.com/office/drawing/2014/main" id="{FF2490E1-D7A0-7027-6DCC-60BB6819CD9E}"/>
+                <a16:creationId xmlns:a16="http://schemas.microsoft.com/office/drawing/2014/main" id="{F3901A42-F1D9-442B-946D-F8D2306CFE56}"/>
               </a:ext>
             </a:extLst>
           </p:cNvPr>
-          <p:cNvSpPr txBox="1">
-            <a:spLocks/>
-          </p:cNvSpPr>
+          <p:cNvSpPr txBox="1"/>
           <p:nvPr/>
         </p:nvSpPr>
         <p:spPr>
           <a:xfrm>
-            <a:off x="1013564" y="3103930"/>
-            <a:ext cx="10515600" cy="504215"/>
+            <a:off x="0" y="6550223"/>
+            <a:ext cx="12192000" cy="307777"/>
           </a:xfrm>
           <a:prstGeom prst="rect">
             <a:avLst/>
           </a:prstGeom>
+          <a:noFill/>
         </p:spPr>
         <p:txBody>
-          <a:bodyPr vert="horz" lIns="91440" tIns="45720" rIns="91440" bIns="45720" rtlCol="0">
-            <a:normAutofit/>
+          <a:bodyPr wrap="square" rtlCol="0">
+            <a:spAutoFit/>
           </a:bodyPr>
-          <a:lstStyle>
-            <a:lvl1pPr marL="228600" indent="-228600" algn="l" defTabSz="914400" rtl="0" eaLnBrk="1" latinLnBrk="0" hangingPunct="1">
-              <a:lnSpc>
-                <a:spcPct val="90000"/>
-              </a:lnSpc>
-              <a:spcBef>
-                <a:spcPts val="1000"/>
-              </a:spcBef>
-              <a:buFont typeface="Arial" panose="020B0604020202020204" pitchFamily="34" charset="0"/>
-              <a:buChar char="•"/>
-              <a:defRPr sz="2800" kern="1200">
-                <a:solidFill>
-                  <a:schemeClr val="tx1"/>
-                </a:solidFill>
-                <a:latin typeface="+mn-lt"/>
-                <a:ea typeface="+mn-ea"/>
-                <a:cs typeface="+mn-cs"/>
-              </a:defRPr>
-            </a:lvl1pPr>
-            <a:lvl2pPr marL="685800" indent="-228600" algn="l" defTabSz="914400" rtl="0" eaLnBrk="1" latinLnBrk="0" hangingPunct="1">
-              <a:lnSpc>
-                <a:spcPct val="90000"/>
-              </a:lnSpc>
-              <a:spcBef>
-                <a:spcPts val="500"/>
-              </a:spcBef>
-              <a:buFont typeface="Arial" panose="020B0604020202020204" pitchFamily="34" charset="0"/>
-              <a:buChar char="•"/>
-              <a:defRPr sz="2400" kern="1200">
-                <a:solidFill>
-                  <a:schemeClr val="tx1"/>
-                </a:solidFill>
-                <a:latin typeface="+mn-lt"/>
-                <a:ea typeface="+mn-ea"/>
-                <a:cs typeface="+mn-cs"/>
-              </a:defRPr>
-            </a:lvl2pPr>
-            <a:lvl3pPr marL="1143000" indent="-228600" algn="l" defTabSz="914400" rtl="0" eaLnBrk="1" latinLnBrk="0" hangingPunct="1">
-              <a:lnSpc>
-                <a:spcPct val="90000"/>
-              </a:lnSpc>
-              <a:spcBef>
-                <a:spcPts val="500"/>
-              </a:spcBef>
-              <a:buFont typeface="Arial" panose="020B0604020202020204" pitchFamily="34" charset="0"/>
-              <a:buChar char="•"/>
-              <a:defRPr sz="2000" kern="1200">
-                <a:solidFill>
-                  <a:schemeClr val="tx1"/>
-                </a:solidFill>
-                <a:latin typeface="+mn-lt"/>
-                <a:ea typeface="+mn-ea"/>
-                <a:cs typeface="+mn-cs"/>
-              </a:defRPr>
-            </a:lvl3pPr>
-            <a:lvl4pPr marL="1600200" indent="-228600" algn="l" defTabSz="914400" rtl="0" eaLnBrk="1" latinLnBrk="0" hangingPunct="1">
-              <a:lnSpc>
-                <a:spcPct val="90000"/>
-              </a:lnSpc>
-              <a:spcBef>
-                <a:spcPts val="500"/>
-              </a:spcBef>
-              <a:buFont typeface="Arial" panose="020B0604020202020204" pitchFamily="34" charset="0"/>
-              <a:buChar char="•"/>
-              <a:defRPr sz="1800" kern="1200">
-                <a:solidFill>
-                  <a:schemeClr val="tx1"/>
-                </a:solidFill>
-                <a:latin typeface="+mn-lt"/>
-                <a:ea typeface="+mn-ea"/>
-                <a:cs typeface="+mn-cs"/>
-              </a:defRPr>
-            </a:lvl4pPr>
-            <a:lvl5pPr marL="2057400" indent="-228600" algn="l" defTabSz="914400" rtl="0" eaLnBrk="1" latinLnBrk="0" hangingPunct="1">
-              <a:lnSpc>
-                <a:spcPct val="90000"/>
-              </a:lnSpc>
-              <a:spcBef>
-                <a:spcPts val="500"/>
-              </a:spcBef>
-              <a:buFont typeface="Arial" panose="020B0604020202020204" pitchFamily="34" charset="0"/>
-              <a:buChar char="•"/>
-              <a:defRPr sz="1800" kern="1200">
-                <a:solidFill>
-                  <a:schemeClr val="tx1"/>
-                </a:solidFill>
-                <a:latin typeface="+mn-lt"/>
-                <a:ea typeface="+mn-ea"/>
-                <a:cs typeface="+mn-cs"/>
-              </a:defRPr>
-            </a:lvl5pPr>
-            <a:lvl6pPr marL="2514600" indent="-228600" algn="l" defTabSz="914400" rtl="0" eaLnBrk="1" latinLnBrk="0" hangingPunct="1">
-              <a:lnSpc>
-                <a:spcPct val="90000"/>
-              </a:lnSpc>
-              <a:spcBef>
-                <a:spcPts val="500"/>
-              </a:spcBef>
-              <a:buFont typeface="Arial" panose="020B0604020202020204" pitchFamily="34" charset="0"/>
-              <a:buChar char="•"/>
-              <a:defRPr sz="1800" kern="1200">
-                <a:solidFill>
-                  <a:schemeClr val="tx1"/>
-                </a:solidFill>
-                <a:latin typeface="+mn-lt"/>
-                <a:ea typeface="+mn-ea"/>
-                <a:cs typeface="+mn-cs"/>
-              </a:defRPr>
-            </a:lvl6pPr>
-            <a:lvl7pPr marL="2971800" indent="-228600" algn="l" defTabSz="914400" rtl="0" eaLnBrk="1" latinLnBrk="0" hangingPunct="1">
-              <a:lnSpc>
-                <a:spcPct val="90000"/>
-              </a:lnSpc>
-              <a:spcBef>
-                <a:spcPts val="500"/>
-              </a:spcBef>
-              <a:buFont typeface="Arial" panose="020B0604020202020204" pitchFamily="34" charset="0"/>
-              <a:buChar char="•"/>
-              <a:defRPr sz="1800" kern="1200">
-                <a:solidFill>
-                  <a:schemeClr val="tx1"/>
-                </a:solidFill>
-                <a:latin typeface="+mn-lt"/>
-                <a:ea typeface="+mn-ea"/>
-                <a:cs typeface="+mn-cs"/>
-              </a:defRPr>
-            </a:lvl7pPr>
-            <a:lvl8pPr marL="3429000" indent="-228600" algn="l" defTabSz="914400" rtl="0" eaLnBrk="1" latinLnBrk="0" hangingPunct="1">
-              <a:lnSpc>
-                <a:spcPct val="90000"/>
-              </a:lnSpc>
-              <a:spcBef>
-                <a:spcPts val="500"/>
-              </a:spcBef>
-              <a:buFont typeface="Arial" panose="020B0604020202020204" pitchFamily="34" charset="0"/>
-              <a:buChar char="•"/>
-              <a:defRPr sz="1800" kern="1200">
-                <a:solidFill>
-                  <a:schemeClr val="tx1"/>
-                </a:solidFill>
-                <a:latin typeface="+mn-lt"/>
-                <a:ea typeface="+mn-ea"/>
-                <a:cs typeface="+mn-cs"/>
-              </a:defRPr>
-            </a:lvl8pPr>
-            <a:lvl9pPr marL="3886200" indent="-228600" algn="l" defTabSz="914400" rtl="0" eaLnBrk="1" latinLnBrk="0" hangingPunct="1">
-              <a:lnSpc>
-                <a:spcPct val="90000"/>
-              </a:lnSpc>
-              <a:spcBef>
-                <a:spcPts val="500"/>
-              </a:spcBef>
-              <a:buFont typeface="Arial" panose="020B0604020202020204" pitchFamily="34" charset="0"/>
-              <a:buChar char="•"/>
-              <a:defRPr sz="1800" kern="1200">
-                <a:solidFill>
-                  <a:schemeClr val="tx1"/>
-                </a:solidFill>
-                <a:latin typeface="+mn-lt"/>
-                <a:ea typeface="+mn-ea"/>
-                <a:cs typeface="+mn-cs"/>
-              </a:defRPr>
-            </a:lvl9pPr>
-          </a:lstStyle>
-          <a:p>
-            <a:pPr>
-              <a:buFont typeface="Wingdings" panose="05000000000000000000" pitchFamily="2" charset="2"/>
-              <a:buChar char="Ø"/>
-            </a:pPr>
-            <a:r>
-              <a:rPr lang="en-US" dirty="0">
-                <a:solidFill>
-                  <a:schemeClr val="tx1">
-                    <a:lumMod val="75000"/>
-                    <a:lumOff val="25000"/>
-                  </a:schemeClr>
-                </a:solidFill>
-              </a:rPr>
-              <a:t> </a:t>
-            </a:r>
-            <a:r>
-              <a:rPr lang="en-US" dirty="0">
-                <a:solidFill>
-                  <a:schemeClr val="tx1">
-                    <a:lumMod val="75000"/>
-                    <a:lumOff val="25000"/>
-                  </a:schemeClr>
-                </a:solidFill>
-                <a:latin typeface="Palatino Linotype" panose="02040502050505030304" pitchFamily="18" charset="0"/>
-              </a:rPr>
-              <a:t>Learning Objective 1</a:t>
-            </a:r>
-          </a:p>
-        </p:txBody>
-      </p:sp>
-      <p:sp>
-        <p:nvSpPr>
-          <p:cNvPr id="7" name="Content Placeholder 2">
-            <a:extLst>
-              <a:ext uri="{FF2B5EF4-FFF2-40B4-BE49-F238E27FC236}">
-                <a16:creationId xmlns:a16="http://schemas.microsoft.com/office/drawing/2014/main" id="{6D3279E5-D518-B484-9FCF-B12663A4E8FF}"/>
-              </a:ext>
-            </a:extLst>
-          </p:cNvPr>
-          <p:cNvSpPr txBox="1">
-            <a:spLocks/>
-          </p:cNvSpPr>
-          <p:nvPr/>
-        </p:nvSpPr>
-        <p:spPr>
-          <a:xfrm>
-            <a:off x="1013564" y="3743082"/>
-            <a:ext cx="10515600" cy="504215"/>
-          </a:xfrm>
-          <a:prstGeom prst="rect">
-            <a:avLst/>
-          </a:prstGeom>
-        </p:spPr>
-        <p:txBody>
-          <a:bodyPr vert="horz" lIns="91440" tIns="45720" rIns="91440" bIns="45720" rtlCol="0">
-            <a:normAutofit/>
-          </a:bodyPr>
-          <a:lstStyle>
-            <a:lvl1pPr marL="228600" indent="-228600" algn="l" defTabSz="914400" rtl="0" eaLnBrk="1" latinLnBrk="0" hangingPunct="1">
-              <a:lnSpc>
-                <a:spcPct val="90000"/>
-              </a:lnSpc>
-              <a:spcBef>
-                <a:spcPts val="1000"/>
-              </a:spcBef>
-              <a:buFont typeface="Arial" panose="020B0604020202020204" pitchFamily="34" charset="0"/>
-              <a:buChar char="•"/>
-              <a:defRPr sz="2800" kern="1200">
-                <a:solidFill>
-                  <a:schemeClr val="tx1"/>
-                </a:solidFill>
-                <a:latin typeface="+mn-lt"/>
-                <a:ea typeface="+mn-ea"/>
-                <a:cs typeface="+mn-cs"/>
-              </a:defRPr>
-            </a:lvl1pPr>
-            <a:lvl2pPr marL="685800" indent="-228600" algn="l" defTabSz="914400" rtl="0" eaLnBrk="1" latinLnBrk="0" hangingPunct="1">
-              <a:lnSpc>
-                <a:spcPct val="90000"/>
-              </a:lnSpc>
-              <a:spcBef>
-                <a:spcPts val="500"/>
-              </a:spcBef>
-              <a:buFont typeface="Arial" panose="020B0604020202020204" pitchFamily="34" charset="0"/>
-              <a:buChar char="•"/>
-              <a:defRPr sz="2400" kern="1200">
-                <a:solidFill>
-                  <a:schemeClr val="tx1"/>
-                </a:solidFill>
-                <a:latin typeface="+mn-lt"/>
-                <a:ea typeface="+mn-ea"/>
-                <a:cs typeface="+mn-cs"/>
-              </a:defRPr>
-            </a:lvl2pPr>
-            <a:lvl3pPr marL="1143000" indent="-228600" algn="l" defTabSz="914400" rtl="0" eaLnBrk="1" latinLnBrk="0" hangingPunct="1">
-              <a:lnSpc>
-                <a:spcPct val="90000"/>
-              </a:lnSpc>
-              <a:spcBef>
-                <a:spcPts val="500"/>
-              </a:spcBef>
-              <a:buFont typeface="Arial" panose="020B0604020202020204" pitchFamily="34" charset="0"/>
-              <a:buChar char="•"/>
-              <a:defRPr sz="2000" kern="1200">
-                <a:solidFill>
-                  <a:schemeClr val="tx1"/>
-                </a:solidFill>
-                <a:latin typeface="+mn-lt"/>
-                <a:ea typeface="+mn-ea"/>
-                <a:cs typeface="+mn-cs"/>
-              </a:defRPr>
-            </a:lvl3pPr>
-            <a:lvl4pPr marL="1600200" indent="-228600" algn="l" defTabSz="914400" rtl="0" eaLnBrk="1" latinLnBrk="0" hangingPunct="1">
-              <a:lnSpc>
-                <a:spcPct val="90000"/>
-              </a:lnSpc>
-              <a:spcBef>
-                <a:spcPts val="500"/>
-              </a:spcBef>
-              <a:buFont typeface="Arial" panose="020B0604020202020204" pitchFamily="34" charset="0"/>
-              <a:buChar char="•"/>
-              <a:defRPr sz="1800" kern="1200">
-                <a:solidFill>
-                  <a:schemeClr val="tx1"/>
-                </a:solidFill>
-                <a:latin typeface="+mn-lt"/>
-                <a:ea typeface="+mn-ea"/>
-                <a:cs typeface="+mn-cs"/>
-              </a:defRPr>
-            </a:lvl4pPr>
-            <a:lvl5pPr marL="2057400" indent="-228600" algn="l" defTabSz="914400" rtl="0" eaLnBrk="1" latinLnBrk="0" hangingPunct="1">
-              <a:lnSpc>
-                <a:spcPct val="90000"/>
-              </a:lnSpc>
-              <a:spcBef>
-                <a:spcPts val="500"/>
-              </a:spcBef>
-              <a:buFont typeface="Arial" panose="020B0604020202020204" pitchFamily="34" charset="0"/>
-              <a:buChar char="•"/>
-              <a:defRPr sz="1800" kern="1200">
-                <a:solidFill>
-                  <a:schemeClr val="tx1"/>
-                </a:solidFill>
-                <a:latin typeface="+mn-lt"/>
-                <a:ea typeface="+mn-ea"/>
-                <a:cs typeface="+mn-cs"/>
-              </a:defRPr>
-            </a:lvl5pPr>
-            <a:lvl6pPr marL="2514600" indent="-228600" algn="l" defTabSz="914400" rtl="0" eaLnBrk="1" latinLnBrk="0" hangingPunct="1">
-              <a:lnSpc>
-                <a:spcPct val="90000"/>
-              </a:lnSpc>
-              <a:spcBef>
-                <a:spcPts val="500"/>
-              </a:spcBef>
-              <a:buFont typeface="Arial" panose="020B0604020202020204" pitchFamily="34" charset="0"/>
-              <a:buChar char="•"/>
-              <a:defRPr sz="1800" kern="1200">
-                <a:solidFill>
-                  <a:schemeClr val="tx1"/>
-                </a:solidFill>
-                <a:latin typeface="+mn-lt"/>
-                <a:ea typeface="+mn-ea"/>
-                <a:cs typeface="+mn-cs"/>
-              </a:defRPr>
-            </a:lvl6pPr>
-            <a:lvl7pPr marL="2971800" indent="-228600" algn="l" defTabSz="914400" rtl="0" eaLnBrk="1" latinLnBrk="0" hangingPunct="1">
-              <a:lnSpc>
-                <a:spcPct val="90000"/>
-              </a:lnSpc>
-              <a:spcBef>
-                <a:spcPts val="500"/>
-              </a:spcBef>
-              <a:buFont typeface="Arial" panose="020B0604020202020204" pitchFamily="34" charset="0"/>
-              <a:buChar char="•"/>
-              <a:defRPr sz="1800" kern="1200">
-                <a:solidFill>
-                  <a:schemeClr val="tx1"/>
-                </a:solidFill>
-                <a:latin typeface="+mn-lt"/>
-                <a:ea typeface="+mn-ea"/>
-                <a:cs typeface="+mn-cs"/>
-              </a:defRPr>
-            </a:lvl7pPr>
-            <a:lvl8pPr marL="3429000" indent="-228600" algn="l" defTabSz="914400" rtl="0" eaLnBrk="1" latinLnBrk="0" hangingPunct="1">
-              <a:lnSpc>
-                <a:spcPct val="90000"/>
-              </a:lnSpc>
-              <a:spcBef>
-                <a:spcPts val="500"/>
-              </a:spcBef>
-              <a:buFont typeface="Arial" panose="020B0604020202020204" pitchFamily="34" charset="0"/>
-              <a:buChar char="•"/>
-              <a:defRPr sz="1800" kern="1200">
-                <a:solidFill>
-                  <a:schemeClr val="tx1"/>
-                </a:solidFill>
-                <a:latin typeface="+mn-lt"/>
-                <a:ea typeface="+mn-ea"/>
-                <a:cs typeface="+mn-cs"/>
-              </a:defRPr>
-            </a:lvl8pPr>
-            <a:lvl9pPr marL="3886200" indent="-228600" algn="l" defTabSz="914400" rtl="0" eaLnBrk="1" latinLnBrk="0" hangingPunct="1">
-              <a:lnSpc>
-                <a:spcPct val="90000"/>
-              </a:lnSpc>
-              <a:spcBef>
-                <a:spcPts val="500"/>
-              </a:spcBef>
-              <a:buFont typeface="Arial" panose="020B0604020202020204" pitchFamily="34" charset="0"/>
-              <a:buChar char="•"/>
-              <a:defRPr sz="1800" kern="1200">
-                <a:solidFill>
-                  <a:schemeClr val="tx1"/>
-                </a:solidFill>
-                <a:latin typeface="+mn-lt"/>
-                <a:ea typeface="+mn-ea"/>
-                <a:cs typeface="+mn-cs"/>
-              </a:defRPr>
-            </a:lvl9pPr>
-          </a:lstStyle>
-          <a:p>
-            <a:pPr>
-              <a:buFont typeface="Wingdings" panose="05000000000000000000" pitchFamily="2" charset="2"/>
-              <a:buChar char="Ø"/>
-            </a:pPr>
-            <a:r>
-              <a:rPr lang="en-US" dirty="0">
-                <a:solidFill>
-                  <a:schemeClr val="tx1">
-                    <a:lumMod val="75000"/>
-                    <a:lumOff val="25000"/>
-                  </a:schemeClr>
-                </a:solidFill>
-              </a:rPr>
-              <a:t> </a:t>
-            </a:r>
-            <a:r>
-              <a:rPr lang="en-US" dirty="0">
-                <a:solidFill>
-                  <a:schemeClr val="tx1">
-                    <a:lumMod val="75000"/>
-                    <a:lumOff val="25000"/>
-                  </a:schemeClr>
-                </a:solidFill>
-                <a:latin typeface="Palatino Linotype" panose="02040502050505030304" pitchFamily="18" charset="0"/>
-              </a:rPr>
-              <a:t>Learning Objective 1</a:t>
-            </a:r>
+          <a:lstStyle/>
+          <a:p>
+            <a:r>
+              <a:rPr lang="en-US" sz="1400" dirty="0">
+                <a:solidFill>
+                  <a:schemeClr val="tx1">
+                    <a:lumMod val="65000"/>
+                    <a:lumOff val="35000"/>
+                  </a:schemeClr>
+                </a:solidFill>
+                <a:latin typeface="+mj-lt"/>
+                <a:ea typeface="Verdana" panose="020B0604030504040204" pitchFamily="34" charset="0"/>
+              </a:rPr>
+              <a:t>Source: Glassner, A. (2021). </a:t>
+            </a:r>
+            <a:r>
+              <a:rPr lang="en-US" sz="1400" i="1" dirty="0">
+                <a:solidFill>
+                  <a:schemeClr val="tx1">
+                    <a:lumMod val="65000"/>
+                    <a:lumOff val="35000"/>
+                  </a:schemeClr>
+                </a:solidFill>
+                <a:latin typeface="+mj-lt"/>
+                <a:ea typeface="Verdana" panose="020B0604030504040204" pitchFamily="34" charset="0"/>
+              </a:rPr>
+              <a:t>Deep learning: A visual approach</a:t>
+            </a:r>
+            <a:r>
+              <a:rPr lang="en-US" sz="1400" dirty="0">
+                <a:solidFill>
+                  <a:schemeClr val="tx1">
+                    <a:lumMod val="65000"/>
+                    <a:lumOff val="35000"/>
+                  </a:schemeClr>
+                </a:solidFill>
+                <a:latin typeface="+mj-lt"/>
+                <a:ea typeface="Verdana" panose="020B0604030504040204" pitchFamily="34" charset="0"/>
+              </a:rPr>
+              <a:t>. </a:t>
+            </a:r>
+            <a:r>
+              <a:rPr lang="en-US" sz="1400" b="0" i="0" dirty="0">
+                <a:solidFill>
+                  <a:schemeClr val="tx1">
+                    <a:lumMod val="65000"/>
+                    <a:lumOff val="35000"/>
+                  </a:schemeClr>
+                </a:solidFill>
+                <a:effectLst/>
+                <a:latin typeface="+mj-lt"/>
+                <a:ea typeface="Verdana" panose="020B0604030504040204" pitchFamily="34" charset="0"/>
+              </a:rPr>
+              <a:t>San Francisco, CA: No Starch Press. (Chapter </a:t>
+            </a:r>
+            <a:r>
+              <a:rPr lang="en-US" sz="1400" dirty="0">
+                <a:solidFill>
+                  <a:schemeClr val="tx1">
+                    <a:lumMod val="65000"/>
+                    <a:lumOff val="35000"/>
+                  </a:schemeClr>
+                </a:solidFill>
+                <a:latin typeface="+mj-lt"/>
+                <a:ea typeface="Verdana" panose="020B0604030504040204" pitchFamily="34" charset="0"/>
+              </a:rPr>
+              <a:t>20</a:t>
+            </a:r>
+            <a:r>
+              <a:rPr lang="en-US" sz="1400" b="0" i="0" dirty="0">
+                <a:solidFill>
+                  <a:schemeClr val="tx1">
+                    <a:lumMod val="65000"/>
+                    <a:lumOff val="35000"/>
+                  </a:schemeClr>
+                </a:solidFill>
+                <a:effectLst/>
+                <a:latin typeface="+mj-lt"/>
+                <a:ea typeface="Verdana" panose="020B0604030504040204" pitchFamily="34" charset="0"/>
+              </a:rPr>
+              <a:t>)</a:t>
+            </a:r>
+            <a:endParaRPr lang="en-US" sz="1400" dirty="0">
+              <a:solidFill>
+                <a:schemeClr val="tx1">
+                  <a:lumMod val="65000"/>
+                  <a:lumOff val="35000"/>
+                </a:schemeClr>
+              </a:solidFill>
+              <a:latin typeface="+mj-lt"/>
+              <a:ea typeface="Verdana" panose="020B0604030504040204" pitchFamily="34" charset="0"/>
+            </a:endParaRPr>
           </a:p>
         </p:txBody>
       </p:sp>
     </p:spTree>
     <p:extLst>
       <p:ext uri="{BB962C8B-B14F-4D97-AF65-F5344CB8AC3E}">
-        <p14:creationId xmlns:p14="http://schemas.microsoft.com/office/powerpoint/2010/main" val="1416141381"/>
+        <p14:creationId xmlns:p14="http://schemas.microsoft.com/office/powerpoint/2010/main" val="4038125349"/>
       </p:ext>
     </p:extLst>
   </p:cSld>
   <p:clrMapOvr>
     <a:masterClrMapping/>
   </p:clrMapOvr>
+  <mc:AlternateContent xmlns:mc="http://schemas.openxmlformats.org/markup-compatibility/2006" xmlns:p14="http://schemas.microsoft.com/office/powerpoint/2010/main">
+    <mc:Choice Requires="p14">
+      <p:transition spd="med" p14:dur="700">
+        <p:fade/>
+      </p:transition>
+    </mc:Choice>
+    <mc:Fallback xmlns="">
+      <p:transition spd="med">
+        <p:fade/>
+      </p:transition>
+    </mc:Fallback>
+  </mc:AlternateContent>
 </p:sld>
 </file>
 
@@ -11540,67 +11107,518 @@
           <a:chExt cx="0" cy="0"/>
         </a:xfrm>
       </p:grpSpPr>
-      <p:pic>
-        <p:nvPicPr>
-          <p:cNvPr id="10" name="Picture 9">
+      <p:sp>
+        <p:nvSpPr>
+          <p:cNvPr id="2" name="Title 1">
             <a:extLst>
               <a:ext uri="{FF2B5EF4-FFF2-40B4-BE49-F238E27FC236}">
-                <a16:creationId xmlns:a16="http://schemas.microsoft.com/office/drawing/2014/main" id="{BCF66A3E-F248-4169-B6FA-5E416D7451DC}"/>
+                <a16:creationId xmlns:a16="http://schemas.microsoft.com/office/drawing/2014/main" id="{0E138177-E2EE-ACAC-A57C-F03FA29EC836}"/>
               </a:ext>
             </a:extLst>
           </p:cNvPr>
-          <p:cNvPicPr>
-            <a:picLocks noChangeAspect="1"/>
-          </p:cNvPicPr>
-          <p:nvPr/>
-        </p:nvPicPr>
-        <p:blipFill>
-          <a:blip r:embed="rId3"/>
-          <a:stretch>
-            <a:fillRect/>
-          </a:stretch>
-        </p:blipFill>
+          <p:cNvSpPr>
+            <a:spLocks noGrp="1"/>
+          </p:cNvSpPr>
+          <p:nvPr>
+            <p:ph type="title"/>
+          </p:nvPr>
+        </p:nvSpPr>
+        <p:spPr/>
+        <p:txBody>
+          <a:bodyPr/>
+          <a:lstStyle/>
+          <a:p>
+            <a:r>
+              <a:rPr lang="en-US" dirty="0">
+                <a:solidFill>
+                  <a:schemeClr val="tx1">
+                    <a:lumMod val="75000"/>
+                    <a:lumOff val="25000"/>
+                  </a:schemeClr>
+                </a:solidFill>
+                <a:latin typeface="Palatino Linotype" panose="02040502050505030304" pitchFamily="18" charset="0"/>
+              </a:rPr>
+              <a:t>Lesson Overview</a:t>
+            </a:r>
+          </a:p>
+        </p:txBody>
+      </p:sp>
+      <p:sp>
+        <p:nvSpPr>
+          <p:cNvPr id="3" name="Content Placeholder 2">
+            <a:extLst>
+              <a:ext uri="{FF2B5EF4-FFF2-40B4-BE49-F238E27FC236}">
+                <a16:creationId xmlns:a16="http://schemas.microsoft.com/office/drawing/2014/main" id="{8626DB86-54B4-A1E2-6C25-C049F364ED25}"/>
+              </a:ext>
+            </a:extLst>
+          </p:cNvPr>
+          <p:cNvSpPr>
+            <a:spLocks noGrp="1"/>
+          </p:cNvSpPr>
+          <p:nvPr>
+            <p:ph idx="1"/>
+          </p:nvPr>
+        </p:nvSpPr>
         <p:spPr>
           <a:xfrm>
-            <a:off x="2233116" y="743878"/>
-            <a:ext cx="7725768" cy="5370244"/>
+            <a:off x="1013564" y="1825626"/>
+            <a:ext cx="10515600" cy="504215"/>
+          </a:xfrm>
+        </p:spPr>
+        <p:txBody>
+          <a:bodyPr/>
+          <a:lstStyle/>
+          <a:p>
+            <a:pPr>
+              <a:buFont typeface="Wingdings" panose="05000000000000000000" pitchFamily="2" charset="2"/>
+              <a:buChar char="Ø"/>
+            </a:pPr>
+            <a:r>
+              <a:rPr lang="en-US" dirty="0">
+                <a:solidFill>
+                  <a:schemeClr val="tx1">
+                    <a:lumMod val="75000"/>
+                    <a:lumOff val="25000"/>
+                  </a:schemeClr>
+                </a:solidFill>
+              </a:rPr>
+              <a:t> </a:t>
+            </a:r>
+            <a:r>
+              <a:rPr lang="en-US" dirty="0">
+                <a:solidFill>
+                  <a:schemeClr val="tx1">
+                    <a:lumMod val="75000"/>
+                    <a:lumOff val="25000"/>
+                  </a:schemeClr>
+                </a:solidFill>
+                <a:latin typeface="Palatino Linotype" panose="02040502050505030304" pitchFamily="18" charset="0"/>
+              </a:rPr>
+              <a:t>Learning Objective 1</a:t>
+            </a:r>
+          </a:p>
+        </p:txBody>
+      </p:sp>
+      <p:sp>
+        <p:nvSpPr>
+          <p:cNvPr id="5" name="Content Placeholder 2">
+            <a:extLst>
+              <a:ext uri="{FF2B5EF4-FFF2-40B4-BE49-F238E27FC236}">
+                <a16:creationId xmlns:a16="http://schemas.microsoft.com/office/drawing/2014/main" id="{7070644F-62DF-8674-4A8A-C2FA1554028E}"/>
+              </a:ext>
+            </a:extLst>
+          </p:cNvPr>
+          <p:cNvSpPr txBox="1">
+            <a:spLocks/>
+          </p:cNvSpPr>
+          <p:nvPr/>
+        </p:nvSpPr>
+        <p:spPr>
+          <a:xfrm>
+            <a:off x="1013564" y="2464778"/>
+            <a:ext cx="10515600" cy="504215"/>
           </a:xfrm>
           <a:prstGeom prst="rect">
             <a:avLst/>
           </a:prstGeom>
         </p:spPr>
-      </p:pic>
-      <p:sp>
-        <p:nvSpPr>
-          <p:cNvPr id="11" name="TextBox 10">
+        <p:txBody>
+          <a:bodyPr vert="horz" lIns="91440" tIns="45720" rIns="91440" bIns="45720" rtlCol="0">
+            <a:normAutofit/>
+          </a:bodyPr>
+          <a:lstStyle>
+            <a:lvl1pPr marL="228600" indent="-228600" algn="l" defTabSz="914400" rtl="0" eaLnBrk="1" latinLnBrk="0" hangingPunct="1">
+              <a:lnSpc>
+                <a:spcPct val="90000"/>
+              </a:lnSpc>
+              <a:spcBef>
+                <a:spcPts val="1000"/>
+              </a:spcBef>
+              <a:buFont typeface="Arial" panose="020B0604020202020204" pitchFamily="34" charset="0"/>
+              <a:buChar char="•"/>
+              <a:defRPr sz="2800" kern="1200">
+                <a:solidFill>
+                  <a:schemeClr val="tx1"/>
+                </a:solidFill>
+                <a:latin typeface="+mn-lt"/>
+                <a:ea typeface="+mn-ea"/>
+                <a:cs typeface="+mn-cs"/>
+              </a:defRPr>
+            </a:lvl1pPr>
+            <a:lvl2pPr marL="685800" indent="-228600" algn="l" defTabSz="914400" rtl="0" eaLnBrk="1" latinLnBrk="0" hangingPunct="1">
+              <a:lnSpc>
+                <a:spcPct val="90000"/>
+              </a:lnSpc>
+              <a:spcBef>
+                <a:spcPts val="500"/>
+              </a:spcBef>
+              <a:buFont typeface="Arial" panose="020B0604020202020204" pitchFamily="34" charset="0"/>
+              <a:buChar char="•"/>
+              <a:defRPr sz="2400" kern="1200">
+                <a:solidFill>
+                  <a:schemeClr val="tx1"/>
+                </a:solidFill>
+                <a:latin typeface="+mn-lt"/>
+                <a:ea typeface="+mn-ea"/>
+                <a:cs typeface="+mn-cs"/>
+              </a:defRPr>
+            </a:lvl2pPr>
+            <a:lvl3pPr marL="1143000" indent="-228600" algn="l" defTabSz="914400" rtl="0" eaLnBrk="1" latinLnBrk="0" hangingPunct="1">
+              <a:lnSpc>
+                <a:spcPct val="90000"/>
+              </a:lnSpc>
+              <a:spcBef>
+                <a:spcPts val="500"/>
+              </a:spcBef>
+              <a:buFont typeface="Arial" panose="020B0604020202020204" pitchFamily="34" charset="0"/>
+              <a:buChar char="•"/>
+              <a:defRPr sz="2000" kern="1200">
+                <a:solidFill>
+                  <a:schemeClr val="tx1"/>
+                </a:solidFill>
+                <a:latin typeface="+mn-lt"/>
+                <a:ea typeface="+mn-ea"/>
+                <a:cs typeface="+mn-cs"/>
+              </a:defRPr>
+            </a:lvl3pPr>
+            <a:lvl4pPr marL="1600200" indent="-228600" algn="l" defTabSz="914400" rtl="0" eaLnBrk="1" latinLnBrk="0" hangingPunct="1">
+              <a:lnSpc>
+                <a:spcPct val="90000"/>
+              </a:lnSpc>
+              <a:spcBef>
+                <a:spcPts val="500"/>
+              </a:spcBef>
+              <a:buFont typeface="Arial" panose="020B0604020202020204" pitchFamily="34" charset="0"/>
+              <a:buChar char="•"/>
+              <a:defRPr sz="1800" kern="1200">
+                <a:solidFill>
+                  <a:schemeClr val="tx1"/>
+                </a:solidFill>
+                <a:latin typeface="+mn-lt"/>
+                <a:ea typeface="+mn-ea"/>
+                <a:cs typeface="+mn-cs"/>
+              </a:defRPr>
+            </a:lvl4pPr>
+            <a:lvl5pPr marL="2057400" indent="-228600" algn="l" defTabSz="914400" rtl="0" eaLnBrk="1" latinLnBrk="0" hangingPunct="1">
+              <a:lnSpc>
+                <a:spcPct val="90000"/>
+              </a:lnSpc>
+              <a:spcBef>
+                <a:spcPts val="500"/>
+              </a:spcBef>
+              <a:buFont typeface="Arial" panose="020B0604020202020204" pitchFamily="34" charset="0"/>
+              <a:buChar char="•"/>
+              <a:defRPr sz="1800" kern="1200">
+                <a:solidFill>
+                  <a:schemeClr val="tx1"/>
+                </a:solidFill>
+                <a:latin typeface="+mn-lt"/>
+                <a:ea typeface="+mn-ea"/>
+                <a:cs typeface="+mn-cs"/>
+              </a:defRPr>
+            </a:lvl5pPr>
+            <a:lvl6pPr marL="2514600" indent="-228600" algn="l" defTabSz="914400" rtl="0" eaLnBrk="1" latinLnBrk="0" hangingPunct="1">
+              <a:lnSpc>
+                <a:spcPct val="90000"/>
+              </a:lnSpc>
+              <a:spcBef>
+                <a:spcPts val="500"/>
+              </a:spcBef>
+              <a:buFont typeface="Arial" panose="020B0604020202020204" pitchFamily="34" charset="0"/>
+              <a:buChar char="•"/>
+              <a:defRPr sz="1800" kern="1200">
+                <a:solidFill>
+                  <a:schemeClr val="tx1"/>
+                </a:solidFill>
+                <a:latin typeface="+mn-lt"/>
+                <a:ea typeface="+mn-ea"/>
+                <a:cs typeface="+mn-cs"/>
+              </a:defRPr>
+            </a:lvl6pPr>
+            <a:lvl7pPr marL="2971800" indent="-228600" algn="l" defTabSz="914400" rtl="0" eaLnBrk="1" latinLnBrk="0" hangingPunct="1">
+              <a:lnSpc>
+                <a:spcPct val="90000"/>
+              </a:lnSpc>
+              <a:spcBef>
+                <a:spcPts val="500"/>
+              </a:spcBef>
+              <a:buFont typeface="Arial" panose="020B0604020202020204" pitchFamily="34" charset="0"/>
+              <a:buChar char="•"/>
+              <a:defRPr sz="1800" kern="1200">
+                <a:solidFill>
+                  <a:schemeClr val="tx1"/>
+                </a:solidFill>
+                <a:latin typeface="+mn-lt"/>
+                <a:ea typeface="+mn-ea"/>
+                <a:cs typeface="+mn-cs"/>
+              </a:defRPr>
+            </a:lvl7pPr>
+            <a:lvl8pPr marL="3429000" indent="-228600" algn="l" defTabSz="914400" rtl="0" eaLnBrk="1" latinLnBrk="0" hangingPunct="1">
+              <a:lnSpc>
+                <a:spcPct val="90000"/>
+              </a:lnSpc>
+              <a:spcBef>
+                <a:spcPts val="500"/>
+              </a:spcBef>
+              <a:buFont typeface="Arial" panose="020B0604020202020204" pitchFamily="34" charset="0"/>
+              <a:buChar char="•"/>
+              <a:defRPr sz="1800" kern="1200">
+                <a:solidFill>
+                  <a:schemeClr val="tx1"/>
+                </a:solidFill>
+                <a:latin typeface="+mn-lt"/>
+                <a:ea typeface="+mn-ea"/>
+                <a:cs typeface="+mn-cs"/>
+              </a:defRPr>
+            </a:lvl8pPr>
+            <a:lvl9pPr marL="3886200" indent="-228600" algn="l" defTabSz="914400" rtl="0" eaLnBrk="1" latinLnBrk="0" hangingPunct="1">
+              <a:lnSpc>
+                <a:spcPct val="90000"/>
+              </a:lnSpc>
+              <a:spcBef>
+                <a:spcPts val="500"/>
+              </a:spcBef>
+              <a:buFont typeface="Arial" panose="020B0604020202020204" pitchFamily="34" charset="0"/>
+              <a:buChar char="•"/>
+              <a:defRPr sz="1800" kern="1200">
+                <a:solidFill>
+                  <a:schemeClr val="tx1"/>
+                </a:solidFill>
+                <a:latin typeface="+mn-lt"/>
+                <a:ea typeface="+mn-ea"/>
+                <a:cs typeface="+mn-cs"/>
+              </a:defRPr>
+            </a:lvl9pPr>
+          </a:lstStyle>
+          <a:p>
+            <a:pPr>
+              <a:buFont typeface="Wingdings" panose="05000000000000000000" pitchFamily="2" charset="2"/>
+              <a:buChar char="Ø"/>
+            </a:pPr>
+            <a:r>
+              <a:rPr lang="en-US" dirty="0">
+                <a:solidFill>
+                  <a:schemeClr val="tx1">
+                    <a:lumMod val="75000"/>
+                    <a:lumOff val="25000"/>
+                  </a:schemeClr>
+                </a:solidFill>
+              </a:rPr>
+              <a:t> </a:t>
+            </a:r>
+            <a:r>
+              <a:rPr lang="en-US" dirty="0">
+                <a:solidFill>
+                  <a:schemeClr val="tx1">
+                    <a:lumMod val="75000"/>
+                    <a:lumOff val="25000"/>
+                  </a:schemeClr>
+                </a:solidFill>
+                <a:latin typeface="Palatino Linotype" panose="02040502050505030304" pitchFamily="18" charset="0"/>
+              </a:rPr>
+              <a:t>Learning Objective 1</a:t>
+            </a:r>
+          </a:p>
+        </p:txBody>
+      </p:sp>
+      <p:sp>
+        <p:nvSpPr>
+          <p:cNvPr id="6" name="Content Placeholder 2">
             <a:extLst>
               <a:ext uri="{FF2B5EF4-FFF2-40B4-BE49-F238E27FC236}">
-                <a16:creationId xmlns:a16="http://schemas.microsoft.com/office/drawing/2014/main" id="{B74C8368-9E27-4C68-8BFF-709B746502CB}"/>
+                <a16:creationId xmlns:a16="http://schemas.microsoft.com/office/drawing/2014/main" id="{FF2490E1-D7A0-7027-6DCC-60BB6819CD9E}"/>
               </a:ext>
             </a:extLst>
           </p:cNvPr>
-          <p:cNvSpPr txBox="1"/>
+          <p:cNvSpPr txBox="1">
+            <a:spLocks/>
+          </p:cNvSpPr>
           <p:nvPr/>
         </p:nvSpPr>
         <p:spPr>
           <a:xfrm>
-            <a:off x="0" y="309967"/>
-            <a:ext cx="12191999" cy="646331"/>
+            <a:off x="1013564" y="3103930"/>
+            <a:ext cx="10515600" cy="504215"/>
           </a:xfrm>
           <a:prstGeom prst="rect">
             <a:avLst/>
           </a:prstGeom>
-          <a:noFill/>
         </p:spPr>
         <p:txBody>
-          <a:bodyPr wrap="square" rtlCol="0">
-            <a:spAutoFit/>
+          <a:bodyPr vert="horz" lIns="91440" tIns="45720" rIns="91440" bIns="45720" rtlCol="0">
+            <a:normAutofit/>
           </a:bodyPr>
-          <a:lstStyle/>
-          <a:p>
-            <a:pPr algn="ctr"/>
-            <a:r>
-              <a:rPr lang="en-US" sz="3600" dirty="0">
+          <a:lstStyle>
+            <a:lvl1pPr marL="228600" indent="-228600" algn="l" defTabSz="914400" rtl="0" eaLnBrk="1" latinLnBrk="0" hangingPunct="1">
+              <a:lnSpc>
+                <a:spcPct val="90000"/>
+              </a:lnSpc>
+              <a:spcBef>
+                <a:spcPts val="1000"/>
+              </a:spcBef>
+              <a:buFont typeface="Arial" panose="020B0604020202020204" pitchFamily="34" charset="0"/>
+              <a:buChar char="•"/>
+              <a:defRPr sz="2800" kern="1200">
+                <a:solidFill>
+                  <a:schemeClr val="tx1"/>
+                </a:solidFill>
+                <a:latin typeface="+mn-lt"/>
+                <a:ea typeface="+mn-ea"/>
+                <a:cs typeface="+mn-cs"/>
+              </a:defRPr>
+            </a:lvl1pPr>
+            <a:lvl2pPr marL="685800" indent="-228600" algn="l" defTabSz="914400" rtl="0" eaLnBrk="1" latinLnBrk="0" hangingPunct="1">
+              <a:lnSpc>
+                <a:spcPct val="90000"/>
+              </a:lnSpc>
+              <a:spcBef>
+                <a:spcPts val="500"/>
+              </a:spcBef>
+              <a:buFont typeface="Arial" panose="020B0604020202020204" pitchFamily="34" charset="0"/>
+              <a:buChar char="•"/>
+              <a:defRPr sz="2400" kern="1200">
+                <a:solidFill>
+                  <a:schemeClr val="tx1"/>
+                </a:solidFill>
+                <a:latin typeface="+mn-lt"/>
+                <a:ea typeface="+mn-ea"/>
+                <a:cs typeface="+mn-cs"/>
+              </a:defRPr>
+            </a:lvl2pPr>
+            <a:lvl3pPr marL="1143000" indent="-228600" algn="l" defTabSz="914400" rtl="0" eaLnBrk="1" latinLnBrk="0" hangingPunct="1">
+              <a:lnSpc>
+                <a:spcPct val="90000"/>
+              </a:lnSpc>
+              <a:spcBef>
+                <a:spcPts val="500"/>
+              </a:spcBef>
+              <a:buFont typeface="Arial" panose="020B0604020202020204" pitchFamily="34" charset="0"/>
+              <a:buChar char="•"/>
+              <a:defRPr sz="2000" kern="1200">
+                <a:solidFill>
+                  <a:schemeClr val="tx1"/>
+                </a:solidFill>
+                <a:latin typeface="+mn-lt"/>
+                <a:ea typeface="+mn-ea"/>
+                <a:cs typeface="+mn-cs"/>
+              </a:defRPr>
+            </a:lvl3pPr>
+            <a:lvl4pPr marL="1600200" indent="-228600" algn="l" defTabSz="914400" rtl="0" eaLnBrk="1" latinLnBrk="0" hangingPunct="1">
+              <a:lnSpc>
+                <a:spcPct val="90000"/>
+              </a:lnSpc>
+              <a:spcBef>
+                <a:spcPts val="500"/>
+              </a:spcBef>
+              <a:buFont typeface="Arial" panose="020B0604020202020204" pitchFamily="34" charset="0"/>
+              <a:buChar char="•"/>
+              <a:defRPr sz="1800" kern="1200">
+                <a:solidFill>
+                  <a:schemeClr val="tx1"/>
+                </a:solidFill>
+                <a:latin typeface="+mn-lt"/>
+                <a:ea typeface="+mn-ea"/>
+                <a:cs typeface="+mn-cs"/>
+              </a:defRPr>
+            </a:lvl4pPr>
+            <a:lvl5pPr marL="2057400" indent="-228600" algn="l" defTabSz="914400" rtl="0" eaLnBrk="1" latinLnBrk="0" hangingPunct="1">
+              <a:lnSpc>
+                <a:spcPct val="90000"/>
+              </a:lnSpc>
+              <a:spcBef>
+                <a:spcPts val="500"/>
+              </a:spcBef>
+              <a:buFont typeface="Arial" panose="020B0604020202020204" pitchFamily="34" charset="0"/>
+              <a:buChar char="•"/>
+              <a:defRPr sz="1800" kern="1200">
+                <a:solidFill>
+                  <a:schemeClr val="tx1"/>
+                </a:solidFill>
+                <a:latin typeface="+mn-lt"/>
+                <a:ea typeface="+mn-ea"/>
+                <a:cs typeface="+mn-cs"/>
+              </a:defRPr>
+            </a:lvl5pPr>
+            <a:lvl6pPr marL="2514600" indent="-228600" algn="l" defTabSz="914400" rtl="0" eaLnBrk="1" latinLnBrk="0" hangingPunct="1">
+              <a:lnSpc>
+                <a:spcPct val="90000"/>
+              </a:lnSpc>
+              <a:spcBef>
+                <a:spcPts val="500"/>
+              </a:spcBef>
+              <a:buFont typeface="Arial" panose="020B0604020202020204" pitchFamily="34" charset="0"/>
+              <a:buChar char="•"/>
+              <a:defRPr sz="1800" kern="1200">
+                <a:solidFill>
+                  <a:schemeClr val="tx1"/>
+                </a:solidFill>
+                <a:latin typeface="+mn-lt"/>
+                <a:ea typeface="+mn-ea"/>
+                <a:cs typeface="+mn-cs"/>
+              </a:defRPr>
+            </a:lvl6pPr>
+            <a:lvl7pPr marL="2971800" indent="-228600" algn="l" defTabSz="914400" rtl="0" eaLnBrk="1" latinLnBrk="0" hangingPunct="1">
+              <a:lnSpc>
+                <a:spcPct val="90000"/>
+              </a:lnSpc>
+              <a:spcBef>
+                <a:spcPts val="500"/>
+              </a:spcBef>
+              <a:buFont typeface="Arial" panose="020B0604020202020204" pitchFamily="34" charset="0"/>
+              <a:buChar char="•"/>
+              <a:defRPr sz="1800" kern="1200">
+                <a:solidFill>
+                  <a:schemeClr val="tx1"/>
+                </a:solidFill>
+                <a:latin typeface="+mn-lt"/>
+                <a:ea typeface="+mn-ea"/>
+                <a:cs typeface="+mn-cs"/>
+              </a:defRPr>
+            </a:lvl7pPr>
+            <a:lvl8pPr marL="3429000" indent="-228600" algn="l" defTabSz="914400" rtl="0" eaLnBrk="1" latinLnBrk="0" hangingPunct="1">
+              <a:lnSpc>
+                <a:spcPct val="90000"/>
+              </a:lnSpc>
+              <a:spcBef>
+                <a:spcPts val="500"/>
+              </a:spcBef>
+              <a:buFont typeface="Arial" panose="020B0604020202020204" pitchFamily="34" charset="0"/>
+              <a:buChar char="•"/>
+              <a:defRPr sz="1800" kern="1200">
+                <a:solidFill>
+                  <a:schemeClr val="tx1"/>
+                </a:solidFill>
+                <a:latin typeface="+mn-lt"/>
+                <a:ea typeface="+mn-ea"/>
+                <a:cs typeface="+mn-cs"/>
+              </a:defRPr>
+            </a:lvl8pPr>
+            <a:lvl9pPr marL="3886200" indent="-228600" algn="l" defTabSz="914400" rtl="0" eaLnBrk="1" latinLnBrk="0" hangingPunct="1">
+              <a:lnSpc>
+                <a:spcPct val="90000"/>
+              </a:lnSpc>
+              <a:spcBef>
+                <a:spcPts val="500"/>
+              </a:spcBef>
+              <a:buFont typeface="Arial" panose="020B0604020202020204" pitchFamily="34" charset="0"/>
+              <a:buChar char="•"/>
+              <a:defRPr sz="1800" kern="1200">
+                <a:solidFill>
+                  <a:schemeClr val="tx1"/>
+                </a:solidFill>
+                <a:latin typeface="+mn-lt"/>
+                <a:ea typeface="+mn-ea"/>
+                <a:cs typeface="+mn-cs"/>
+              </a:defRPr>
+            </a:lvl9pPr>
+          </a:lstStyle>
+          <a:p>
+            <a:pPr>
+              <a:buFont typeface="Wingdings" panose="05000000000000000000" pitchFamily="2" charset="2"/>
+              <a:buChar char="Ø"/>
+            </a:pPr>
+            <a:r>
+              <a:rPr lang="en-US" dirty="0">
                 <a:solidFill>
                   <a:schemeClr val="tx1">
                     <a:lumMod val="75000"/>
@@ -11608,51 +11626,241 @@
                   </a:schemeClr>
                 </a:solidFill>
               </a:rPr>
-              <a:t>Cosine Similarity</a:t>
-            </a:r>
-          </a:p>
-        </p:txBody>
-      </p:sp>
-      <p:sp>
-        <p:nvSpPr>
-          <p:cNvPr id="4" name="TextBox 3">
+              <a:t> </a:t>
+            </a:r>
+            <a:r>
+              <a:rPr lang="en-US" dirty="0">
+                <a:solidFill>
+                  <a:schemeClr val="tx1">
+                    <a:lumMod val="75000"/>
+                    <a:lumOff val="25000"/>
+                  </a:schemeClr>
+                </a:solidFill>
+                <a:latin typeface="Palatino Linotype" panose="02040502050505030304" pitchFamily="18" charset="0"/>
+              </a:rPr>
+              <a:t>Learning Objective 1</a:t>
+            </a:r>
+          </a:p>
+        </p:txBody>
+      </p:sp>
+      <p:sp>
+        <p:nvSpPr>
+          <p:cNvPr id="7" name="Content Placeholder 2">
             <a:extLst>
               <a:ext uri="{FF2B5EF4-FFF2-40B4-BE49-F238E27FC236}">
-                <a16:creationId xmlns:a16="http://schemas.microsoft.com/office/drawing/2014/main" id="{3DF683BE-614B-46D2-A7B2-4DF802B8210B}"/>
+                <a16:creationId xmlns:a16="http://schemas.microsoft.com/office/drawing/2014/main" id="{6D3279E5-D518-B484-9FCF-B12663A4E8FF}"/>
               </a:ext>
             </a:extLst>
           </p:cNvPr>
-          <p:cNvSpPr txBox="1"/>
+          <p:cNvSpPr txBox="1">
+            <a:spLocks/>
+          </p:cNvSpPr>
           <p:nvPr/>
         </p:nvSpPr>
         <p:spPr>
           <a:xfrm>
-            <a:off x="0" y="6550223"/>
-            <a:ext cx="12192000" cy="307777"/>
+            <a:off x="1013564" y="3743082"/>
+            <a:ext cx="10515600" cy="504215"/>
           </a:xfrm>
           <a:prstGeom prst="rect">
             <a:avLst/>
           </a:prstGeom>
-          <a:noFill/>
         </p:spPr>
         <p:txBody>
-          <a:bodyPr wrap="square" rtlCol="0">
-            <a:spAutoFit/>
+          <a:bodyPr vert="horz" lIns="91440" tIns="45720" rIns="91440" bIns="45720" rtlCol="0">
+            <a:normAutofit/>
           </a:bodyPr>
-          <a:lstStyle/>
-          <a:p>
-            <a:r>
-              <a:rPr lang="en-US" sz="1400" dirty="0">
-                <a:solidFill>
-                  <a:schemeClr val="tx1">
-                    <a:lumMod val="65000"/>
-                    <a:lumOff val="35000"/>
-                  </a:schemeClr>
-                </a:solidFill>
-                <a:latin typeface="+mj-lt"/>
-                <a:ea typeface="Verdana" panose="020B0604030504040204" pitchFamily="34" charset="0"/>
-              </a:rPr>
-              <a:t>Source: Karani, D. (2018). Retrieved: https://towardsdatascience.com/introduction-to-word-embedding-and-word2vec-652d0c2060fa</a:t>
+          <a:lstStyle>
+            <a:lvl1pPr marL="228600" indent="-228600" algn="l" defTabSz="914400" rtl="0" eaLnBrk="1" latinLnBrk="0" hangingPunct="1">
+              <a:lnSpc>
+                <a:spcPct val="90000"/>
+              </a:lnSpc>
+              <a:spcBef>
+                <a:spcPts val="1000"/>
+              </a:spcBef>
+              <a:buFont typeface="Arial" panose="020B0604020202020204" pitchFamily="34" charset="0"/>
+              <a:buChar char="•"/>
+              <a:defRPr sz="2800" kern="1200">
+                <a:solidFill>
+                  <a:schemeClr val="tx1"/>
+                </a:solidFill>
+                <a:latin typeface="+mn-lt"/>
+                <a:ea typeface="+mn-ea"/>
+                <a:cs typeface="+mn-cs"/>
+              </a:defRPr>
+            </a:lvl1pPr>
+            <a:lvl2pPr marL="685800" indent="-228600" algn="l" defTabSz="914400" rtl="0" eaLnBrk="1" latinLnBrk="0" hangingPunct="1">
+              <a:lnSpc>
+                <a:spcPct val="90000"/>
+              </a:lnSpc>
+              <a:spcBef>
+                <a:spcPts val="500"/>
+              </a:spcBef>
+              <a:buFont typeface="Arial" panose="020B0604020202020204" pitchFamily="34" charset="0"/>
+              <a:buChar char="•"/>
+              <a:defRPr sz="2400" kern="1200">
+                <a:solidFill>
+                  <a:schemeClr val="tx1"/>
+                </a:solidFill>
+                <a:latin typeface="+mn-lt"/>
+                <a:ea typeface="+mn-ea"/>
+                <a:cs typeface="+mn-cs"/>
+              </a:defRPr>
+            </a:lvl2pPr>
+            <a:lvl3pPr marL="1143000" indent="-228600" algn="l" defTabSz="914400" rtl="0" eaLnBrk="1" latinLnBrk="0" hangingPunct="1">
+              <a:lnSpc>
+                <a:spcPct val="90000"/>
+              </a:lnSpc>
+              <a:spcBef>
+                <a:spcPts val="500"/>
+              </a:spcBef>
+              <a:buFont typeface="Arial" panose="020B0604020202020204" pitchFamily="34" charset="0"/>
+              <a:buChar char="•"/>
+              <a:defRPr sz="2000" kern="1200">
+                <a:solidFill>
+                  <a:schemeClr val="tx1"/>
+                </a:solidFill>
+                <a:latin typeface="+mn-lt"/>
+                <a:ea typeface="+mn-ea"/>
+                <a:cs typeface="+mn-cs"/>
+              </a:defRPr>
+            </a:lvl3pPr>
+            <a:lvl4pPr marL="1600200" indent="-228600" algn="l" defTabSz="914400" rtl="0" eaLnBrk="1" latinLnBrk="0" hangingPunct="1">
+              <a:lnSpc>
+                <a:spcPct val="90000"/>
+              </a:lnSpc>
+              <a:spcBef>
+                <a:spcPts val="500"/>
+              </a:spcBef>
+              <a:buFont typeface="Arial" panose="020B0604020202020204" pitchFamily="34" charset="0"/>
+              <a:buChar char="•"/>
+              <a:defRPr sz="1800" kern="1200">
+                <a:solidFill>
+                  <a:schemeClr val="tx1"/>
+                </a:solidFill>
+                <a:latin typeface="+mn-lt"/>
+                <a:ea typeface="+mn-ea"/>
+                <a:cs typeface="+mn-cs"/>
+              </a:defRPr>
+            </a:lvl4pPr>
+            <a:lvl5pPr marL="2057400" indent="-228600" algn="l" defTabSz="914400" rtl="0" eaLnBrk="1" latinLnBrk="0" hangingPunct="1">
+              <a:lnSpc>
+                <a:spcPct val="90000"/>
+              </a:lnSpc>
+              <a:spcBef>
+                <a:spcPts val="500"/>
+              </a:spcBef>
+              <a:buFont typeface="Arial" panose="020B0604020202020204" pitchFamily="34" charset="0"/>
+              <a:buChar char="•"/>
+              <a:defRPr sz="1800" kern="1200">
+                <a:solidFill>
+                  <a:schemeClr val="tx1"/>
+                </a:solidFill>
+                <a:latin typeface="+mn-lt"/>
+                <a:ea typeface="+mn-ea"/>
+                <a:cs typeface="+mn-cs"/>
+              </a:defRPr>
+            </a:lvl5pPr>
+            <a:lvl6pPr marL="2514600" indent="-228600" algn="l" defTabSz="914400" rtl="0" eaLnBrk="1" latinLnBrk="0" hangingPunct="1">
+              <a:lnSpc>
+                <a:spcPct val="90000"/>
+              </a:lnSpc>
+              <a:spcBef>
+                <a:spcPts val="500"/>
+              </a:spcBef>
+              <a:buFont typeface="Arial" panose="020B0604020202020204" pitchFamily="34" charset="0"/>
+              <a:buChar char="•"/>
+              <a:defRPr sz="1800" kern="1200">
+                <a:solidFill>
+                  <a:schemeClr val="tx1"/>
+                </a:solidFill>
+                <a:latin typeface="+mn-lt"/>
+                <a:ea typeface="+mn-ea"/>
+                <a:cs typeface="+mn-cs"/>
+              </a:defRPr>
+            </a:lvl6pPr>
+            <a:lvl7pPr marL="2971800" indent="-228600" algn="l" defTabSz="914400" rtl="0" eaLnBrk="1" latinLnBrk="0" hangingPunct="1">
+              <a:lnSpc>
+                <a:spcPct val="90000"/>
+              </a:lnSpc>
+              <a:spcBef>
+                <a:spcPts val="500"/>
+              </a:spcBef>
+              <a:buFont typeface="Arial" panose="020B0604020202020204" pitchFamily="34" charset="0"/>
+              <a:buChar char="•"/>
+              <a:defRPr sz="1800" kern="1200">
+                <a:solidFill>
+                  <a:schemeClr val="tx1"/>
+                </a:solidFill>
+                <a:latin typeface="+mn-lt"/>
+                <a:ea typeface="+mn-ea"/>
+                <a:cs typeface="+mn-cs"/>
+              </a:defRPr>
+            </a:lvl7pPr>
+            <a:lvl8pPr marL="3429000" indent="-228600" algn="l" defTabSz="914400" rtl="0" eaLnBrk="1" latinLnBrk="0" hangingPunct="1">
+              <a:lnSpc>
+                <a:spcPct val="90000"/>
+              </a:lnSpc>
+              <a:spcBef>
+                <a:spcPts val="500"/>
+              </a:spcBef>
+              <a:buFont typeface="Arial" panose="020B0604020202020204" pitchFamily="34" charset="0"/>
+              <a:buChar char="•"/>
+              <a:defRPr sz="1800" kern="1200">
+                <a:solidFill>
+                  <a:schemeClr val="tx1"/>
+                </a:solidFill>
+                <a:latin typeface="+mn-lt"/>
+                <a:ea typeface="+mn-ea"/>
+                <a:cs typeface="+mn-cs"/>
+              </a:defRPr>
+            </a:lvl8pPr>
+            <a:lvl9pPr marL="3886200" indent="-228600" algn="l" defTabSz="914400" rtl="0" eaLnBrk="1" latinLnBrk="0" hangingPunct="1">
+              <a:lnSpc>
+                <a:spcPct val="90000"/>
+              </a:lnSpc>
+              <a:spcBef>
+                <a:spcPts val="500"/>
+              </a:spcBef>
+              <a:buFont typeface="Arial" panose="020B0604020202020204" pitchFamily="34" charset="0"/>
+              <a:buChar char="•"/>
+              <a:defRPr sz="1800" kern="1200">
+                <a:solidFill>
+                  <a:schemeClr val="tx1"/>
+                </a:solidFill>
+                <a:latin typeface="+mn-lt"/>
+                <a:ea typeface="+mn-ea"/>
+                <a:cs typeface="+mn-cs"/>
+              </a:defRPr>
+            </a:lvl9pPr>
+          </a:lstStyle>
+          <a:p>
+            <a:pPr>
+              <a:buFont typeface="Wingdings" panose="05000000000000000000" pitchFamily="2" charset="2"/>
+              <a:buChar char="Ø"/>
+            </a:pPr>
+            <a:r>
+              <a:rPr lang="en-US" dirty="0">
+                <a:solidFill>
+                  <a:schemeClr val="tx1">
+                    <a:lumMod val="75000"/>
+                    <a:lumOff val="25000"/>
+                  </a:schemeClr>
+                </a:solidFill>
+              </a:rPr>
+              <a:t> </a:t>
+            </a:r>
+            <a:r>
+              <a:rPr lang="en-US" dirty="0">
+                <a:solidFill>
+                  <a:schemeClr val="tx1">
+                    <a:lumMod val="75000"/>
+                    <a:lumOff val="25000"/>
+                  </a:schemeClr>
+                </a:solidFill>
+                <a:latin typeface="Palatino Linotype" panose="02040502050505030304" pitchFamily="18" charset="0"/>
+              </a:rPr>
+              <a:t>Learning Objective 1</a:t>
             </a:r>
           </a:p>
         </p:txBody>
@@ -11660,25 +11868,13 @@
     </p:spTree>
     <p:extLst>
       <p:ext uri="{BB962C8B-B14F-4D97-AF65-F5344CB8AC3E}">
-        <p14:creationId xmlns:p14="http://schemas.microsoft.com/office/powerpoint/2010/main" val="323989571"/>
+        <p14:creationId xmlns:p14="http://schemas.microsoft.com/office/powerpoint/2010/main" val="1416141381"/>
       </p:ext>
     </p:extLst>
   </p:cSld>
   <p:clrMapOvr>
     <a:masterClrMapping/>
   </p:clrMapOvr>
-  <mc:AlternateContent xmlns:mc="http://schemas.openxmlformats.org/markup-compatibility/2006" xmlns:p14="http://schemas.microsoft.com/office/powerpoint/2010/main">
-    <mc:Choice Requires="p14">
-      <p:transition spd="med" p14:dur="700">
-        <p:fade/>
-      </p:transition>
-    </mc:Choice>
-    <mc:Fallback xmlns="">
-      <p:transition spd="med">
-        <p:fade/>
-      </p:transition>
-    </mc:Fallback>
-  </mc:AlternateContent>
 </p:sld>
 </file>
 
@@ -11910,216 +12106,6 @@
       </p:grpSpPr>
       <p:pic>
         <p:nvPicPr>
-          <p:cNvPr id="1026" name="Picture 2" descr="F20001">
-            <a:extLst>
-              <a:ext uri="{FF2B5EF4-FFF2-40B4-BE49-F238E27FC236}">
-                <a16:creationId xmlns:a16="http://schemas.microsoft.com/office/drawing/2014/main" id="{EA5D6BAF-10A3-4BA7-991F-B8293661AC91}"/>
-              </a:ext>
-            </a:extLst>
-          </p:cNvPr>
-          <p:cNvPicPr>
-            <a:picLocks noChangeAspect="1" noChangeArrowheads="1"/>
-          </p:cNvPicPr>
-          <p:nvPr/>
-        </p:nvPicPr>
-        <p:blipFill>
-          <a:blip r:embed="rId3">
-            <a:extLst>
-              <a:ext uri="{28A0092B-C50C-407E-A947-70E740481C1C}">
-                <a14:useLocalDpi xmlns:a14="http://schemas.microsoft.com/office/drawing/2010/main" val="0"/>
-              </a:ext>
-            </a:extLst>
-          </a:blip>
-          <a:srcRect/>
-          <a:stretch>
-            <a:fillRect/>
-          </a:stretch>
-        </p:blipFill>
-        <p:spPr bwMode="auto">
-          <a:xfrm>
-            <a:off x="2790825" y="704850"/>
-            <a:ext cx="6610350" cy="5448300"/>
-          </a:xfrm>
-          <a:prstGeom prst="rect">
-            <a:avLst/>
-          </a:prstGeom>
-          <a:noFill/>
-          <a:extLst>
-            <a:ext uri="{909E8E84-426E-40DD-AFC4-6F175D3DCCD1}">
-              <a14:hiddenFill xmlns:a14="http://schemas.microsoft.com/office/drawing/2010/main">
-                <a:solidFill>
-                  <a:srgbClr val="FFFFFF"/>
-                </a:solidFill>
-              </a14:hiddenFill>
-            </a:ext>
-          </a:extLst>
-        </p:spPr>
-      </p:pic>
-      <p:sp>
-        <p:nvSpPr>
-          <p:cNvPr id="6" name="TextBox 5">
-            <a:extLst>
-              <a:ext uri="{FF2B5EF4-FFF2-40B4-BE49-F238E27FC236}">
-                <a16:creationId xmlns:a16="http://schemas.microsoft.com/office/drawing/2014/main" id="{F3901A42-F1D9-442B-946D-F8D2306CFE56}"/>
-              </a:ext>
-            </a:extLst>
-          </p:cNvPr>
-          <p:cNvSpPr txBox="1"/>
-          <p:nvPr/>
-        </p:nvSpPr>
-        <p:spPr>
-          <a:xfrm>
-            <a:off x="0" y="6550223"/>
-            <a:ext cx="12192000" cy="307777"/>
-          </a:xfrm>
-          <a:prstGeom prst="rect">
-            <a:avLst/>
-          </a:prstGeom>
-          <a:noFill/>
-        </p:spPr>
-        <p:txBody>
-          <a:bodyPr wrap="square" rtlCol="0">
-            <a:spAutoFit/>
-          </a:bodyPr>
-          <a:lstStyle/>
-          <a:p>
-            <a:r>
-              <a:rPr lang="en-US" sz="1400" dirty="0">
-                <a:solidFill>
-                  <a:schemeClr val="tx1">
-                    <a:lumMod val="65000"/>
-                    <a:lumOff val="35000"/>
-                  </a:schemeClr>
-                </a:solidFill>
-                <a:latin typeface="+mj-lt"/>
-                <a:ea typeface="Verdana" panose="020B0604030504040204" pitchFamily="34" charset="0"/>
-              </a:rPr>
-              <a:t>Source: Glassner, A. (2021). </a:t>
-            </a:r>
-            <a:r>
-              <a:rPr lang="en-US" sz="1400" i="1" dirty="0">
-                <a:solidFill>
-                  <a:schemeClr val="tx1">
-                    <a:lumMod val="65000"/>
-                    <a:lumOff val="35000"/>
-                  </a:schemeClr>
-                </a:solidFill>
-                <a:latin typeface="+mj-lt"/>
-                <a:ea typeface="Verdana" panose="020B0604030504040204" pitchFamily="34" charset="0"/>
-              </a:rPr>
-              <a:t>Deep learning: A visual approach</a:t>
-            </a:r>
-            <a:r>
-              <a:rPr lang="en-US" sz="1400" dirty="0">
-                <a:solidFill>
-                  <a:schemeClr val="tx1">
-                    <a:lumMod val="65000"/>
-                    <a:lumOff val="35000"/>
-                  </a:schemeClr>
-                </a:solidFill>
-                <a:latin typeface="+mj-lt"/>
-                <a:ea typeface="Verdana" panose="020B0604030504040204" pitchFamily="34" charset="0"/>
-              </a:rPr>
-              <a:t>. </a:t>
-            </a:r>
-            <a:r>
-              <a:rPr lang="en-US" sz="1400" b="0" i="0" dirty="0">
-                <a:solidFill>
-                  <a:schemeClr val="tx1">
-                    <a:lumMod val="65000"/>
-                    <a:lumOff val="35000"/>
-                  </a:schemeClr>
-                </a:solidFill>
-                <a:effectLst/>
-                <a:latin typeface="+mj-lt"/>
-                <a:ea typeface="Verdana" panose="020B0604030504040204" pitchFamily="34" charset="0"/>
-              </a:rPr>
-              <a:t>San Francisco, CA: No Starch Press. (Chapter </a:t>
-            </a:r>
-            <a:r>
-              <a:rPr lang="en-US" sz="1400" dirty="0">
-                <a:solidFill>
-                  <a:schemeClr val="tx1">
-                    <a:lumMod val="65000"/>
-                    <a:lumOff val="35000"/>
-                  </a:schemeClr>
-                </a:solidFill>
-                <a:latin typeface="+mj-lt"/>
-                <a:ea typeface="Verdana" panose="020B0604030504040204" pitchFamily="34" charset="0"/>
-              </a:rPr>
-              <a:t>20</a:t>
-            </a:r>
-            <a:r>
-              <a:rPr lang="en-US" sz="1400" b="0" i="0" dirty="0">
-                <a:solidFill>
-                  <a:schemeClr val="tx1">
-                    <a:lumMod val="65000"/>
-                    <a:lumOff val="35000"/>
-                  </a:schemeClr>
-                </a:solidFill>
-                <a:effectLst/>
-                <a:latin typeface="+mj-lt"/>
-                <a:ea typeface="Verdana" panose="020B0604030504040204" pitchFamily="34" charset="0"/>
-              </a:rPr>
-              <a:t>)</a:t>
-            </a:r>
-            <a:endParaRPr lang="en-US" sz="1400" dirty="0">
-              <a:solidFill>
-                <a:schemeClr val="tx1">
-                  <a:lumMod val="65000"/>
-                  <a:lumOff val="35000"/>
-                </a:schemeClr>
-              </a:solidFill>
-              <a:latin typeface="+mj-lt"/>
-              <a:ea typeface="Verdana" panose="020B0604030504040204" pitchFamily="34" charset="0"/>
-            </a:endParaRPr>
-          </a:p>
-        </p:txBody>
-      </p:sp>
-    </p:spTree>
-    <p:extLst>
-      <p:ext uri="{BB962C8B-B14F-4D97-AF65-F5344CB8AC3E}">
-        <p14:creationId xmlns:p14="http://schemas.microsoft.com/office/powerpoint/2010/main" val="4038125349"/>
-      </p:ext>
-    </p:extLst>
-  </p:cSld>
-  <p:clrMapOvr>
-    <a:masterClrMapping/>
-  </p:clrMapOvr>
-  <mc:AlternateContent xmlns:mc="http://schemas.openxmlformats.org/markup-compatibility/2006" xmlns:p14="http://schemas.microsoft.com/office/powerpoint/2010/main">
-    <mc:Choice Requires="p14">
-      <p:transition spd="med" p14:dur="700">
-        <p:fade/>
-      </p:transition>
-    </mc:Choice>
-    <mc:Fallback xmlns="">
-      <p:transition spd="med">
-        <p:fade/>
-      </p:transition>
-    </mc:Fallback>
-  </mc:AlternateContent>
-</p:sld>
-</file>
-
-<file path=ppt/slides/slide4.xml><?xml version="1.0" encoding="utf-8"?>
-<p:sld xmlns:a="http://schemas.openxmlformats.org/drawingml/2006/main" xmlns:r="http://schemas.openxmlformats.org/officeDocument/2006/relationships" xmlns:p="http://schemas.openxmlformats.org/presentationml/2006/main">
-  <p:cSld>
-    <p:spTree>
-      <p:nvGrpSpPr>
-        <p:cNvPr id="1" name=""/>
-        <p:cNvGrpSpPr/>
-        <p:nvPr/>
-      </p:nvGrpSpPr>
-      <p:grpSpPr>
-        <a:xfrm>
-          <a:off x="0" y="0"/>
-          <a:ext cx="0" cy="0"/>
-          <a:chOff x="0" y="0"/>
-          <a:chExt cx="0" cy="0"/>
-        </a:xfrm>
-      </p:grpSpPr>
-      <p:pic>
-        <p:nvPicPr>
           <p:cNvPr id="2050" name="Picture 2" descr="F20002">
             <a:extLst>
               <a:ext uri="{FF2B5EF4-FFF2-40B4-BE49-F238E27FC236}">
@@ -12311,7 +12297,7 @@
 </p:sld>
 </file>
 
-<file path=ppt/slides/slide5.xml><?xml version="1.0" encoding="utf-8"?>
+<file path=ppt/slides/slide4.xml><?xml version="1.0" encoding="utf-8"?>
 <p:sld xmlns:a="http://schemas.openxmlformats.org/drawingml/2006/main" xmlns:r="http://schemas.openxmlformats.org/officeDocument/2006/relationships" xmlns:p="http://schemas.openxmlformats.org/presentationml/2006/main">
   <p:cSld>
     <p:spTree>
@@ -12521,7 +12507,7 @@
 </p:sld>
 </file>
 
-<file path=ppt/slides/slide6.xml><?xml version="1.0" encoding="utf-8"?>
+<file path=ppt/slides/slide5.xml><?xml version="1.0" encoding="utf-8"?>
 <p:sld xmlns:a="http://schemas.openxmlformats.org/drawingml/2006/main" xmlns:r="http://schemas.openxmlformats.org/officeDocument/2006/relationships" xmlns:p="http://schemas.openxmlformats.org/presentationml/2006/main">
   <p:cSld>
     <p:spTree>
@@ -12731,7 +12717,7 @@
 </p:sld>
 </file>
 
-<file path=ppt/slides/slide7.xml><?xml version="1.0" encoding="utf-8"?>
+<file path=ppt/slides/slide6.xml><?xml version="1.0" encoding="utf-8"?>
 <p:sld xmlns:a="http://schemas.openxmlformats.org/drawingml/2006/main" xmlns:r="http://schemas.openxmlformats.org/officeDocument/2006/relationships" xmlns:p="http://schemas.openxmlformats.org/presentationml/2006/main">
   <p:cSld>
     <p:spTree>
@@ -12918,7 +12904,7 @@
 </p:sld>
 </file>
 
-<file path=ppt/slides/slide8.xml><?xml version="1.0" encoding="utf-8"?>
+<file path=ppt/slides/slide7.xml><?xml version="1.0" encoding="utf-8"?>
 <p:sld xmlns:a="http://schemas.openxmlformats.org/drawingml/2006/main" xmlns:r="http://schemas.openxmlformats.org/officeDocument/2006/relationships" xmlns:p="http://schemas.openxmlformats.org/presentationml/2006/main">
   <p:cSld>
     <p:spTree>
@@ -13105,7 +13091,7 @@
 </p:sld>
 </file>
 
-<file path=ppt/slides/slide9.xml><?xml version="1.0" encoding="utf-8"?>
+<file path=ppt/slides/slide8.xml><?xml version="1.0" encoding="utf-8"?>
 <p:sld xmlns:a="http://schemas.openxmlformats.org/drawingml/2006/main" xmlns:r="http://schemas.openxmlformats.org/officeDocument/2006/relationships" xmlns:p="http://schemas.openxmlformats.org/presentationml/2006/main">
   <p:cSld>
     <p:spTree>
@@ -13277,6 +13263,214 @@
     <p:extLst>
       <p:ext uri="{BB962C8B-B14F-4D97-AF65-F5344CB8AC3E}">
         <p14:creationId xmlns:p14="http://schemas.microsoft.com/office/powerpoint/2010/main" val="1854658915"/>
+      </p:ext>
+    </p:extLst>
+  </p:cSld>
+  <p:clrMapOvr>
+    <a:masterClrMapping/>
+  </p:clrMapOvr>
+  <mc:AlternateContent xmlns:mc="http://schemas.openxmlformats.org/markup-compatibility/2006" xmlns:p14="http://schemas.microsoft.com/office/powerpoint/2010/main">
+    <mc:Choice Requires="p14">
+      <p:transition spd="med" p14:dur="700">
+        <p:fade/>
+      </p:transition>
+    </mc:Choice>
+    <mc:Fallback xmlns="">
+      <p:transition spd="med">
+        <p:fade/>
+      </p:transition>
+    </mc:Fallback>
+  </mc:AlternateContent>
+</p:sld>
+</file>
+
+<file path=ppt/slides/slide9.xml><?xml version="1.0" encoding="utf-8"?>
+<p:sld xmlns:a="http://schemas.openxmlformats.org/drawingml/2006/main" xmlns:r="http://schemas.openxmlformats.org/officeDocument/2006/relationships" xmlns:p="http://schemas.openxmlformats.org/presentationml/2006/main">
+  <p:cSld>
+    <p:spTree>
+      <p:nvGrpSpPr>
+        <p:cNvPr id="1" name=""/>
+        <p:cNvGrpSpPr/>
+        <p:nvPr/>
+      </p:nvGrpSpPr>
+      <p:grpSpPr>
+        <a:xfrm>
+          <a:off x="0" y="0"/>
+          <a:ext cx="0" cy="0"/>
+          <a:chOff x="0" y="0"/>
+          <a:chExt cx="0" cy="0"/>
+        </a:xfrm>
+      </p:grpSpPr>
+      <p:sp>
+        <p:nvSpPr>
+          <p:cNvPr id="2" name="Title 1">
+            <a:extLst>
+              <a:ext uri="{FF2B5EF4-FFF2-40B4-BE49-F238E27FC236}">
+                <a16:creationId xmlns:a16="http://schemas.microsoft.com/office/drawing/2014/main" id="{0F853981-B13F-4917-804F-EBF0D4819E7E}"/>
+              </a:ext>
+            </a:extLst>
+          </p:cNvPr>
+          <p:cNvSpPr>
+            <a:spLocks noGrp="1"/>
+          </p:cNvSpPr>
+          <p:nvPr>
+            <p:ph type="title"/>
+          </p:nvPr>
+        </p:nvSpPr>
+        <p:spPr>
+          <a:xfrm>
+            <a:off x="0" y="3169585"/>
+            <a:ext cx="12192000" cy="518830"/>
+          </a:xfrm>
+          <a:noFill/>
+        </p:spPr>
+        <p:txBody>
+          <a:bodyPr>
+            <a:noAutofit/>
+          </a:bodyPr>
+          <a:lstStyle/>
+          <a:p>
+            <a:pPr algn="ctr"/>
+            <a:br>
+              <a:rPr lang="en-US" sz="3600" dirty="0">
+                <a:solidFill>
+                  <a:schemeClr val="tx1">
+                    <a:lumMod val="65000"/>
+                    <a:lumOff val="35000"/>
+                  </a:schemeClr>
+                </a:solidFill>
+                <a:latin typeface="Palatino Linotype" panose="02040502050505030304" pitchFamily="18" charset="0"/>
+              </a:rPr>
+            </a:br>
+            <a:br>
+              <a:rPr lang="en-US" sz="3600" dirty="0">
+                <a:solidFill>
+                  <a:schemeClr val="tx1">
+                    <a:lumMod val="65000"/>
+                    <a:lumOff val="35000"/>
+                  </a:schemeClr>
+                </a:solidFill>
+                <a:latin typeface="Palatino Linotype" panose="02040502050505030304" pitchFamily="18" charset="0"/>
+              </a:rPr>
+            </a:br>
+            <a:r>
+              <a:rPr lang="en-US" sz="3600" dirty="0">
+                <a:solidFill>
+                  <a:schemeClr val="tx1">
+                    <a:lumMod val="65000"/>
+                    <a:lumOff val="35000"/>
+                  </a:schemeClr>
+                </a:solidFill>
+                <a:latin typeface="Palatino Linotype" panose="02040502050505030304" pitchFamily="18" charset="0"/>
+              </a:rPr>
+              <a:t>Word Embedding Demo</a:t>
+            </a:r>
+            <a:endParaRPr lang="en-US" sz="3600" dirty="0">
+              <a:solidFill>
+                <a:schemeClr val="tx1">
+                  <a:lumMod val="65000"/>
+                  <a:lumOff val="35000"/>
+                </a:schemeClr>
+              </a:solidFill>
+              <a:latin typeface="Palatino Linotype" panose="02040502050505030304" pitchFamily="18" charset="0"/>
+              <a:cs typeface="Segoe UI Light" panose="020B0502040204020203" pitchFamily="34" charset="0"/>
+            </a:endParaRPr>
+          </a:p>
+        </p:txBody>
+      </p:sp>
+      <p:sp>
+        <p:nvSpPr>
+          <p:cNvPr id="3" name="Text Placeholder 2">
+            <a:extLst>
+              <a:ext uri="{FF2B5EF4-FFF2-40B4-BE49-F238E27FC236}">
+                <a16:creationId xmlns:a16="http://schemas.microsoft.com/office/drawing/2014/main" id="{098BC2D2-CCF7-4C63-8489-B46BF394FCA2}"/>
+              </a:ext>
+            </a:extLst>
+          </p:cNvPr>
+          <p:cNvSpPr>
+            <a:spLocks noGrp="1"/>
+          </p:cNvSpPr>
+          <p:nvPr>
+            <p:ph type="body" idx="1"/>
+          </p:nvPr>
+        </p:nvSpPr>
+        <p:spPr>
+          <a:xfrm>
+            <a:off x="0" y="4285400"/>
+            <a:ext cx="12192000" cy="518830"/>
+          </a:xfrm>
+        </p:spPr>
+        <p:txBody>
+          <a:bodyPr>
+            <a:normAutofit/>
+          </a:bodyPr>
+          <a:lstStyle/>
+          <a:p>
+            <a:endParaRPr lang="en-US" dirty="0">
+              <a:latin typeface="Palatino Linotype" panose="02040502050505030304" pitchFamily="18" charset="0"/>
+              <a:cs typeface="Segoe UI" panose="020B0502040204020203" pitchFamily="34" charset="0"/>
+            </a:endParaRPr>
+          </a:p>
+          <a:p>
+            <a:endParaRPr lang="en-US" dirty="0">
+              <a:latin typeface="Palatino Linotype" panose="02040502050505030304" pitchFamily="18" charset="0"/>
+              <a:cs typeface="Segoe UI" panose="020B0502040204020203" pitchFamily="34" charset="0"/>
+            </a:endParaRPr>
+          </a:p>
+          <a:p>
+            <a:endParaRPr lang="en-US" dirty="0">
+              <a:latin typeface="Palatino Linotype" panose="02040502050505030304" pitchFamily="18" charset="0"/>
+              <a:cs typeface="Segoe UI" panose="020B0502040204020203" pitchFamily="34" charset="0"/>
+            </a:endParaRPr>
+          </a:p>
+          <a:p>
+            <a:endParaRPr lang="en-US" dirty="0">
+              <a:latin typeface="Palatino Linotype" panose="02040502050505030304" pitchFamily="18" charset="0"/>
+              <a:cs typeface="Segoe UI" panose="020B0502040204020203" pitchFamily="34" charset="0"/>
+            </a:endParaRPr>
+          </a:p>
+          <a:p>
+            <a:endParaRPr lang="en-US" dirty="0">
+              <a:latin typeface="Palatino Linotype" panose="02040502050505030304" pitchFamily="18" charset="0"/>
+              <a:cs typeface="Segoe UI" panose="020B0502040204020203" pitchFamily="34" charset="0"/>
+            </a:endParaRPr>
+          </a:p>
+        </p:txBody>
+      </p:sp>
+      <p:pic>
+        <p:nvPicPr>
+          <p:cNvPr id="4" name="Picture 3">
+            <a:extLst>
+              <a:ext uri="{FF2B5EF4-FFF2-40B4-BE49-F238E27FC236}">
+                <a16:creationId xmlns:a16="http://schemas.microsoft.com/office/drawing/2014/main" id="{4CD7B1E7-8C1E-4394-BD29-073CEC503ACC}"/>
+              </a:ext>
+            </a:extLst>
+          </p:cNvPr>
+          <p:cNvPicPr>
+            <a:picLocks noChangeAspect="1"/>
+          </p:cNvPicPr>
+          <p:nvPr/>
+        </p:nvPicPr>
+        <p:blipFill>
+          <a:blip r:embed="rId3"/>
+          <a:stretch>
+            <a:fillRect/>
+          </a:stretch>
+        </p:blipFill>
+        <p:spPr>
+          <a:xfrm>
+            <a:off x="0" y="365760"/>
+            <a:ext cx="3233668" cy="805144"/>
+          </a:xfrm>
+          <a:prstGeom prst="rect">
+            <a:avLst/>
+          </a:prstGeom>
+        </p:spPr>
+      </p:pic>
+    </p:spTree>
+    <p:extLst>
+      <p:ext uri="{BB962C8B-B14F-4D97-AF65-F5344CB8AC3E}">
+        <p14:creationId xmlns:p14="http://schemas.microsoft.com/office/powerpoint/2010/main" val="3774553972"/>
       </p:ext>
     </p:extLst>
   </p:cSld>

</xml_diff>

<commit_message>
Minor updates + backup baseline.
</commit_message>
<xml_diff>
--- a/presentations/02_word_vectors.pptx
+++ b/presentations/02_word_vectors.pptx
@@ -5,7 +5,7 @@
     <p:sldMasterId id="2147483648" r:id="rId1"/>
   </p:sldMasterIdLst>
   <p:notesMasterIdLst>
-    <p:notesMasterId r:id="rId24"/>
+    <p:notesMasterId r:id="rId25"/>
   </p:notesMasterIdLst>
   <p:sldIdLst>
     <p:sldId id="326" r:id="rId2"/>
@@ -19,17 +19,18 @@
     <p:sldId id="334" r:id="rId10"/>
     <p:sldId id="302" r:id="rId11"/>
     <p:sldId id="305" r:id="rId12"/>
-    <p:sldId id="303" r:id="rId13"/>
-    <p:sldId id="304" r:id="rId14"/>
-    <p:sldId id="309" r:id="rId15"/>
-    <p:sldId id="310" r:id="rId16"/>
-    <p:sldId id="300" r:id="rId17"/>
-    <p:sldId id="308" r:id="rId18"/>
+    <p:sldId id="355" r:id="rId13"/>
+    <p:sldId id="303" r:id="rId14"/>
+    <p:sldId id="304" r:id="rId15"/>
+    <p:sldId id="309" r:id="rId16"/>
+    <p:sldId id="310" r:id="rId17"/>
+    <p:sldId id="300" r:id="rId18"/>
     <p:sldId id="323" r:id="rId19"/>
     <p:sldId id="327" r:id="rId20"/>
     <p:sldId id="329" r:id="rId21"/>
-    <p:sldId id="352" r:id="rId22"/>
-    <p:sldId id="307" r:id="rId23"/>
+    <p:sldId id="308" r:id="rId22"/>
+    <p:sldId id="352" r:id="rId23"/>
+    <p:sldId id="307" r:id="rId24"/>
   </p:sldIdLst>
   <p:sldSz cx="12192000" cy="6858000"/>
   <p:notesSz cx="6858000" cy="9144000"/>
@@ -229,7 +230,7 @@
           <a:p>
             <a:fld id="{FD93C9B2-20F6-4DB1-B471-224337D0AC79}" type="datetimeFigureOut">
               <a:rPr lang="en-US" smtClean="0"/>
-              <a:t>10/20/2022</a:t>
+              <a:t>10/21/2022</a:t>
             </a:fld>
             <a:endParaRPr lang="en-US"/>
           </a:p>
@@ -785,7 +786,7 @@
                 <a:effectLst/>
                 <a:latin typeface="+mn-lt"/>
               </a:rPr>
-              <a:t>Alright, let’s consider another concrete example.  Consider these two sentences: </a:t>
+              <a:t>Let’s consider another concrete example.  Take, for example, these two sentences: </a:t>
             </a:r>
             <a:r>
               <a:rPr lang="en-US" b="0" i="1" dirty="0">
@@ -825,7 +826,7 @@
                 <a:effectLst/>
                 <a:latin typeface="+mn-lt"/>
               </a:rPr>
-              <a:t>The meaning of these two sentences is similar, though the second one is a bit more emphatic.  We’ll start by constructing an exhaustive vocabulary – let’s call it V – consisting of these five words {Have, a, good, great, day}.</a:t>
+              <a:t>The meaning of these two sentences is similar, though the second one is a bit more emphatic.  We’ll start by constructing an exhaustive vocabulary – called V – consisting of these five words {Have, a, good, great, day}.</a:t>
             </a:r>
           </a:p>
         </p:txBody>
@@ -919,7 +920,7 @@
                 <a:effectLst/>
                 <a:latin typeface="+mn-lt"/>
               </a:rPr>
-              <a:t>Now, let us create a </a:t>
+              <a:t>Next, we create a </a:t>
             </a:r>
             <a:r>
               <a:rPr lang="en-US" b="1" i="0" dirty="0">
@@ -939,7 +940,7 @@
                 <a:effectLst/>
                 <a:latin typeface="+mn-lt"/>
               </a:rPr>
-              <a:t>vector for each of these words in V. The length of our one-hot encoded vector would be equal to the size of V (= 5). We would have a vector of zeros except for the element at the index representing the corresponding word in the vocabulary. That particular element would be one. </a:t>
+              <a:t>vector for each of these words. As we see here, the length of each vector is 5, with the position of each word within V indicated by a 1.  The word ‘Have’ is the first word in V and thus the initial digit of its vector is 1.  Now to visualize this encoding, imagine a 5-dimensional space where each word occupies a single dimension and has nothing to do with the rest.  While simple, the problem with this representation is that the words ‘good’ and ‘great’ overlap to a degree.  That is, they share similar meanings.  But one-hot encoding does not capture that.  Word embeddings, on the other hand, can represent relationships and dependencies between words. </a:t>
             </a:r>
           </a:p>
           <a:p>
@@ -954,16 +955,13 @@
           </a:p>
           <a:p>
             <a:pPr algn="l"/>
-            <a:r>
-              <a:rPr lang="en-US" b="0" i="0" dirty="0">
-                <a:solidFill>
-                  <a:srgbClr val="292929"/>
-                </a:solidFill>
-                <a:effectLst/>
-                <a:latin typeface="+mn-lt"/>
-              </a:rPr>
-              <a:t>If we try to visualize these encodings, we can think of a 5-dimensional space, where each word occupies one of the dimensions and has nothing to do with the rest (no projection along the other dimensions). This means ‘good’ and ‘great’ are as different as ‘day’ and ‘have’, which is not true.</a:t>
-            </a:r>
+            <a:endParaRPr lang="en-US" b="0" i="0" dirty="0">
+              <a:solidFill>
+                <a:srgbClr val="292929"/>
+              </a:solidFill>
+              <a:effectLst/>
+              <a:latin typeface="+mn-lt"/>
+            </a:endParaRPr>
           </a:p>
         </p:txBody>
       </p:sp>
@@ -1047,276 +1045,82 @@
           <a:bodyPr/>
           <a:lstStyle/>
           <a:p>
-            <a:pPr algn="l"/>
             <a:r>
               <a:rPr lang="en-US" b="0" i="0" dirty="0">
                 <a:solidFill>
                   <a:srgbClr val="292929"/>
                 </a:solidFill>
                 <a:effectLst/>
-                <a:latin typeface="+mn-lt"/>
-              </a:rPr>
-              <a:t>The CBOW architecture takes the context of each word as the input and tries to predict a missing word, given that context. Consider our example: </a:t>
-            </a:r>
-            <a:r>
-              <a:rPr lang="en-US" b="0" i="1" dirty="0">
-                <a:solidFill>
-                  <a:srgbClr val="292929"/>
-                </a:solidFill>
-                <a:effectLst/>
-                <a:latin typeface="+mn-lt"/>
-              </a:rPr>
-              <a:t>Have a good day.  </a:t>
-            </a:r>
-            <a:r>
-              <a:rPr lang="en-US" b="0" i="0" dirty="0">
-                <a:solidFill>
-                  <a:srgbClr val="292929"/>
-                </a:solidFill>
-                <a:effectLst/>
-                <a:latin typeface="+mn-lt"/>
-              </a:rPr>
-              <a:t>The first three words of that sentence are shown on the left, next to the first three nodes of the input layer.  The network’s goal is to predict the target word (</a:t>
-            </a:r>
-            <a:r>
-              <a:rPr lang="en-US" b="0" i="1" dirty="0">
-                <a:solidFill>
-                  <a:srgbClr val="292929"/>
-                </a:solidFill>
-                <a:effectLst/>
-                <a:latin typeface="+mn-lt"/>
-              </a:rPr>
-              <a:t>day</a:t>
-            </a:r>
-            <a:r>
-              <a:rPr lang="en-US" b="0" i="0" dirty="0">
-                <a:solidFill>
-                  <a:srgbClr val="292929"/>
-                </a:solidFill>
-                <a:effectLst/>
-                <a:latin typeface="+mn-lt"/>
-              </a:rPr>
-              <a:t>), using these context words.  To do that,</a:t>
-            </a:r>
-            <a:r>
-              <a:rPr lang="en-US" b="0" i="1" dirty="0">
-                <a:solidFill>
-                  <a:srgbClr val="292929"/>
-                </a:solidFill>
-                <a:effectLst/>
-                <a:latin typeface="+mn-lt"/>
-              </a:rPr>
-              <a:t> </a:t>
-            </a:r>
-            <a:r>
-              <a:rPr lang="en-US" b="0" i="0" dirty="0">
-                <a:solidFill>
-                  <a:srgbClr val="292929"/>
-                </a:solidFill>
-                <a:effectLst/>
-                <a:latin typeface="+mn-lt"/>
-              </a:rPr>
-              <a:t>we one-hot encode the input words and measure the output error compared to the one-hot encoding of the target word - the word </a:t>
-            </a:r>
-            <a:r>
-              <a:rPr lang="en-US" b="0" i="1" dirty="0">
-                <a:solidFill>
-                  <a:srgbClr val="292929"/>
-                </a:solidFill>
-                <a:effectLst/>
-                <a:latin typeface="+mn-lt"/>
-              </a:rPr>
-              <a:t>d</a:t>
-            </a:r>
-            <a:r>
-              <a:rPr lang="en-US" b="0" i="0" dirty="0">
-                <a:solidFill>
-                  <a:srgbClr val="292929"/>
-                </a:solidFill>
-                <a:effectLst/>
-                <a:latin typeface="+mn-lt"/>
-              </a:rPr>
-              <a:t>ay in this example.  And in the process of predicting the target word, we learn its vector representation.</a:t>
-            </a:r>
-          </a:p>
-          <a:p>
-            <a:pPr algn="l"/>
+                <a:latin typeface="source-serif-pro"/>
+              </a:rPr>
+              <a:t>Word2Vec is a popular word embedder developed at Google by Thomas Mikolov in 2013.  The model comes in two flavors or architectures.  </a:t>
+            </a:r>
+          </a:p>
+          <a:p>
             <a:endParaRPr lang="en-US" b="0" i="0" dirty="0">
               <a:solidFill>
                 <a:srgbClr val="292929"/>
               </a:solidFill>
               <a:effectLst/>
-              <a:latin typeface="+mn-lt"/>
+              <a:latin typeface="source-serif-pro"/>
             </a:endParaRPr>
           </a:p>
           <a:p>
-            <a:pPr algn="l"/>
+            <a:pPr marL="228600" indent="-228600">
+              <a:buAutoNum type="arabicPeriod"/>
+            </a:pPr>
             <a:r>
               <a:rPr lang="en-US" b="0" i="0" dirty="0">
                 <a:solidFill>
                   <a:srgbClr val="292929"/>
                 </a:solidFill>
                 <a:effectLst/>
-                <a:latin typeface="+mn-lt"/>
-              </a:rPr>
-              <a:t>Let’s take a closer look at the architecture.</a:t>
-            </a:r>
-          </a:p>
-          <a:p>
-            <a:pPr algn="l"/>
+                <a:latin typeface="source-serif-pro"/>
+              </a:rPr>
+              <a:t>The first is CBOW, the acronym for Common Bag of Words.  </a:t>
+            </a:r>
+          </a:p>
+          <a:p>
+            <a:pPr marL="228600" indent="-228600">
+              <a:buAutoNum type="arabicPeriod"/>
+            </a:pPr>
+            <a:r>
+              <a:rPr lang="en-US" b="0" i="0" dirty="0">
+                <a:solidFill>
+                  <a:srgbClr val="292929"/>
+                </a:solidFill>
+                <a:effectLst/>
+                <a:latin typeface="source-serif-pro"/>
+              </a:rPr>
+              <a:t>And the second is Skip-Gram.</a:t>
+            </a:r>
+          </a:p>
+          <a:p>
+            <a:pPr marL="228600" indent="-228600">
+              <a:buAutoNum type="arabicPeriod"/>
+            </a:pPr>
             <a:endParaRPr lang="en-US" b="0" i="0" dirty="0">
               <a:solidFill>
                 <a:srgbClr val="292929"/>
               </a:solidFill>
               <a:effectLst/>
-              <a:latin typeface="+mn-lt"/>
+              <a:latin typeface="source-serif-pro"/>
             </a:endParaRPr>
           </a:p>
           <a:p>
-            <a:pPr algn="l"/>
+            <a:pPr marL="0" indent="0">
+              <a:buNone/>
+            </a:pPr>
             <a:r>
               <a:rPr lang="en-US" b="0" i="0" dirty="0">
                 <a:solidFill>
                   <a:srgbClr val="292929"/>
                 </a:solidFill>
                 <a:effectLst/>
-                <a:latin typeface="+mn-lt"/>
-              </a:rPr>
-              <a:t>The input to the neural network is a one hot encoded vector – labeled V for Vocabulary – of size N, with one input for each word. The hidden layer (D) contains M neurons or nodes, with the number of nodes or neurons in this layer set by Word2Vec’s size argument.  Word vector sizes vary, though dimensions of 768 and 1024 are common.  And finally, the output is a vector (labelled V for vocabulary) of size N, with each element being a softmax value.</a:t>
-            </a:r>
-          </a:p>
-          <a:p>
-            <a:pPr algn="l"/>
-            <a:endParaRPr lang="en-US" b="0" i="0" dirty="0">
-              <a:solidFill>
-                <a:srgbClr val="292929"/>
-              </a:solidFill>
-              <a:effectLst/>
-              <a:latin typeface="+mn-lt"/>
-            </a:endParaRPr>
-          </a:p>
-          <a:p>
-            <a:pPr algn="l"/>
-            <a:r>
-              <a:rPr lang="en-US" b="0" i="0" dirty="0">
-                <a:solidFill>
-                  <a:srgbClr val="292929"/>
-                </a:solidFill>
-                <a:effectLst/>
-                <a:latin typeface="+mn-lt"/>
-              </a:rPr>
-              <a:t>Let’s review the terms in this image:</a:t>
-            </a:r>
-            <a:br>
-              <a:rPr lang="en-US" b="0" i="0" dirty="0">
-                <a:solidFill>
-                  <a:srgbClr val="292929"/>
-                </a:solidFill>
-                <a:effectLst/>
-                <a:latin typeface="+mn-lt"/>
-              </a:rPr>
-            </a:br>
-            <a:r>
-              <a:rPr lang="en-US" b="0" i="1" dirty="0">
-                <a:solidFill>
-                  <a:srgbClr val="292929"/>
-                </a:solidFill>
-                <a:effectLst/>
-                <a:latin typeface="+mn-lt"/>
-              </a:rPr>
-              <a:t>- This is a simple neural network with 3 layers – input, hidden, and output.</a:t>
-            </a:r>
-          </a:p>
-          <a:p>
-            <a:pPr algn="l"/>
-            <a:r>
-              <a:rPr lang="en-US" b="0" i="1" dirty="0">
-                <a:solidFill>
-                  <a:srgbClr val="292929"/>
-                </a:solidFill>
-                <a:effectLst/>
-                <a:latin typeface="+mn-lt"/>
-              </a:rPr>
-              <a:t>- W is the weight matrix that maps the input V to the hidden layer (a V*D dimensional matrix)</a:t>
-            </a:r>
-            <a:br>
-              <a:rPr lang="en-US" b="0" i="1" dirty="0">
-                <a:solidFill>
-                  <a:srgbClr val="292929"/>
-                </a:solidFill>
-                <a:effectLst/>
-                <a:latin typeface="+mn-lt"/>
-              </a:rPr>
-            </a:br>
-            <a:r>
-              <a:rPr lang="en-US" b="0" i="0" dirty="0">
-                <a:solidFill>
-                  <a:srgbClr val="292929"/>
-                </a:solidFill>
-                <a:effectLst/>
-                <a:latin typeface="+mn-lt"/>
-              </a:rPr>
-              <a:t>- </a:t>
-            </a:r>
-            <a:r>
-              <a:rPr lang="en-US" b="0" i="1" dirty="0">
-                <a:solidFill>
-                  <a:srgbClr val="292929"/>
-                </a:solidFill>
-                <a:effectLst/>
-                <a:latin typeface="+mn-lt"/>
-              </a:rPr>
-              <a:t>W’ is the weight matrix that maps the hidden layer outputs to the output layer (a D*V dimensional matrix)</a:t>
-            </a:r>
-          </a:p>
-          <a:p>
-            <a:pPr algn="l"/>
-            <a:r>
-              <a:rPr lang="en-US" b="0" i="1" dirty="0">
-                <a:solidFill>
-                  <a:srgbClr val="292929"/>
-                </a:solidFill>
-                <a:effectLst/>
-                <a:latin typeface="+mn-lt"/>
-              </a:rPr>
-              <a:t>- The dashed arrow lines indicate the direction of forward propagation as well as the fact that these are fully connected layers</a:t>
-            </a:r>
-          </a:p>
-          <a:p>
-            <a:pPr algn="l"/>
-            <a:endParaRPr lang="en-US" b="0" i="0" dirty="0">
-              <a:solidFill>
-                <a:srgbClr val="292929"/>
-              </a:solidFill>
-              <a:effectLst/>
-              <a:latin typeface="+mn-lt"/>
-            </a:endParaRPr>
-          </a:p>
-          <a:p>
-            <a:pPr algn="l"/>
-            <a:r>
-              <a:rPr lang="en-US" b="0" i="0" dirty="0">
-                <a:solidFill>
-                  <a:srgbClr val="292929"/>
-                </a:solidFill>
-                <a:effectLst/>
-                <a:latin typeface="+mn-lt"/>
-              </a:rPr>
-              <a:t>I won’t get into the mathematics. We’ll just get an idea of what’s going on.  Let’s zoom in on that hidden layer.</a:t>
-            </a:r>
-          </a:p>
-          <a:p>
-            <a:pPr algn="l"/>
-            <a:endParaRPr lang="en-US" b="0" i="0" dirty="0">
-              <a:solidFill>
-                <a:srgbClr val="292929"/>
-              </a:solidFill>
-              <a:effectLst/>
-              <a:latin typeface="charter"/>
-            </a:endParaRPr>
-          </a:p>
-          <a:p>
-            <a:pPr algn="l"/>
+                <a:latin typeface="source-serif-pro"/>
+              </a:rPr>
+              <a:t>Let’s first consider the CBOW architecture…</a:t>
+            </a:r>
             <a:endParaRPr lang="en-US" dirty="0"/>
           </a:p>
         </p:txBody>
@@ -1347,7 +1151,7 @@
     </p:spTree>
     <p:extLst>
       <p:ext uri="{BB962C8B-B14F-4D97-AF65-F5344CB8AC3E}">
-        <p14:creationId xmlns:p14="http://schemas.microsoft.com/office/powerpoint/2010/main" val="2773462212"/>
+        <p14:creationId xmlns:p14="http://schemas.microsoft.com/office/powerpoint/2010/main" val="933822473"/>
       </p:ext>
     </p:extLst>
   </p:cSld>
@@ -1410,7 +1214,253 @@
                 <a:effectLst/>
                 <a:latin typeface="+mn-lt"/>
               </a:rPr>
-              <a:t>In this example, the one hot encoded input vector is displayed, with 1’s indicating the presence of a specific word and 0’s indicating absence.  Unlike a traditional neural network, there is no activation function like sigmoid, tanh, or ReLU. The only non-linearity is the softmax calculations in the output layer.  All that is present in the hidden nodes is a net input function that sums up the incoming values – the values in the input vector multiplied by the weights in the W matrix.  In the output on the right, we see that softmax is 95% certain that the next word is ‘day’ with a 5% probability that it is ‘great.’  Keep in mind that softmax output always sums to 1 or 100%, as is the case here.</a:t>
+              <a:t>The CBOW architecture takes the context of each word as the input and tries to predict a missing word, given that context. Consider our example: </a:t>
+            </a:r>
+            <a:r>
+              <a:rPr lang="en-US" b="0" i="1" dirty="0">
+                <a:solidFill>
+                  <a:srgbClr val="292929"/>
+                </a:solidFill>
+                <a:effectLst/>
+                <a:latin typeface="+mn-lt"/>
+              </a:rPr>
+              <a:t>Have a good day.  </a:t>
+            </a:r>
+            <a:r>
+              <a:rPr lang="en-US" b="0" i="0" dirty="0">
+                <a:solidFill>
+                  <a:srgbClr val="292929"/>
+                </a:solidFill>
+                <a:effectLst/>
+                <a:latin typeface="+mn-lt"/>
+              </a:rPr>
+              <a:t>The first three words of that sentence are shown on the left, next to the first three nodes of the input layer.  The network’s goal is to predict the target word (</a:t>
+            </a:r>
+            <a:r>
+              <a:rPr lang="en-US" b="0" i="1" dirty="0">
+                <a:solidFill>
+                  <a:srgbClr val="292929"/>
+                </a:solidFill>
+                <a:effectLst/>
+                <a:latin typeface="+mn-lt"/>
+              </a:rPr>
+              <a:t>day</a:t>
+            </a:r>
+            <a:r>
+              <a:rPr lang="en-US" b="0" i="0" dirty="0">
+                <a:solidFill>
+                  <a:srgbClr val="292929"/>
+                </a:solidFill>
+                <a:effectLst/>
+                <a:latin typeface="+mn-lt"/>
+              </a:rPr>
+              <a:t>), using these context words.  To do that,</a:t>
+            </a:r>
+            <a:r>
+              <a:rPr lang="en-US" b="0" i="1" dirty="0">
+                <a:solidFill>
+                  <a:srgbClr val="292929"/>
+                </a:solidFill>
+                <a:effectLst/>
+                <a:latin typeface="+mn-lt"/>
+              </a:rPr>
+              <a:t> </a:t>
+            </a:r>
+            <a:r>
+              <a:rPr lang="en-US" b="0" i="0" dirty="0">
+                <a:solidFill>
+                  <a:srgbClr val="292929"/>
+                </a:solidFill>
+                <a:effectLst/>
+                <a:latin typeface="+mn-lt"/>
+              </a:rPr>
+              <a:t>we one-hot encode the input words and measure the output error compared to the one-hot encoding of the target word - the word </a:t>
+            </a:r>
+            <a:r>
+              <a:rPr lang="en-US" b="0" i="1" dirty="0">
+                <a:solidFill>
+                  <a:srgbClr val="292929"/>
+                </a:solidFill>
+                <a:effectLst/>
+                <a:latin typeface="+mn-lt"/>
+              </a:rPr>
+              <a:t>d</a:t>
+            </a:r>
+            <a:r>
+              <a:rPr lang="en-US" b="0" i="0" dirty="0">
+                <a:solidFill>
+                  <a:srgbClr val="292929"/>
+                </a:solidFill>
+                <a:effectLst/>
+                <a:latin typeface="+mn-lt"/>
+              </a:rPr>
+              <a:t>ay in this example.  And in the process of predicting the target word, we learn its vector representation.</a:t>
+            </a:r>
+          </a:p>
+          <a:p>
+            <a:pPr algn="l"/>
+            <a:endParaRPr lang="en-US" b="0" i="0" dirty="0">
+              <a:solidFill>
+                <a:srgbClr val="292929"/>
+              </a:solidFill>
+              <a:effectLst/>
+              <a:latin typeface="+mn-lt"/>
+            </a:endParaRPr>
+          </a:p>
+          <a:p>
+            <a:pPr algn="l"/>
+            <a:r>
+              <a:rPr lang="en-US" b="0" i="0" dirty="0">
+                <a:solidFill>
+                  <a:srgbClr val="292929"/>
+                </a:solidFill>
+                <a:effectLst/>
+                <a:latin typeface="+mn-lt"/>
+              </a:rPr>
+              <a:t>Let’s take a closer look at the architecture.</a:t>
+            </a:r>
+          </a:p>
+          <a:p>
+            <a:pPr algn="l"/>
+            <a:endParaRPr lang="en-US" b="0" i="0" dirty="0">
+              <a:solidFill>
+                <a:srgbClr val="292929"/>
+              </a:solidFill>
+              <a:effectLst/>
+              <a:latin typeface="+mn-lt"/>
+            </a:endParaRPr>
+          </a:p>
+          <a:p>
+            <a:pPr algn="l"/>
+            <a:r>
+              <a:rPr lang="en-US" b="0" i="0" dirty="0">
+                <a:solidFill>
+                  <a:srgbClr val="292929"/>
+                </a:solidFill>
+                <a:effectLst/>
+                <a:latin typeface="+mn-lt"/>
+              </a:rPr>
+              <a:t>The input to the neural network is a one hot encoded vector – labeled V for Vocabulary – of size N, with one input for each word. The hidden layer (D) contains M neurons or nodes, with the number of nodes or neurons in this layer set by Word2Vec’s size argument.  Word vector sizes vary, though dimensions of 768 and 1024 are common.  And finally, the output is a vector (labelled V for vocabulary) of size N, with each element being a softmax value.</a:t>
+            </a:r>
+          </a:p>
+          <a:p>
+            <a:pPr algn="l"/>
+            <a:endParaRPr lang="en-US" b="0" i="0" dirty="0">
+              <a:solidFill>
+                <a:srgbClr val="292929"/>
+              </a:solidFill>
+              <a:effectLst/>
+              <a:latin typeface="+mn-lt"/>
+            </a:endParaRPr>
+          </a:p>
+          <a:p>
+            <a:pPr algn="l"/>
+            <a:r>
+              <a:rPr lang="en-US" b="0" i="0" dirty="0">
+                <a:solidFill>
+                  <a:srgbClr val="292929"/>
+                </a:solidFill>
+                <a:effectLst/>
+                <a:latin typeface="+mn-lt"/>
+              </a:rPr>
+              <a:t>Let’s review the terms in this image:</a:t>
+            </a:r>
+            <a:br>
+              <a:rPr lang="en-US" b="0" i="0" dirty="0">
+                <a:solidFill>
+                  <a:srgbClr val="292929"/>
+                </a:solidFill>
+                <a:effectLst/>
+                <a:latin typeface="+mn-lt"/>
+              </a:rPr>
+            </a:br>
+            <a:r>
+              <a:rPr lang="en-US" b="0" i="1" dirty="0">
+                <a:solidFill>
+                  <a:srgbClr val="292929"/>
+                </a:solidFill>
+                <a:effectLst/>
+                <a:latin typeface="+mn-lt"/>
+              </a:rPr>
+              <a:t>- This is a simple neural network with 3 layers – input, hidden, and output.</a:t>
+            </a:r>
+          </a:p>
+          <a:p>
+            <a:pPr algn="l"/>
+            <a:r>
+              <a:rPr lang="en-US" b="0" i="1" dirty="0">
+                <a:solidFill>
+                  <a:srgbClr val="292929"/>
+                </a:solidFill>
+                <a:effectLst/>
+                <a:latin typeface="+mn-lt"/>
+              </a:rPr>
+              <a:t>- W is the weight matrix that maps the input V to the hidden layer (a V*D dimensional matrix)</a:t>
+            </a:r>
+            <a:br>
+              <a:rPr lang="en-US" b="0" i="1" dirty="0">
+                <a:solidFill>
+                  <a:srgbClr val="292929"/>
+                </a:solidFill>
+                <a:effectLst/>
+                <a:latin typeface="+mn-lt"/>
+              </a:rPr>
+            </a:br>
+            <a:r>
+              <a:rPr lang="en-US" b="0" i="0" dirty="0">
+                <a:solidFill>
+                  <a:srgbClr val="292929"/>
+                </a:solidFill>
+                <a:effectLst/>
+                <a:latin typeface="+mn-lt"/>
+              </a:rPr>
+              <a:t>- </a:t>
+            </a:r>
+            <a:r>
+              <a:rPr lang="en-US" b="0" i="1" dirty="0">
+                <a:solidFill>
+                  <a:srgbClr val="292929"/>
+                </a:solidFill>
+                <a:effectLst/>
+                <a:latin typeface="+mn-lt"/>
+              </a:rPr>
+              <a:t>W’ is the weight matrix that maps the hidden layer outputs to the output layer (a D*V dimensional matrix)</a:t>
+            </a:r>
+          </a:p>
+          <a:p>
+            <a:pPr algn="l"/>
+            <a:r>
+              <a:rPr lang="en-US" b="0" i="1" dirty="0">
+                <a:solidFill>
+                  <a:srgbClr val="292929"/>
+                </a:solidFill>
+                <a:effectLst/>
+                <a:latin typeface="+mn-lt"/>
+              </a:rPr>
+              <a:t>- The dashed arrow lines indicate the direction of forward propagation as well as the fact that these are fully connected layers</a:t>
+            </a:r>
+          </a:p>
+          <a:p>
+            <a:pPr algn="l"/>
+            <a:endParaRPr lang="en-US" b="0" i="0" dirty="0">
+              <a:solidFill>
+                <a:srgbClr val="292929"/>
+              </a:solidFill>
+              <a:effectLst/>
+              <a:latin typeface="+mn-lt"/>
+            </a:endParaRPr>
+          </a:p>
+          <a:p>
+            <a:pPr algn="l"/>
+            <a:r>
+              <a:rPr lang="en-US" b="0" i="0" dirty="0">
+                <a:solidFill>
+                  <a:srgbClr val="292929"/>
+                </a:solidFill>
+                <a:effectLst/>
+                <a:latin typeface="+mn-lt"/>
+              </a:rPr>
+              <a:t>I won’t get into the mathematics. We’ll just get an idea of what’s going on.  Let’s zoom in on that hidden layer.</a:t>
             </a:r>
           </a:p>
           <a:p>
@@ -1423,6 +1473,10 @@
               <a:latin typeface="charter"/>
             </a:endParaRPr>
           </a:p>
+          <a:p>
+            <a:pPr algn="l"/>
+            <a:endParaRPr lang="en-US" dirty="0"/>
+          </a:p>
         </p:txBody>
       </p:sp>
       <p:sp>
@@ -1451,7 +1505,7 @@
     </p:spTree>
     <p:extLst>
       <p:ext uri="{BB962C8B-B14F-4D97-AF65-F5344CB8AC3E}">
-        <p14:creationId xmlns:p14="http://schemas.microsoft.com/office/powerpoint/2010/main" val="775656603"/>
+        <p14:creationId xmlns:p14="http://schemas.microsoft.com/office/powerpoint/2010/main" val="2773462212"/>
       </p:ext>
     </p:extLst>
   </p:cSld>
@@ -1514,30 +1568,17 @@
                 <a:effectLst/>
                 <a:latin typeface="+mn-lt"/>
               </a:rPr>
-              <a:t>So far, we have seen how a missing word can be predicted, using context words.  The CBOW architecture does just that.  Here we see that the context words predict </a:t>
-            </a:r>
-            <a:r>
-              <a:rPr lang="en-US" b="1" i="0" dirty="0">
-                <a:solidFill>
-                  <a:srgbClr val="292929"/>
-                </a:solidFill>
-                <a:effectLst/>
-                <a:latin typeface="+mn-lt"/>
-              </a:rPr>
-              <a:t>cat</a:t>
-            </a:r>
-            <a:r>
-              <a:rPr lang="en-US" b="0" i="0" dirty="0">
-                <a:solidFill>
-                  <a:srgbClr val="292929"/>
-                </a:solidFill>
-                <a:effectLst/>
-                <a:latin typeface="+mn-lt"/>
-              </a:rPr>
-              <a:t> as the missing word. CBOW is relatively fast and generates better representations for more frequent words.  But we can flip this model…</a:t>
-            </a:r>
-            <a:endParaRPr lang="en-US" dirty="0">
-              <a:latin typeface="+mn-lt"/>
+              <a:t>In this example, the one hot encoded input vector is displayed, with 1’s indicating the presence of a specific word and 0’s indicating absence.  Unlike a traditional neural network, there is no activation function like sigmoid, tanh, or ReLU. The only non-linearity is the softmax calculations in the output layer.  All that is present in the hidden nodes is a net input function that sums up the incoming values – the values in the input vector multiplied by the weights in the W matrix.  In the output on the right, we see that softmax is 95% certain that the next word is ‘day’ with a 5% probability that it is ‘great.’  Keep in mind that softmax output always sums to 1 or 100%, as is the case here.</a:t>
+            </a:r>
+          </a:p>
+          <a:p>
+            <a:pPr algn="l"/>
+            <a:endParaRPr lang="en-US" b="0" i="0" dirty="0">
+              <a:solidFill>
+                <a:srgbClr val="292929"/>
+              </a:solidFill>
+              <a:effectLst/>
+              <a:latin typeface="charter"/>
             </a:endParaRPr>
           </a:p>
         </p:txBody>
@@ -1568,7 +1609,7 @@
     </p:spTree>
     <p:extLst>
       <p:ext uri="{BB962C8B-B14F-4D97-AF65-F5344CB8AC3E}">
-        <p14:creationId xmlns:p14="http://schemas.microsoft.com/office/powerpoint/2010/main" val="4223312273"/>
+        <p14:creationId xmlns:p14="http://schemas.microsoft.com/office/powerpoint/2010/main" val="775656603"/>
       </p:ext>
     </p:extLst>
   </p:cSld>
@@ -1631,8 +1672,31 @@
                 <a:effectLst/>
                 <a:latin typeface="+mn-lt"/>
               </a:rPr>
-              <a:t>With the Skip-Gram architecture, a single target word is used to predict all its context words. Skip Gram works well with small amounts of data as well as rare words.</a:t>
-            </a:r>
+              <a:t>So far, we have seen how a missing word can be predicted, using context words.  The CBOW architecture does just that.  Here we see that the context words predict </a:t>
+            </a:r>
+            <a:r>
+              <a:rPr lang="en-US" b="1" i="0" dirty="0">
+                <a:solidFill>
+                  <a:srgbClr val="292929"/>
+                </a:solidFill>
+                <a:effectLst/>
+                <a:latin typeface="+mn-lt"/>
+              </a:rPr>
+              <a:t>cat</a:t>
+            </a:r>
+            <a:r>
+              <a:rPr lang="en-US" b="0" i="0" dirty="0">
+                <a:solidFill>
+                  <a:srgbClr val="292929"/>
+                </a:solidFill>
+                <a:effectLst/>
+                <a:latin typeface="+mn-lt"/>
+              </a:rPr>
+              <a:t> as the missing word. CBOW is relatively fast and generates better representations for more frequent words.  But we can flip this model…</a:t>
+            </a:r>
+            <a:endParaRPr lang="en-US" dirty="0">
+              <a:latin typeface="+mn-lt"/>
+            </a:endParaRPr>
           </a:p>
         </p:txBody>
       </p:sp>
@@ -1662,7 +1726,7 @@
     </p:spTree>
     <p:extLst>
       <p:ext uri="{BB962C8B-B14F-4D97-AF65-F5344CB8AC3E}">
-        <p14:creationId xmlns:p14="http://schemas.microsoft.com/office/powerpoint/2010/main" val="2760553801"/>
+        <p14:creationId xmlns:p14="http://schemas.microsoft.com/office/powerpoint/2010/main" val="4223312273"/>
       </p:ext>
     </p:extLst>
   </p:cSld>
@@ -1716,257 +1780,17 @@
           <a:bodyPr/>
           <a:lstStyle/>
           <a:p>
-            <a:pPr marL="0" marR="0" lvl="0" indent="0" algn="l" defTabSz="914400" rtl="0" eaLnBrk="1" fontAlgn="auto" latinLnBrk="0" hangingPunct="1">
-              <a:lnSpc>
-                <a:spcPct val="100000"/>
-              </a:lnSpc>
-              <a:spcBef>
-                <a:spcPts val="0"/>
-              </a:spcBef>
-              <a:spcAft>
-                <a:spcPts val="0"/>
-              </a:spcAft>
-              <a:buClrTx/>
-              <a:buSzTx/>
-              <a:buFontTx/>
-              <a:buNone/>
-              <a:tabLst/>
-              <a:defRPr/>
-            </a:pPr>
-            <a:r>
-              <a:rPr lang="en-US" sz="1200" dirty="0">
+            <a:pPr algn="l"/>
+            <a:r>
+              <a:rPr lang="en-US" b="0" i="0" dirty="0">
+                <a:solidFill>
+                  <a:srgbClr val="292929"/>
+                </a:solidFill>
                 <a:effectLst/>
                 <a:latin typeface="+mn-lt"/>
-                <a:ea typeface="Calibri" panose="020F0502020204030204" pitchFamily="34" charset="0"/>
-              </a:rPr>
-              <a:t>We have one final concept to introduce.  Again, the basic idea behind word embeddings is that we want words which appear in similar contexts to be spatially close to each other.  M</a:t>
-            </a:r>
-            <a:r>
-              <a:rPr lang="en-US" b="0" i="0" dirty="0">
-                <a:solidFill>
-                  <a:srgbClr val="292929"/>
-                </a:solidFill>
-                <a:effectLst/>
-                <a:latin typeface="+mn-lt"/>
-              </a:rPr>
-              <a:t>athematically, what we want is for the cosine of the angle between such vectors to be close to 1.  That is, the angle close to 0.  In this image:</a:t>
-            </a:r>
-          </a:p>
-          <a:p>
-            <a:pPr marL="228600" marR="0" lvl="0" indent="-228600" algn="l" defTabSz="914400" rtl="0" eaLnBrk="1" fontAlgn="auto" latinLnBrk="0" hangingPunct="1">
-              <a:lnSpc>
-                <a:spcPct val="100000"/>
-              </a:lnSpc>
-              <a:spcBef>
-                <a:spcPts val="0"/>
-              </a:spcBef>
-              <a:spcAft>
-                <a:spcPts val="0"/>
-              </a:spcAft>
-              <a:buClrTx/>
-              <a:buSzTx/>
-              <a:buFontTx/>
-              <a:buAutoNum type="arabicPeriod"/>
-              <a:tabLst/>
-              <a:defRPr/>
-            </a:pPr>
-            <a:r>
-              <a:rPr lang="en-US" b="0" i="0" dirty="0">
-                <a:solidFill>
-                  <a:srgbClr val="292929"/>
-                </a:solidFill>
-                <a:effectLst/>
-                <a:latin typeface="+mn-lt"/>
-              </a:rPr>
-              <a:t>Po the Panda is the word vector for ‘good’ </a:t>
-            </a:r>
-          </a:p>
-          <a:p>
-            <a:pPr marL="228600" marR="0" lvl="0" indent="-228600" algn="l" defTabSz="914400" rtl="0" eaLnBrk="1" fontAlgn="auto" latinLnBrk="0" hangingPunct="1">
-              <a:lnSpc>
-                <a:spcPct val="100000"/>
-              </a:lnSpc>
-              <a:spcBef>
-                <a:spcPts val="0"/>
-              </a:spcBef>
-              <a:spcAft>
-                <a:spcPts val="0"/>
-              </a:spcAft>
-              <a:buClrTx/>
-              <a:buSzTx/>
-              <a:buFontTx/>
-              <a:buAutoNum type="arabicPeriod"/>
-              <a:tabLst/>
-              <a:defRPr/>
-            </a:pPr>
-            <a:r>
-              <a:rPr lang="en-US" b="0" i="0" dirty="0">
-                <a:solidFill>
-                  <a:srgbClr val="292929"/>
-                </a:solidFill>
-                <a:effectLst/>
-                <a:latin typeface="+mn-lt"/>
-              </a:rPr>
-              <a:t>While Master Tigress is the word vector for ‘great’.</a:t>
-            </a:r>
-          </a:p>
-          <a:p>
-            <a:pPr marL="0" marR="0" lvl="0" indent="0" algn="l" defTabSz="914400" rtl="0" eaLnBrk="1" fontAlgn="auto" latinLnBrk="0" hangingPunct="1">
-              <a:lnSpc>
-                <a:spcPct val="100000"/>
-              </a:lnSpc>
-              <a:spcBef>
-                <a:spcPts val="0"/>
-              </a:spcBef>
-              <a:spcAft>
-                <a:spcPts val="0"/>
-              </a:spcAft>
-              <a:buClrTx/>
-              <a:buSzTx/>
-              <a:buFontTx/>
-              <a:buNone/>
-              <a:tabLst/>
-              <a:defRPr/>
-            </a:pPr>
-            <a:endParaRPr lang="en-US" b="0" i="0" dirty="0">
-              <a:solidFill>
-                <a:srgbClr val="292929"/>
-              </a:solidFill>
-              <a:effectLst/>
-              <a:latin typeface="+mn-lt"/>
-            </a:endParaRPr>
-          </a:p>
-          <a:p>
-            <a:pPr marL="0" marR="0" lvl="0" indent="0" algn="l" defTabSz="914400" rtl="0" eaLnBrk="1" fontAlgn="auto" latinLnBrk="0" hangingPunct="1">
-              <a:lnSpc>
-                <a:spcPct val="100000"/>
-              </a:lnSpc>
-              <a:spcBef>
-                <a:spcPts val="0"/>
-              </a:spcBef>
-              <a:spcAft>
-                <a:spcPts val="0"/>
-              </a:spcAft>
-              <a:buClrTx/>
-              <a:buSzTx/>
-              <a:buFontTx/>
-              <a:buNone/>
-              <a:tabLst/>
-              <a:defRPr/>
-            </a:pPr>
-            <a:r>
-              <a:rPr lang="en-US" b="0" i="0" dirty="0">
-                <a:solidFill>
-                  <a:srgbClr val="292929"/>
-                </a:solidFill>
-                <a:effectLst/>
-                <a:latin typeface="+mn-lt"/>
-              </a:rPr>
-              <a:t>In one hot encoding representations, all the words are independent of each other.  But with word embeddings, that is not the case.  Here we introduce some </a:t>
-            </a:r>
-            <a:r>
-              <a:rPr lang="en-US" b="0" i="1" dirty="0">
-                <a:solidFill>
-                  <a:srgbClr val="292929"/>
-                </a:solidFill>
-                <a:effectLst/>
-                <a:latin typeface="+mn-lt"/>
-              </a:rPr>
-              <a:t>dependence</a:t>
-            </a:r>
-            <a:r>
-              <a:rPr lang="en-US" b="0" i="0" dirty="0">
-                <a:solidFill>
-                  <a:srgbClr val="292929"/>
-                </a:solidFill>
-                <a:effectLst/>
-                <a:latin typeface="+mn-lt"/>
-              </a:rPr>
-              <a:t> of one word on the other words. The goal is to generate an </a:t>
-            </a:r>
-            <a:r>
-              <a:rPr lang="en-US" b="1" i="0" dirty="0">
-                <a:solidFill>
-                  <a:srgbClr val="292929"/>
-                </a:solidFill>
-                <a:effectLst/>
-                <a:latin typeface="+mn-lt"/>
-              </a:rPr>
-              <a:t>embedding </a:t>
-            </a:r>
-            <a:r>
-              <a:rPr lang="en-US" b="0" i="0" dirty="0">
-                <a:solidFill>
-                  <a:srgbClr val="292929"/>
-                </a:solidFill>
-                <a:effectLst/>
-                <a:latin typeface="+mn-lt"/>
-              </a:rPr>
-              <a:t>for each word in a vocabulary, a unique location in a high-dimensional space that captures its relationship to other words in that vocabulary.</a:t>
-            </a:r>
-            <a:endParaRPr lang="en-US" b="1" i="0" dirty="0">
-              <a:solidFill>
-                <a:srgbClr val="292929"/>
-              </a:solidFill>
-              <a:effectLst/>
-              <a:latin typeface="+mn-lt"/>
-            </a:endParaRPr>
-          </a:p>
-          <a:p>
-            <a:pPr marL="0" marR="0" lvl="0" indent="0" algn="l" defTabSz="914400" rtl="0" eaLnBrk="1" fontAlgn="auto" latinLnBrk="0" hangingPunct="1">
-              <a:lnSpc>
-                <a:spcPct val="100000"/>
-              </a:lnSpc>
-              <a:spcBef>
-                <a:spcPts val="0"/>
-              </a:spcBef>
-              <a:spcAft>
-                <a:spcPts val="0"/>
-              </a:spcAft>
-              <a:buClrTx/>
-              <a:buSzTx/>
-              <a:buFontTx/>
-              <a:buNone/>
-              <a:tabLst/>
-              <a:defRPr/>
-            </a:pPr>
-            <a:endParaRPr lang="en-US" b="0" i="0" dirty="0">
-              <a:solidFill>
-                <a:srgbClr val="292929"/>
-              </a:solidFill>
-              <a:effectLst/>
-              <a:latin typeface="charter"/>
-            </a:endParaRPr>
-          </a:p>
-          <a:p>
-            <a:pPr marL="0" marR="0" lvl="0" indent="0" algn="l" defTabSz="914400" rtl="0" eaLnBrk="1" fontAlgn="auto" latinLnBrk="0" hangingPunct="1">
-              <a:lnSpc>
-                <a:spcPct val="100000"/>
-              </a:lnSpc>
-              <a:spcBef>
-                <a:spcPts val="0"/>
-              </a:spcBef>
-              <a:spcAft>
-                <a:spcPts val="0"/>
-              </a:spcAft>
-              <a:buClrTx/>
-              <a:buSzTx/>
-              <a:buFontTx/>
-              <a:buNone/>
-              <a:tabLst/>
-              <a:defRPr/>
-            </a:pPr>
-            <a:endParaRPr lang="en-US" b="0" i="0" dirty="0">
-              <a:solidFill>
-                <a:srgbClr val="292929"/>
-              </a:solidFill>
-              <a:effectLst/>
-              <a:latin typeface="charter"/>
-            </a:endParaRPr>
-          </a:p>
-          <a:p>
-            <a:pPr algn="l"/>
-            <a:endParaRPr lang="en-US" dirty="0"/>
+              </a:rPr>
+              <a:t>With the Skip-Gram architecture, a single target word is used to predict all its context words. Skip Gram works well with small amounts of data as well as rare words.</a:t>
+            </a:r>
           </a:p>
         </p:txBody>
       </p:sp>
@@ -1996,7 +1820,7 @@
     </p:spTree>
     <p:extLst>
       <p:ext uri="{BB962C8B-B14F-4D97-AF65-F5344CB8AC3E}">
-        <p14:creationId xmlns:p14="http://schemas.microsoft.com/office/powerpoint/2010/main" val="1453454417"/>
+        <p14:creationId xmlns:p14="http://schemas.microsoft.com/office/powerpoint/2010/main" val="2760553801"/>
       </p:ext>
     </p:extLst>
   </p:cSld>
@@ -2050,132 +1874,6 @@
           <a:bodyPr/>
           <a:lstStyle/>
           <a:p>
-            <a:pPr marL="0" marR="0">
-              <a:spcBef>
-                <a:spcPts val="0"/>
-              </a:spcBef>
-              <a:spcAft>
-                <a:spcPts val="0"/>
-              </a:spcAft>
-            </a:pPr>
-            <a:r>
-              <a:rPr lang="en-US" sz="1200" dirty="0">
-                <a:effectLst/>
-                <a:latin typeface="+mn-lt"/>
-                <a:ea typeface="Calibri" panose="020F0502020204030204" pitchFamily="34" charset="0"/>
-              </a:rPr>
-              <a:t>Let’s wrap up with a quick review.  Word embedding is a process whereby words that appear close together in a text are moved closer together in a vector space.  The process is iterative, moving synonyms close together because synonyms have the same words around them.  </a:t>
-            </a:r>
-          </a:p>
-          <a:p>
-            <a:pPr marL="0" marR="0">
-              <a:spcBef>
-                <a:spcPts val="0"/>
-              </a:spcBef>
-              <a:spcAft>
-                <a:spcPts val="0"/>
-              </a:spcAft>
-            </a:pPr>
-            <a:endParaRPr lang="en-US" sz="1200" dirty="0">
-              <a:effectLst/>
-              <a:latin typeface="+mn-lt"/>
-              <a:ea typeface="Calibri" panose="020F0502020204030204" pitchFamily="34" charset="0"/>
-            </a:endParaRPr>
-          </a:p>
-          <a:p>
-            <a:pPr marL="0" marR="0">
-              <a:spcBef>
-                <a:spcPts val="0"/>
-              </a:spcBef>
-              <a:spcAft>
-                <a:spcPts val="0"/>
-              </a:spcAft>
-            </a:pPr>
-            <a:r>
-              <a:rPr lang="en-US" sz="1200" dirty="0">
-                <a:effectLst/>
-                <a:latin typeface="+mn-lt"/>
-                <a:ea typeface="Calibri" panose="020F0502020204030204" pitchFamily="34" charset="0"/>
-              </a:rPr>
-              <a:t>Consider, for example, these sentences – “Grapefruit is my favorite citrus.  Grapefruits grow on a tree.  The orange is also a citrus.”  Now you can see how processing thousands of sentences like these would create a connection between citrus, orange, and grapefruit.  Just as juice, fruit, and tree are similar. All based on word proximity.</a:t>
-            </a:r>
-          </a:p>
-          <a:p>
-            <a:pPr marL="0" marR="0">
-              <a:spcBef>
-                <a:spcPts val="0"/>
-              </a:spcBef>
-              <a:spcAft>
-                <a:spcPts val="0"/>
-              </a:spcAft>
-            </a:pPr>
-            <a:r>
-              <a:rPr lang="en-US" sz="1200" dirty="0">
-                <a:effectLst/>
-                <a:latin typeface="+mn-lt"/>
-                <a:ea typeface="Calibri" panose="020F0502020204030204" pitchFamily="34" charset="0"/>
-              </a:rPr>
-              <a:t>  </a:t>
-            </a:r>
-          </a:p>
-          <a:p>
-            <a:pPr marL="0" marR="0">
-              <a:spcBef>
-                <a:spcPts val="0"/>
-              </a:spcBef>
-              <a:spcAft>
-                <a:spcPts val="0"/>
-              </a:spcAft>
-            </a:pPr>
-            <a:r>
-              <a:rPr lang="en-US" sz="1200" dirty="0">
-                <a:effectLst/>
-                <a:latin typeface="+mn-lt"/>
-                <a:ea typeface="Calibri" panose="020F0502020204030204" pitchFamily="34" charset="0"/>
-              </a:rPr>
-              <a:t>The main problem with this approach is it only creates 1 embedding per word… hence, more recent transformer models such as BERT and GPT support contextualized embeddings; that is, multiple embeddings per word, to represent different meanings of a word.  Our transformer workshop covers this new architecture in-depth.</a:t>
-            </a:r>
-          </a:p>
-          <a:p>
-            <a:pPr marL="0" marR="0">
-              <a:spcBef>
-                <a:spcPts val="0"/>
-              </a:spcBef>
-              <a:spcAft>
-                <a:spcPts val="0"/>
-              </a:spcAft>
-            </a:pPr>
-            <a:r>
-              <a:rPr lang="en-US" sz="1200" dirty="0">
-                <a:effectLst/>
-                <a:latin typeface="+mn-lt"/>
-                <a:ea typeface="Calibri" panose="020F0502020204030204" pitchFamily="34" charset="0"/>
-              </a:rPr>
-              <a:t> </a:t>
-            </a:r>
-          </a:p>
-          <a:p>
-            <a:pPr marL="0" marR="0">
-              <a:spcBef>
-                <a:spcPts val="0"/>
-              </a:spcBef>
-              <a:spcAft>
-                <a:spcPts val="0"/>
-              </a:spcAft>
-            </a:pPr>
-            <a:r>
-              <a:rPr lang="en-US" sz="1200" dirty="0">
-                <a:effectLst/>
-                <a:latin typeface="+mn-lt"/>
-                <a:ea typeface="Calibri" panose="020F0502020204030204" pitchFamily="34" charset="0"/>
-              </a:rPr>
-              <a:t>(E. Stubbs Email: 05.21.21)</a:t>
-            </a:r>
-            <a:endParaRPr lang="en-US" sz="1200" dirty="0">
-              <a:latin typeface="+mn-lt"/>
-            </a:endParaRPr>
-          </a:p>
-          <a:p>
             <a:pPr marL="0" marR="0" lvl="0" indent="0" algn="l" defTabSz="914400" rtl="0" eaLnBrk="1" fontAlgn="auto" latinLnBrk="0" hangingPunct="1">
               <a:lnSpc>
                 <a:spcPct val="100000"/>
@@ -2193,16 +1891,179 @@
               <a:tabLst/>
               <a:defRPr/>
             </a:pPr>
-            <a:endParaRPr lang="en-US" dirty="0"/>
-          </a:p>
-          <a:p>
-            <a:pPr algn="l"/>
+            <a:r>
+              <a:rPr lang="en-US" b="0" i="0" dirty="0">
+                <a:solidFill>
+                  <a:srgbClr val="292929"/>
+                </a:solidFill>
+                <a:effectLst/>
+                <a:latin typeface="+mn-lt"/>
+              </a:rPr>
+              <a:t>As stated earlier, the primary disadvantage with one-hot encoding is that all the words are independent of each other.   But word embeddings solve that problem. </a:t>
+            </a:r>
+            <a:r>
+              <a:rPr lang="en-US" sz="1200" dirty="0">
+                <a:effectLst/>
+                <a:latin typeface="+mn-lt"/>
+                <a:ea typeface="Calibri" panose="020F0502020204030204" pitchFamily="34" charset="0"/>
+              </a:rPr>
+              <a:t>The basic idea behind word embeddings is that we want words that appear in similar contexts to be spatially close to each other.   Mathematically we do that by measuring the cosine of the angle between word vectors.  Thus, the cosine of the angle between similar words such as “good” and “great” ought to be near 1.  </a:t>
+            </a:r>
+            <a:r>
+              <a:rPr lang="en-US" b="0" i="0" dirty="0">
+                <a:solidFill>
+                  <a:srgbClr val="292929"/>
+                </a:solidFill>
+                <a:effectLst/>
+                <a:latin typeface="+mn-lt"/>
+              </a:rPr>
+              <a:t>That is, an angle close to 0.  In this image:</a:t>
+            </a:r>
+          </a:p>
+          <a:p>
+            <a:pPr marL="0" marR="0" lvl="0" indent="0" algn="l" defTabSz="914400" rtl="0" eaLnBrk="1" fontAlgn="auto" latinLnBrk="0" hangingPunct="1">
+              <a:lnSpc>
+                <a:spcPct val="100000"/>
+              </a:lnSpc>
+              <a:spcBef>
+                <a:spcPts val="0"/>
+              </a:spcBef>
+              <a:spcAft>
+                <a:spcPts val="0"/>
+              </a:spcAft>
+              <a:buClrTx/>
+              <a:buSzTx/>
+              <a:buFontTx/>
+              <a:buNone/>
+              <a:tabLst/>
+              <a:defRPr/>
+            </a:pPr>
             <a:endParaRPr lang="en-US" b="0" i="0" dirty="0">
               <a:solidFill>
-                <a:srgbClr val="3C3C3B"/>
+                <a:srgbClr val="292929"/>
               </a:solidFill>
               <a:effectLst/>
-              <a:latin typeface="Lato"/>
+              <a:latin typeface="+mn-lt"/>
+            </a:endParaRPr>
+          </a:p>
+          <a:p>
+            <a:pPr marL="228600" marR="0" lvl="0" indent="-228600" algn="l" defTabSz="914400" rtl="0" eaLnBrk="1" fontAlgn="auto" latinLnBrk="0" hangingPunct="1">
+              <a:lnSpc>
+                <a:spcPct val="100000"/>
+              </a:lnSpc>
+              <a:spcBef>
+                <a:spcPts val="0"/>
+              </a:spcBef>
+              <a:spcAft>
+                <a:spcPts val="0"/>
+              </a:spcAft>
+              <a:buClrTx/>
+              <a:buSzTx/>
+              <a:buFontTx/>
+              <a:buAutoNum type="arabicPeriod"/>
+              <a:tabLst/>
+              <a:defRPr/>
+            </a:pPr>
+            <a:r>
+              <a:rPr lang="en-US" b="0" i="0" dirty="0">
+                <a:solidFill>
+                  <a:srgbClr val="292929"/>
+                </a:solidFill>
+                <a:effectLst/>
+                <a:latin typeface="+mn-lt"/>
+              </a:rPr>
+              <a:t>Po the Panda is the word vector for ‘good’ </a:t>
+            </a:r>
+          </a:p>
+          <a:p>
+            <a:pPr marL="228600" marR="0" lvl="0" indent="-228600" algn="l" defTabSz="914400" rtl="0" eaLnBrk="1" fontAlgn="auto" latinLnBrk="0" hangingPunct="1">
+              <a:lnSpc>
+                <a:spcPct val="100000"/>
+              </a:lnSpc>
+              <a:spcBef>
+                <a:spcPts val="0"/>
+              </a:spcBef>
+              <a:spcAft>
+                <a:spcPts val="0"/>
+              </a:spcAft>
+              <a:buClrTx/>
+              <a:buSzTx/>
+              <a:buFontTx/>
+              <a:buAutoNum type="arabicPeriod"/>
+              <a:tabLst/>
+              <a:defRPr/>
+            </a:pPr>
+            <a:r>
+              <a:rPr lang="en-US" b="0" i="0" dirty="0">
+                <a:solidFill>
+                  <a:srgbClr val="292929"/>
+                </a:solidFill>
+                <a:effectLst/>
+                <a:latin typeface="+mn-lt"/>
+              </a:rPr>
+              <a:t>While Master Tigress is the word vector for ‘great’.</a:t>
+            </a:r>
+          </a:p>
+          <a:p>
+            <a:pPr marL="0" marR="0" lvl="0" indent="0" algn="l" defTabSz="914400" rtl="0" eaLnBrk="1" fontAlgn="auto" latinLnBrk="0" hangingPunct="1">
+              <a:lnSpc>
+                <a:spcPct val="100000"/>
+              </a:lnSpc>
+              <a:spcBef>
+                <a:spcPts val="0"/>
+              </a:spcBef>
+              <a:spcAft>
+                <a:spcPts val="0"/>
+              </a:spcAft>
+              <a:buClrTx/>
+              <a:buSzTx/>
+              <a:buFontTx/>
+              <a:buNone/>
+              <a:tabLst/>
+              <a:defRPr/>
+            </a:pPr>
+            <a:endParaRPr lang="en-US" b="0" i="0" dirty="0">
+              <a:solidFill>
+                <a:srgbClr val="292929"/>
+              </a:solidFill>
+              <a:effectLst/>
+              <a:latin typeface="+mn-lt"/>
+            </a:endParaRPr>
+          </a:p>
+          <a:p>
+            <a:pPr marL="0" marR="0" lvl="0" indent="0" algn="l" defTabSz="914400" rtl="0" eaLnBrk="1" fontAlgn="auto" latinLnBrk="0" hangingPunct="1">
+              <a:lnSpc>
+                <a:spcPct val="100000"/>
+              </a:lnSpc>
+              <a:spcBef>
+                <a:spcPts val="0"/>
+              </a:spcBef>
+              <a:spcAft>
+                <a:spcPts val="0"/>
+              </a:spcAft>
+              <a:buClrTx/>
+              <a:buSzTx/>
+              <a:buFontTx/>
+              <a:buNone/>
+              <a:tabLst/>
+              <a:defRPr/>
+            </a:pPr>
+            <a:r>
+              <a:rPr lang="en-US" b="0" i="0" dirty="0">
+                <a:solidFill>
+                  <a:srgbClr val="292929"/>
+                </a:solidFill>
+                <a:effectLst/>
+                <a:latin typeface="+mn-lt"/>
+              </a:rPr>
+              <a:t>In this image, the two words are spatially proximate to each other because their meaning overlaps to a large degree.</a:t>
+            </a:r>
+            <a:endParaRPr lang="en-US" b="0" i="0" dirty="0">
+              <a:solidFill>
+                <a:srgbClr val="292929"/>
+              </a:solidFill>
+              <a:effectLst/>
+              <a:latin typeface="charter"/>
             </a:endParaRPr>
           </a:p>
           <a:p>
@@ -2237,7 +2098,7 @@
     </p:spTree>
     <p:extLst>
       <p:ext uri="{BB962C8B-B14F-4D97-AF65-F5344CB8AC3E}">
-        <p14:creationId xmlns:p14="http://schemas.microsoft.com/office/powerpoint/2010/main" val="3603398227"/>
+        <p14:creationId xmlns:p14="http://schemas.microsoft.com/office/powerpoint/2010/main" val="1453454417"/>
       </p:ext>
     </p:extLst>
   </p:cSld>
@@ -2786,7 +2647,7 @@
                 <a:effectLst/>
                 <a:latin typeface="+mn-lt"/>
               </a:rPr>
-              <a:t>How on Earth can you satisfy this request? What does it even mean? Happily, you can do just as she asks with the chart, just by combining arrows.</a:t>
+              <a:t>How on Earth can you satisfy this request? What does it even mean? Happily, you can do what she asks with this chart, just by combining arrows.</a:t>
             </a:r>
           </a:p>
           <a:p>
@@ -2981,6 +2842,247 @@
           <a:bodyPr/>
           <a:lstStyle/>
           <a:p>
+            <a:pPr marL="0" marR="0">
+              <a:spcBef>
+                <a:spcPts val="0"/>
+              </a:spcBef>
+              <a:spcAft>
+                <a:spcPts val="0"/>
+              </a:spcAft>
+            </a:pPr>
+            <a:r>
+              <a:rPr lang="en-US" sz="1200" dirty="0">
+                <a:effectLst/>
+                <a:latin typeface="+mn-lt"/>
+                <a:ea typeface="Calibri" panose="020F0502020204030204" pitchFamily="34" charset="0"/>
+              </a:rPr>
+              <a:t>Let’s wrap up with a quick review.  Word embedding is a process whereby words that appear close together in a text are moved closer together in a vector space.  The process is iterative, moving synonyms close together because synonyms have the same words around them.  </a:t>
+            </a:r>
+          </a:p>
+          <a:p>
+            <a:pPr marL="0" marR="0">
+              <a:spcBef>
+                <a:spcPts val="0"/>
+              </a:spcBef>
+              <a:spcAft>
+                <a:spcPts val="0"/>
+              </a:spcAft>
+            </a:pPr>
+            <a:endParaRPr lang="en-US" sz="1200" dirty="0">
+              <a:effectLst/>
+              <a:latin typeface="+mn-lt"/>
+              <a:ea typeface="Calibri" panose="020F0502020204030204" pitchFamily="34" charset="0"/>
+            </a:endParaRPr>
+          </a:p>
+          <a:p>
+            <a:pPr marL="0" marR="0">
+              <a:spcBef>
+                <a:spcPts val="0"/>
+              </a:spcBef>
+              <a:spcAft>
+                <a:spcPts val="0"/>
+              </a:spcAft>
+            </a:pPr>
+            <a:r>
+              <a:rPr lang="en-US" sz="1200" dirty="0">
+                <a:effectLst/>
+                <a:latin typeface="+mn-lt"/>
+                <a:ea typeface="Calibri" panose="020F0502020204030204" pitchFamily="34" charset="0"/>
+              </a:rPr>
+              <a:t>Consider, for example, these sentences – “Grapefruit is my favorite citrus.  Grapefruits grow on a tree.  The orange is also a citrus.”  Now you can see how processing thousands of sentences like these would create a connection between citrus, orange, and grapefruit.  Just as juice, fruit, and tree are similar. All based on word proximity.</a:t>
+            </a:r>
+          </a:p>
+          <a:p>
+            <a:pPr marL="0" marR="0">
+              <a:spcBef>
+                <a:spcPts val="0"/>
+              </a:spcBef>
+              <a:spcAft>
+                <a:spcPts val="0"/>
+              </a:spcAft>
+            </a:pPr>
+            <a:r>
+              <a:rPr lang="en-US" sz="1200" dirty="0">
+                <a:effectLst/>
+                <a:latin typeface="+mn-lt"/>
+                <a:ea typeface="Calibri" panose="020F0502020204030204" pitchFamily="34" charset="0"/>
+              </a:rPr>
+              <a:t>  </a:t>
+            </a:r>
+          </a:p>
+          <a:p>
+            <a:pPr marL="0" marR="0">
+              <a:spcBef>
+                <a:spcPts val="0"/>
+              </a:spcBef>
+              <a:spcAft>
+                <a:spcPts val="0"/>
+              </a:spcAft>
+            </a:pPr>
+            <a:r>
+              <a:rPr lang="en-US" sz="1200" dirty="0">
+                <a:effectLst/>
+                <a:latin typeface="+mn-lt"/>
+                <a:ea typeface="Calibri" panose="020F0502020204030204" pitchFamily="34" charset="0"/>
+              </a:rPr>
+              <a:t>The main problem with this approach is it only creates 1 embedding per word… hence, more recent transformer models such as BERT and GPT support contextualized embeddings; that is, multiple embeddings per word, to represent different meanings of a word.  Our transformer workshop covers this new architecture in-depth.</a:t>
+            </a:r>
+          </a:p>
+          <a:p>
+            <a:pPr marL="0" marR="0">
+              <a:spcBef>
+                <a:spcPts val="0"/>
+              </a:spcBef>
+              <a:spcAft>
+                <a:spcPts val="0"/>
+              </a:spcAft>
+            </a:pPr>
+            <a:r>
+              <a:rPr lang="en-US" sz="1200" dirty="0">
+                <a:effectLst/>
+                <a:latin typeface="+mn-lt"/>
+                <a:ea typeface="Calibri" panose="020F0502020204030204" pitchFamily="34" charset="0"/>
+              </a:rPr>
+              <a:t> </a:t>
+            </a:r>
+          </a:p>
+          <a:p>
+            <a:pPr marL="0" marR="0">
+              <a:spcBef>
+                <a:spcPts val="0"/>
+              </a:spcBef>
+              <a:spcAft>
+                <a:spcPts val="0"/>
+              </a:spcAft>
+            </a:pPr>
+            <a:r>
+              <a:rPr lang="en-US" sz="1200" dirty="0">
+                <a:effectLst/>
+                <a:latin typeface="+mn-lt"/>
+                <a:ea typeface="Calibri" panose="020F0502020204030204" pitchFamily="34" charset="0"/>
+              </a:rPr>
+              <a:t>(E. Stubbs Email: 05.21.21)</a:t>
+            </a:r>
+            <a:endParaRPr lang="en-US" sz="1200" dirty="0">
+              <a:latin typeface="+mn-lt"/>
+            </a:endParaRPr>
+          </a:p>
+          <a:p>
+            <a:pPr marL="0" marR="0" lvl="0" indent="0" algn="l" defTabSz="914400" rtl="0" eaLnBrk="1" fontAlgn="auto" latinLnBrk="0" hangingPunct="1">
+              <a:lnSpc>
+                <a:spcPct val="100000"/>
+              </a:lnSpc>
+              <a:spcBef>
+                <a:spcPts val="0"/>
+              </a:spcBef>
+              <a:spcAft>
+                <a:spcPts val="0"/>
+              </a:spcAft>
+              <a:buClrTx/>
+              <a:buSzTx/>
+              <a:buFontTx/>
+              <a:buNone/>
+              <a:tabLst/>
+              <a:defRPr/>
+            </a:pPr>
+            <a:endParaRPr lang="en-US" dirty="0"/>
+          </a:p>
+          <a:p>
+            <a:pPr algn="l"/>
+            <a:endParaRPr lang="en-US" b="0" i="0" dirty="0">
+              <a:solidFill>
+                <a:srgbClr val="3C3C3B"/>
+              </a:solidFill>
+              <a:effectLst/>
+              <a:latin typeface="Lato"/>
+            </a:endParaRPr>
+          </a:p>
+          <a:p>
+            <a:pPr algn="l"/>
+            <a:endParaRPr lang="en-US" dirty="0"/>
+          </a:p>
+        </p:txBody>
+      </p:sp>
+      <p:sp>
+        <p:nvSpPr>
+          <p:cNvPr id="4" name="Slide Number Placeholder 3"/>
+          <p:cNvSpPr>
+            <a:spLocks noGrp="1"/>
+          </p:cNvSpPr>
+          <p:nvPr>
+            <p:ph type="sldNum" sz="quarter" idx="5"/>
+          </p:nvPr>
+        </p:nvSpPr>
+        <p:spPr/>
+        <p:txBody>
+          <a:bodyPr/>
+          <a:lstStyle/>
+          <a:p>
+            <a:fld id="{3148858F-F1DB-4027-9C85-CCA6849540DD}" type="slidenum">
+              <a:rPr lang="en-US" smtClean="0"/>
+              <a:t>21</a:t>
+            </a:fld>
+            <a:endParaRPr lang="en-US"/>
+          </a:p>
+        </p:txBody>
+      </p:sp>
+    </p:spTree>
+    <p:extLst>
+      <p:ext uri="{BB962C8B-B14F-4D97-AF65-F5344CB8AC3E}">
+        <p14:creationId xmlns:p14="http://schemas.microsoft.com/office/powerpoint/2010/main" val="3603398227"/>
+      </p:ext>
+    </p:extLst>
+  </p:cSld>
+  <p:clrMapOvr>
+    <a:masterClrMapping/>
+  </p:clrMapOvr>
+</p:notes>
+</file>
+
+<file path=ppt/notesSlides/notesSlide22.xml><?xml version="1.0" encoding="utf-8"?>
+<p:notes xmlns:a="http://schemas.openxmlformats.org/drawingml/2006/main" xmlns:r="http://schemas.openxmlformats.org/officeDocument/2006/relationships" xmlns:p="http://schemas.openxmlformats.org/presentationml/2006/main">
+  <p:cSld>
+    <p:spTree>
+      <p:nvGrpSpPr>
+        <p:cNvPr id="1" name=""/>
+        <p:cNvGrpSpPr/>
+        <p:nvPr/>
+      </p:nvGrpSpPr>
+      <p:grpSpPr>
+        <a:xfrm>
+          <a:off x="0" y="0"/>
+          <a:ext cx="0" cy="0"/>
+          <a:chOff x="0" y="0"/>
+          <a:chExt cx="0" cy="0"/>
+        </a:xfrm>
+      </p:grpSpPr>
+      <p:sp>
+        <p:nvSpPr>
+          <p:cNvPr id="2" name="Slide Image Placeholder 1"/>
+          <p:cNvSpPr>
+            <a:spLocks noGrp="1" noRot="1" noChangeAspect="1"/>
+          </p:cNvSpPr>
+          <p:nvPr>
+            <p:ph type="sldImg"/>
+          </p:nvPr>
+        </p:nvSpPr>
+        <p:spPr/>
+      </p:sp>
+      <p:sp>
+        <p:nvSpPr>
+          <p:cNvPr id="3" name="Notes Placeholder 2"/>
+          <p:cNvSpPr>
+            <a:spLocks noGrp="1"/>
+          </p:cNvSpPr>
+          <p:nvPr>
+            <p:ph type="body" idx="1"/>
+          </p:nvPr>
+        </p:nvSpPr>
+        <p:spPr/>
+        <p:txBody>
+          <a:bodyPr/>
+          <a:lstStyle/>
+          <a:p>
             <a:pPr algn="l"/>
             <a:r>
               <a:rPr lang="en-US" dirty="0">
@@ -3137,7 +3239,7 @@
           <a:p>
             <a:fld id="{3148858F-F1DB-4027-9C85-CCA6849540DD}" type="slidenum">
               <a:rPr lang="en-US" smtClean="0"/>
-              <a:t>22</a:t>
+              <a:t>23</a:t>
             </a:fld>
             <a:endParaRPr lang="en-US"/>
           </a:p>
@@ -4011,7 +4113,7 @@
             </a:pPr>
             <a:r>
               <a:rPr lang="en-US" sz="1800" dirty="0"/>
-              <a:t>The relationships between words in an embedding space can be visualized.  This image (heat map) shows six sets of four related words.  The more the embeddings of any two words are alike, the higher the word pair score.  Higher scores, in turn, are darker red.  Each word matches itself more strongly than unrelated words.  These can be seen as a dark red diagonal of blocks.</a:t>
+              <a:t>The relationships between words in an embedding space can be visualized.   (Click) This image (heat map) shows six sets of four related words.  The more the embeddings of any two words are alike, the higher the word pair score.  Higher scores, in turn, are darker red.  Each word matches itself more strongly than unrelated words.  These can be seen as a dark red diagonal of blocks.</a:t>
             </a:r>
           </a:p>
           <a:p>
@@ -4033,6 +4135,29 @@
               <a:defRPr/>
             </a:pPr>
             <a:endParaRPr lang="en-US" sz="1800" dirty="0"/>
+          </a:p>
+          <a:p>
+            <a:pPr marL="0" marR="0" lvl="0" indent="0" algn="l" defTabSz="914400" rtl="0" eaLnBrk="1" fontAlgn="auto" latinLnBrk="0" hangingPunct="1">
+              <a:lnSpc>
+                <a:spcPct val="100000"/>
+              </a:lnSpc>
+              <a:spcBef>
+                <a:spcPts val="0"/>
+              </a:spcBef>
+              <a:spcAft>
+                <a:spcPts val="0"/>
+              </a:spcAft>
+              <a:buClrTx/>
+              <a:buSzTx/>
+              <a:buFontTx/>
+              <a:buNone/>
+              <a:tabLst/>
+              <a:defRPr/>
+            </a:pPr>
+            <a:r>
+              <a:rPr lang="en-US" sz="1800" dirty="0"/>
+              <a:t>=====</a:t>
+            </a:r>
           </a:p>
           <a:p>
             <a:pPr marL="0" marR="0" lvl="0" indent="0" algn="l" defTabSz="914400" rtl="0" eaLnBrk="1" fontAlgn="auto" latinLnBrk="0" hangingPunct="1">
@@ -4726,7 +4851,7 @@
           <a:p>
             <a:fld id="{C3F78080-8D0A-4BE8-A5B4-CB115102D524}" type="datetimeFigureOut">
               <a:rPr lang="en-US" smtClean="0"/>
-              <a:t>10/20/2022</a:t>
+              <a:t>10/21/2022</a:t>
             </a:fld>
             <a:endParaRPr lang="en-US"/>
           </a:p>
@@ -4924,7 +5049,7 @@
           <a:p>
             <a:fld id="{C3F78080-8D0A-4BE8-A5B4-CB115102D524}" type="datetimeFigureOut">
               <a:rPr lang="en-US" smtClean="0"/>
-              <a:t>10/20/2022</a:t>
+              <a:t>10/21/2022</a:t>
             </a:fld>
             <a:endParaRPr lang="en-US"/>
           </a:p>
@@ -5132,7 +5257,7 @@
           <a:p>
             <a:fld id="{C3F78080-8D0A-4BE8-A5B4-CB115102D524}" type="datetimeFigureOut">
               <a:rPr lang="en-US" smtClean="0"/>
-              <a:t>10/20/2022</a:t>
+              <a:t>10/21/2022</a:t>
             </a:fld>
             <a:endParaRPr lang="en-US"/>
           </a:p>
@@ -5330,7 +5455,7 @@
           <a:p>
             <a:fld id="{C3F78080-8D0A-4BE8-A5B4-CB115102D524}" type="datetimeFigureOut">
               <a:rPr lang="en-US" smtClean="0"/>
-              <a:t>10/20/2022</a:t>
+              <a:t>10/21/2022</a:t>
             </a:fld>
             <a:endParaRPr lang="en-US"/>
           </a:p>
@@ -5605,7 +5730,7 @@
           <a:p>
             <a:fld id="{C3F78080-8D0A-4BE8-A5B4-CB115102D524}" type="datetimeFigureOut">
               <a:rPr lang="en-US" smtClean="0"/>
-              <a:t>10/20/2022</a:t>
+              <a:t>10/21/2022</a:t>
             </a:fld>
             <a:endParaRPr lang="en-US"/>
           </a:p>
@@ -5870,7 +5995,7 @@
           <a:p>
             <a:fld id="{C3F78080-8D0A-4BE8-A5B4-CB115102D524}" type="datetimeFigureOut">
               <a:rPr lang="en-US" smtClean="0"/>
-              <a:t>10/20/2022</a:t>
+              <a:t>10/21/2022</a:t>
             </a:fld>
             <a:endParaRPr lang="en-US"/>
           </a:p>
@@ -6282,7 +6407,7 @@
           <a:p>
             <a:fld id="{C3F78080-8D0A-4BE8-A5B4-CB115102D524}" type="datetimeFigureOut">
               <a:rPr lang="en-US" smtClean="0"/>
-              <a:t>10/20/2022</a:t>
+              <a:t>10/21/2022</a:t>
             </a:fld>
             <a:endParaRPr lang="en-US"/>
           </a:p>
@@ -6423,7 +6548,7 @@
           <a:p>
             <a:fld id="{C3F78080-8D0A-4BE8-A5B4-CB115102D524}" type="datetimeFigureOut">
               <a:rPr lang="en-US" smtClean="0"/>
-              <a:t>10/20/2022</a:t>
+              <a:t>10/21/2022</a:t>
             </a:fld>
             <a:endParaRPr lang="en-US"/>
           </a:p>
@@ -6536,7 +6661,7 @@
           <a:p>
             <a:fld id="{C3F78080-8D0A-4BE8-A5B4-CB115102D524}" type="datetimeFigureOut">
               <a:rPr lang="en-US" smtClean="0"/>
-              <a:t>10/20/2022</a:t>
+              <a:t>10/21/2022</a:t>
             </a:fld>
             <a:endParaRPr lang="en-US"/>
           </a:p>
@@ -6847,7 +6972,7 @@
           <a:p>
             <a:fld id="{C3F78080-8D0A-4BE8-A5B4-CB115102D524}" type="datetimeFigureOut">
               <a:rPr lang="en-US" smtClean="0"/>
-              <a:t>10/20/2022</a:t>
+              <a:t>10/21/2022</a:t>
             </a:fld>
             <a:endParaRPr lang="en-US"/>
           </a:p>
@@ -7135,7 +7260,7 @@
           <a:p>
             <a:fld id="{C3F78080-8D0A-4BE8-A5B4-CB115102D524}" type="datetimeFigureOut">
               <a:rPr lang="en-US" smtClean="0"/>
-              <a:t>10/20/2022</a:t>
+              <a:t>10/21/2022</a:t>
             </a:fld>
             <a:endParaRPr lang="en-US"/>
           </a:p>
@@ -7376,7 +7501,7 @@
           <a:p>
             <a:fld id="{C3F78080-8D0A-4BE8-A5B4-CB115102D524}" type="datetimeFigureOut">
               <a:rPr lang="en-US" smtClean="0"/>
-              <a:t>10/20/2022</a:t>
+              <a:t>10/21/2022</a:t>
             </a:fld>
             <a:endParaRPr lang="en-US"/>
           </a:p>
@@ -8209,6 +8334,394 @@
           <a:chExt cx="0" cy="0"/>
         </a:xfrm>
       </p:grpSpPr>
+      <p:sp>
+        <p:nvSpPr>
+          <p:cNvPr id="2" name="Title 1">
+            <a:extLst>
+              <a:ext uri="{FF2B5EF4-FFF2-40B4-BE49-F238E27FC236}">
+                <a16:creationId xmlns:a16="http://schemas.microsoft.com/office/drawing/2014/main" id="{F7065AF0-2E64-78F4-6024-8C32049DF790}"/>
+              </a:ext>
+            </a:extLst>
+          </p:cNvPr>
+          <p:cNvSpPr txBox="1">
+            <a:spLocks/>
+          </p:cNvSpPr>
+          <p:nvPr/>
+        </p:nvSpPr>
+        <p:spPr>
+          <a:xfrm>
+            <a:off x="0" y="1229983"/>
+            <a:ext cx="12192000" cy="591532"/>
+          </a:xfrm>
+          <a:prstGeom prst="rect">
+            <a:avLst/>
+          </a:prstGeom>
+          <a:noFill/>
+        </p:spPr>
+        <p:txBody>
+          <a:bodyPr>
+            <a:noAutofit/>
+          </a:bodyPr>
+          <a:lstStyle>
+            <a:lvl1pPr algn="l" defTabSz="914400" rtl="0" eaLnBrk="1" latinLnBrk="0" hangingPunct="1">
+              <a:lnSpc>
+                <a:spcPct val="90000"/>
+              </a:lnSpc>
+              <a:spcBef>
+                <a:spcPct val="0"/>
+              </a:spcBef>
+              <a:buNone/>
+              <a:defRPr sz="4400" kern="1200">
+                <a:solidFill>
+                  <a:schemeClr val="tx1"/>
+                </a:solidFill>
+                <a:latin typeface="+mj-lt"/>
+                <a:ea typeface="+mj-ea"/>
+                <a:cs typeface="+mj-cs"/>
+              </a:defRPr>
+            </a:lvl1pPr>
+          </a:lstStyle>
+          <a:p>
+            <a:pPr algn="ctr"/>
+            <a:r>
+              <a:rPr lang="en-US" sz="4800" dirty="0">
+                <a:solidFill>
+                  <a:srgbClr val="68BA7D"/>
+                </a:solidFill>
+                <a:latin typeface="Avenir Next LT Pro Light" panose="020B0604020202020204" pitchFamily="34" charset="0"/>
+              </a:rPr>
+              <a:t>Word2Vec</a:t>
+            </a:r>
+            <a:endParaRPr lang="en-US" sz="4800" dirty="0">
+              <a:solidFill>
+                <a:srgbClr val="68BA7D"/>
+              </a:solidFill>
+              <a:latin typeface="Avenir Next LT Pro Light" panose="020B0604020202020204" pitchFamily="34" charset="0"/>
+              <a:cs typeface="Segoe UI Light" panose="020B0502040204020203" pitchFamily="34" charset="0"/>
+            </a:endParaRPr>
+          </a:p>
+        </p:txBody>
+      </p:sp>
+      <p:sp>
+        <p:nvSpPr>
+          <p:cNvPr id="3" name="Title 1">
+            <a:extLst>
+              <a:ext uri="{FF2B5EF4-FFF2-40B4-BE49-F238E27FC236}">
+                <a16:creationId xmlns:a16="http://schemas.microsoft.com/office/drawing/2014/main" id="{CBE29248-1028-5FFE-882E-61AC438EFF21}"/>
+              </a:ext>
+            </a:extLst>
+          </p:cNvPr>
+          <p:cNvSpPr txBox="1">
+            <a:spLocks/>
+          </p:cNvSpPr>
+          <p:nvPr/>
+        </p:nvSpPr>
+        <p:spPr>
+          <a:xfrm>
+            <a:off x="957263" y="2908905"/>
+            <a:ext cx="9172576" cy="591532"/>
+          </a:xfrm>
+          <a:prstGeom prst="rect">
+            <a:avLst/>
+          </a:prstGeom>
+          <a:noFill/>
+        </p:spPr>
+        <p:txBody>
+          <a:bodyPr>
+            <a:noAutofit/>
+          </a:bodyPr>
+          <a:lstStyle>
+            <a:lvl1pPr algn="l" defTabSz="914400" rtl="0" eaLnBrk="1" latinLnBrk="0" hangingPunct="1">
+              <a:lnSpc>
+                <a:spcPct val="90000"/>
+              </a:lnSpc>
+              <a:spcBef>
+                <a:spcPct val="0"/>
+              </a:spcBef>
+              <a:buNone/>
+              <a:defRPr sz="4400" kern="1200">
+                <a:solidFill>
+                  <a:schemeClr val="tx1"/>
+                </a:solidFill>
+                <a:latin typeface="+mj-lt"/>
+                <a:ea typeface="+mj-ea"/>
+                <a:cs typeface="+mj-cs"/>
+              </a:defRPr>
+            </a:lvl1pPr>
+          </a:lstStyle>
+          <a:p>
+            <a:pPr marL="914400" indent="-914400">
+              <a:buFont typeface="+mj-lt"/>
+              <a:buAutoNum type="arabicPeriod"/>
+            </a:pPr>
+            <a:r>
+              <a:rPr lang="en-US" sz="3600" dirty="0">
+                <a:solidFill>
+                  <a:schemeClr val="tx1">
+                    <a:lumMod val="65000"/>
+                    <a:lumOff val="35000"/>
+                  </a:schemeClr>
+                </a:solidFill>
+                <a:latin typeface="Avenir Next LT Pro Light" panose="020B0604020202020204" pitchFamily="34" charset="0"/>
+              </a:rPr>
+              <a:t>CBOW (Common Bag of Words)</a:t>
+            </a:r>
+            <a:endParaRPr lang="en-US" sz="3600" dirty="0">
+              <a:solidFill>
+                <a:schemeClr val="tx1">
+                  <a:lumMod val="65000"/>
+                  <a:lumOff val="35000"/>
+                </a:schemeClr>
+              </a:solidFill>
+              <a:latin typeface="Avenir Next LT Pro Light" panose="020B0604020202020204" pitchFamily="34" charset="0"/>
+              <a:cs typeface="Segoe UI Light" panose="020B0502040204020203" pitchFamily="34" charset="0"/>
+            </a:endParaRPr>
+          </a:p>
+        </p:txBody>
+      </p:sp>
+      <p:sp>
+        <p:nvSpPr>
+          <p:cNvPr id="4" name="Title 1">
+            <a:extLst>
+              <a:ext uri="{FF2B5EF4-FFF2-40B4-BE49-F238E27FC236}">
+                <a16:creationId xmlns:a16="http://schemas.microsoft.com/office/drawing/2014/main" id="{39A74E1C-EC17-93DD-D318-16A7FB78653D}"/>
+              </a:ext>
+            </a:extLst>
+          </p:cNvPr>
+          <p:cNvSpPr txBox="1">
+            <a:spLocks/>
+          </p:cNvSpPr>
+          <p:nvPr/>
+        </p:nvSpPr>
+        <p:spPr>
+          <a:xfrm>
+            <a:off x="957263" y="3996295"/>
+            <a:ext cx="9172576" cy="591532"/>
+          </a:xfrm>
+          <a:prstGeom prst="rect">
+            <a:avLst/>
+          </a:prstGeom>
+          <a:noFill/>
+        </p:spPr>
+        <p:txBody>
+          <a:bodyPr>
+            <a:noAutofit/>
+          </a:bodyPr>
+          <a:lstStyle>
+            <a:lvl1pPr algn="l" defTabSz="914400" rtl="0" eaLnBrk="1" latinLnBrk="0" hangingPunct="1">
+              <a:lnSpc>
+                <a:spcPct val="90000"/>
+              </a:lnSpc>
+              <a:spcBef>
+                <a:spcPct val="0"/>
+              </a:spcBef>
+              <a:buNone/>
+              <a:defRPr sz="4400" kern="1200">
+                <a:solidFill>
+                  <a:schemeClr val="tx1"/>
+                </a:solidFill>
+                <a:latin typeface="+mj-lt"/>
+                <a:ea typeface="+mj-ea"/>
+                <a:cs typeface="+mj-cs"/>
+              </a:defRPr>
+            </a:lvl1pPr>
+          </a:lstStyle>
+          <a:p>
+            <a:r>
+              <a:rPr lang="en-US" sz="3600" dirty="0">
+                <a:solidFill>
+                  <a:schemeClr val="tx1">
+                    <a:lumMod val="65000"/>
+                    <a:lumOff val="35000"/>
+                  </a:schemeClr>
+                </a:solidFill>
+                <a:latin typeface="Avenir Next LT Pro Light" panose="020B0604020202020204" pitchFamily="34" charset="0"/>
+              </a:rPr>
+              <a:t>2.     Skip-Gram</a:t>
+            </a:r>
+            <a:endParaRPr lang="en-US" sz="3600" dirty="0">
+              <a:solidFill>
+                <a:schemeClr val="tx1">
+                  <a:lumMod val="65000"/>
+                  <a:lumOff val="35000"/>
+                </a:schemeClr>
+              </a:solidFill>
+              <a:latin typeface="Avenir Next LT Pro Light" panose="020B0604020202020204" pitchFamily="34" charset="0"/>
+              <a:cs typeface="Segoe UI Light" panose="020B0502040204020203" pitchFamily="34" charset="0"/>
+            </a:endParaRPr>
+          </a:p>
+        </p:txBody>
+      </p:sp>
+    </p:spTree>
+    <p:extLst>
+      <p:ext uri="{BB962C8B-B14F-4D97-AF65-F5344CB8AC3E}">
+        <p14:creationId xmlns:p14="http://schemas.microsoft.com/office/powerpoint/2010/main" val="1469857228"/>
+      </p:ext>
+    </p:extLst>
+  </p:cSld>
+  <p:clrMapOvr>
+    <a:masterClrMapping/>
+  </p:clrMapOvr>
+  <p:timing>
+    <p:tnLst>
+      <p:par>
+        <p:cTn id="1" dur="indefinite" restart="never" nodeType="tmRoot">
+          <p:childTnLst>
+            <p:seq concurrent="1" nextAc="seek">
+              <p:cTn id="2" dur="indefinite" nodeType="mainSeq">
+                <p:childTnLst>
+                  <p:par>
+                    <p:cTn id="3" fill="hold">
+                      <p:stCondLst>
+                        <p:cond delay="indefinite"/>
+                      </p:stCondLst>
+                      <p:childTnLst>
+                        <p:par>
+                          <p:cTn id="4" fill="hold">
+                            <p:stCondLst>
+                              <p:cond delay="0"/>
+                            </p:stCondLst>
+                            <p:childTnLst>
+                              <p:par>
+                                <p:cTn id="5" presetID="10" presetClass="entr" presetSubtype="0" fill="hold" grpId="0" nodeType="clickEffect">
+                                  <p:stCondLst>
+                                    <p:cond delay="0"/>
+                                  </p:stCondLst>
+                                  <p:childTnLst>
+                                    <p:set>
+                                      <p:cBhvr>
+                                        <p:cTn id="6" dur="1" fill="hold">
+                                          <p:stCondLst>
+                                            <p:cond delay="0"/>
+                                          </p:stCondLst>
+                                        </p:cTn>
+                                        <p:tgtEl>
+                                          <p:spTgt spid="3"/>
+                                        </p:tgtEl>
+                                        <p:attrNameLst>
+                                          <p:attrName>style.visibility</p:attrName>
+                                        </p:attrNameLst>
+                                      </p:cBhvr>
+                                      <p:to>
+                                        <p:strVal val="visible"/>
+                                      </p:to>
+                                    </p:set>
+                                    <p:animEffect transition="in" filter="fade">
+                                      <p:cBhvr>
+                                        <p:cTn id="7" dur="500"/>
+                                        <p:tgtEl>
+                                          <p:spTgt spid="3"/>
+                                        </p:tgtEl>
+                                      </p:cBhvr>
+                                    </p:animEffect>
+                                  </p:childTnLst>
+                                </p:cTn>
+                              </p:par>
+                            </p:childTnLst>
+                          </p:cTn>
+                        </p:par>
+                      </p:childTnLst>
+                    </p:cTn>
+                  </p:par>
+                  <p:par>
+                    <p:cTn id="8" fill="hold">
+                      <p:stCondLst>
+                        <p:cond delay="indefinite"/>
+                      </p:stCondLst>
+                      <p:childTnLst>
+                        <p:par>
+                          <p:cTn id="9" fill="hold">
+                            <p:stCondLst>
+                              <p:cond delay="0"/>
+                            </p:stCondLst>
+                            <p:childTnLst>
+                              <p:par>
+                                <p:cTn id="10" presetID="10" presetClass="entr" presetSubtype="0" fill="hold" grpId="0" nodeType="clickEffect">
+                                  <p:stCondLst>
+                                    <p:cond delay="0"/>
+                                  </p:stCondLst>
+                                  <p:childTnLst>
+                                    <p:set>
+                                      <p:cBhvr>
+                                        <p:cTn id="11" dur="1" fill="hold">
+                                          <p:stCondLst>
+                                            <p:cond delay="0"/>
+                                          </p:stCondLst>
+                                        </p:cTn>
+                                        <p:tgtEl>
+                                          <p:spTgt spid="4"/>
+                                        </p:tgtEl>
+                                        <p:attrNameLst>
+                                          <p:attrName>style.visibility</p:attrName>
+                                        </p:attrNameLst>
+                                      </p:cBhvr>
+                                      <p:to>
+                                        <p:strVal val="visible"/>
+                                      </p:to>
+                                    </p:set>
+                                    <p:animEffect transition="in" filter="fade">
+                                      <p:cBhvr>
+                                        <p:cTn id="12" dur="500"/>
+                                        <p:tgtEl>
+                                          <p:spTgt spid="4"/>
+                                        </p:tgtEl>
+                                      </p:cBhvr>
+                                    </p:animEffect>
+                                  </p:childTnLst>
+                                </p:cTn>
+                              </p:par>
+                            </p:childTnLst>
+                          </p:cTn>
+                        </p:par>
+                      </p:childTnLst>
+                    </p:cTn>
+                  </p:par>
+                </p:childTnLst>
+              </p:cTn>
+              <p:prevCondLst>
+                <p:cond evt="onPrev" delay="0">
+                  <p:tgtEl>
+                    <p:sldTgt/>
+                  </p:tgtEl>
+                </p:cond>
+              </p:prevCondLst>
+              <p:nextCondLst>
+                <p:cond evt="onNext" delay="0">
+                  <p:tgtEl>
+                    <p:sldTgt/>
+                  </p:tgtEl>
+                </p:cond>
+              </p:nextCondLst>
+            </p:seq>
+          </p:childTnLst>
+        </p:cTn>
+      </p:par>
+    </p:tnLst>
+    <p:bldLst>
+      <p:bldP spid="3" grpId="0"/>
+      <p:bldP spid="4" grpId="0"/>
+    </p:bldLst>
+  </p:timing>
+</p:sld>
+</file>
+
+<file path=ppt/slides/slide13.xml><?xml version="1.0" encoding="utf-8"?>
+<p:sld xmlns:a="http://schemas.openxmlformats.org/drawingml/2006/main" xmlns:r="http://schemas.openxmlformats.org/officeDocument/2006/relationships" xmlns:p="http://schemas.openxmlformats.org/presentationml/2006/main">
+  <p:cSld>
+    <p:spTree>
+      <p:nvGrpSpPr>
+        <p:cNvPr id="1" name=""/>
+        <p:cNvGrpSpPr/>
+        <p:nvPr/>
+      </p:nvGrpSpPr>
+      <p:grpSpPr>
+        <a:xfrm>
+          <a:off x="0" y="0"/>
+          <a:ext cx="0" cy="0"/>
+          <a:chOff x="0" y="0"/>
+          <a:chExt cx="0" cy="0"/>
+        </a:xfrm>
+      </p:grpSpPr>
       <p:pic>
         <p:nvPicPr>
           <p:cNvPr id="3" name="Picture 2">
@@ -8484,7 +8997,7 @@
 </p:sld>
 </file>
 
-<file path=ppt/slides/slide13.xml><?xml version="1.0" encoding="utf-8"?>
+<file path=ppt/slides/slide14.xml><?xml version="1.0" encoding="utf-8"?>
 <p:sld xmlns:a="http://schemas.openxmlformats.org/drawingml/2006/main" xmlns:r="http://schemas.openxmlformats.org/officeDocument/2006/relationships" xmlns:p="http://schemas.openxmlformats.org/presentationml/2006/main">
   <p:cSld>
     <p:spTree>
@@ -8630,7 +9143,7 @@
 </p:sld>
 </file>
 
-<file path=ppt/slides/slide14.xml><?xml version="1.0" encoding="utf-8"?>
+<file path=ppt/slides/slide15.xml><?xml version="1.0" encoding="utf-8"?>
 <p:sld xmlns:a="http://schemas.openxmlformats.org/drawingml/2006/main" xmlns:r="http://schemas.openxmlformats.org/officeDocument/2006/relationships" xmlns:p="http://schemas.openxmlformats.org/presentationml/2006/main">
   <p:cSld>
     <p:spTree>
@@ -9032,7 +9545,7 @@
 </p:sld>
 </file>
 
-<file path=ppt/slides/slide15.xml><?xml version="1.0" encoding="utf-8"?>
+<file path=ppt/slides/slide16.xml><?xml version="1.0" encoding="utf-8"?>
 <p:sld xmlns:a="http://schemas.openxmlformats.org/drawingml/2006/main" xmlns:r="http://schemas.openxmlformats.org/officeDocument/2006/relationships" xmlns:p="http://schemas.openxmlformats.org/presentationml/2006/main">
   <p:cSld>
     <p:spTree>
@@ -9445,7 +9958,7 @@
 </p:sld>
 </file>
 
-<file path=ppt/slides/slide16.xml><?xml version="1.0" encoding="utf-8"?>
+<file path=ppt/slides/slide17.xml><?xml version="1.0" encoding="utf-8"?>
 <p:sld xmlns:a="http://schemas.openxmlformats.org/drawingml/2006/main" xmlns:r="http://schemas.openxmlformats.org/officeDocument/2006/relationships" xmlns:p="http://schemas.openxmlformats.org/presentationml/2006/main">
   <p:cSld>
     <p:spTree>
@@ -9827,695 +10340,6 @@
 </p:sld>
 </file>
 
-<file path=ppt/slides/slide17.xml><?xml version="1.0" encoding="utf-8"?>
-<p:sld xmlns:a="http://schemas.openxmlformats.org/drawingml/2006/main" xmlns:r="http://schemas.openxmlformats.org/officeDocument/2006/relationships" xmlns:p="http://schemas.openxmlformats.org/presentationml/2006/main">
-  <p:cSld>
-    <p:spTree>
-      <p:nvGrpSpPr>
-        <p:cNvPr id="1" name=""/>
-        <p:cNvGrpSpPr/>
-        <p:nvPr/>
-      </p:nvGrpSpPr>
-      <p:grpSpPr>
-        <a:xfrm>
-          <a:off x="0" y="0"/>
-          <a:ext cx="0" cy="0"/>
-          <a:chOff x="0" y="0"/>
-          <a:chExt cx="0" cy="0"/>
-        </a:xfrm>
-      </p:grpSpPr>
-      <p:pic>
-        <p:nvPicPr>
-          <p:cNvPr id="1026" name="Picture 2" descr="1,813,013 Citrus Fruit Stock Photos, Pictures &amp;amp; Royalty-Free Images - iStock">
-            <a:extLst>
-              <a:ext uri="{FF2B5EF4-FFF2-40B4-BE49-F238E27FC236}">
-                <a16:creationId xmlns:a16="http://schemas.microsoft.com/office/drawing/2014/main" id="{5EA2B817-1E41-496F-B619-C71EFA2478EE}"/>
-              </a:ext>
-            </a:extLst>
-          </p:cNvPr>
-          <p:cNvPicPr>
-            <a:picLocks noChangeAspect="1" noChangeArrowheads="1"/>
-          </p:cNvPicPr>
-          <p:nvPr/>
-        </p:nvPicPr>
-        <p:blipFill>
-          <a:blip r:embed="rId3">
-            <a:extLst>
-              <a:ext uri="{28A0092B-C50C-407E-A947-70E740481C1C}">
-                <a14:useLocalDpi xmlns:a14="http://schemas.microsoft.com/office/drawing/2010/main" val="0"/>
-              </a:ext>
-            </a:extLst>
-          </a:blip>
-          <a:srcRect/>
-          <a:stretch>
-            <a:fillRect/>
-          </a:stretch>
-        </p:blipFill>
-        <p:spPr bwMode="auto">
-          <a:xfrm>
-            <a:off x="3181350" y="1233488"/>
-            <a:ext cx="5829300" cy="4391025"/>
-          </a:xfrm>
-          <a:prstGeom prst="rect">
-            <a:avLst/>
-          </a:prstGeom>
-          <a:noFill/>
-          <a:extLst>
-            <a:ext uri="{909E8E84-426E-40DD-AFC4-6F175D3DCCD1}">
-              <a14:hiddenFill xmlns:a14="http://schemas.microsoft.com/office/drawing/2010/main">
-                <a:solidFill>
-                  <a:srgbClr val="FFFFFF"/>
-                </a:solidFill>
-              </a14:hiddenFill>
-            </a:ext>
-          </a:extLst>
-        </p:spPr>
-      </p:pic>
-      <p:sp>
-        <p:nvSpPr>
-          <p:cNvPr id="5" name="Title 1">
-            <a:extLst>
-              <a:ext uri="{FF2B5EF4-FFF2-40B4-BE49-F238E27FC236}">
-                <a16:creationId xmlns:a16="http://schemas.microsoft.com/office/drawing/2014/main" id="{05F62613-C522-4879-B319-2FF7BE388A1F}"/>
-              </a:ext>
-            </a:extLst>
-          </p:cNvPr>
-          <p:cNvSpPr>
-            <a:spLocks noGrp="1"/>
-          </p:cNvSpPr>
-          <p:nvPr>
-            <p:ph type="title"/>
-          </p:nvPr>
-        </p:nvSpPr>
-        <p:spPr>
-          <a:xfrm>
-            <a:off x="8213119" y="1926477"/>
-            <a:ext cx="1595061" cy="383586"/>
-          </a:xfrm>
-          <a:noFill/>
-        </p:spPr>
-        <p:txBody>
-          <a:bodyPr>
-            <a:noAutofit/>
-          </a:bodyPr>
-          <a:lstStyle/>
-          <a:p>
-            <a:pPr algn="ctr"/>
-            <a:br>
-              <a:rPr lang="en-US" sz="1600" b="1" dirty="0">
-                <a:solidFill>
-                  <a:schemeClr val="tx1">
-                    <a:lumMod val="65000"/>
-                    <a:lumOff val="35000"/>
-                  </a:schemeClr>
-                </a:solidFill>
-              </a:rPr>
-            </a:br>
-            <a:br>
-              <a:rPr lang="en-US" sz="1600" b="1" dirty="0">
-                <a:solidFill>
-                  <a:schemeClr val="tx1">
-                    <a:lumMod val="65000"/>
-                    <a:lumOff val="35000"/>
-                  </a:schemeClr>
-                </a:solidFill>
-              </a:rPr>
-            </a:br>
-            <a:br>
-              <a:rPr lang="en-US" sz="1600" b="1" dirty="0">
-                <a:solidFill>
-                  <a:schemeClr val="tx1">
-                    <a:lumMod val="65000"/>
-                    <a:lumOff val="35000"/>
-                  </a:schemeClr>
-                </a:solidFill>
-              </a:rPr>
-            </a:br>
-            <a:br>
-              <a:rPr lang="en-US" sz="1600" b="1" dirty="0">
-                <a:solidFill>
-                  <a:schemeClr val="tx1">
-                    <a:lumMod val="65000"/>
-                    <a:lumOff val="35000"/>
-                  </a:schemeClr>
-                </a:solidFill>
-              </a:rPr>
-            </a:br>
-            <a:br>
-              <a:rPr lang="en-US" sz="1600" b="1" dirty="0">
-                <a:solidFill>
-                  <a:schemeClr val="tx1">
-                    <a:lumMod val="65000"/>
-                    <a:lumOff val="35000"/>
-                  </a:schemeClr>
-                </a:solidFill>
-              </a:rPr>
-            </a:br>
-            <a:br>
-              <a:rPr lang="en-US" sz="1600" b="1" dirty="0">
-                <a:solidFill>
-                  <a:schemeClr val="tx1">
-                    <a:lumMod val="65000"/>
-                    <a:lumOff val="35000"/>
-                  </a:schemeClr>
-                </a:solidFill>
-              </a:rPr>
-            </a:br>
-            <a:br>
-              <a:rPr lang="en-US" sz="1600" b="1" dirty="0">
-                <a:solidFill>
-                  <a:schemeClr val="tx1">
-                    <a:lumMod val="65000"/>
-                    <a:lumOff val="35000"/>
-                  </a:schemeClr>
-                </a:solidFill>
-              </a:rPr>
-            </a:br>
-            <a:br>
-              <a:rPr lang="en-US" sz="1600" b="1" dirty="0">
-                <a:solidFill>
-                  <a:schemeClr val="tx1">
-                    <a:lumMod val="65000"/>
-                    <a:lumOff val="35000"/>
-                  </a:schemeClr>
-                </a:solidFill>
-              </a:rPr>
-            </a:br>
-            <a:r>
-              <a:rPr lang="en-US" sz="1600" b="1" dirty="0">
-                <a:solidFill>
-                  <a:schemeClr val="tx1">
-                    <a:lumMod val="65000"/>
-                    <a:lumOff val="35000"/>
-                  </a:schemeClr>
-                </a:solidFill>
-              </a:rPr>
-              <a:t>    </a:t>
-            </a:r>
-            <a:br>
-              <a:rPr lang="en-US" sz="1600" b="1" dirty="0">
-                <a:solidFill>
-                  <a:schemeClr val="tx1">
-                    <a:lumMod val="65000"/>
-                    <a:lumOff val="35000"/>
-                  </a:schemeClr>
-                </a:solidFill>
-              </a:rPr>
-            </a:br>
-            <a:br>
-              <a:rPr lang="en-US" sz="1600" b="1" dirty="0">
-                <a:solidFill>
-                  <a:schemeClr val="tx1">
-                    <a:lumMod val="65000"/>
-                    <a:lumOff val="35000"/>
-                  </a:schemeClr>
-                </a:solidFill>
-              </a:rPr>
-            </a:br>
-            <a:r>
-              <a:rPr lang="en-US" sz="2000" dirty="0">
-                <a:solidFill>
-                  <a:schemeClr val="tx1">
-                    <a:lumMod val="65000"/>
-                    <a:lumOff val="35000"/>
-                  </a:schemeClr>
-                </a:solidFill>
-              </a:rPr>
-              <a:t>Grapefruit</a:t>
-            </a:r>
-            <a:endParaRPr lang="en-US" sz="2000" dirty="0">
-              <a:solidFill>
-                <a:schemeClr val="tx1">
-                  <a:lumMod val="65000"/>
-                  <a:lumOff val="35000"/>
-                </a:schemeClr>
-              </a:solidFill>
-              <a:latin typeface="Palatino Linotype" panose="02040502050505030304" pitchFamily="18" charset="0"/>
-              <a:cs typeface="Segoe UI Light" panose="020B0502040204020203" pitchFamily="34" charset="0"/>
-            </a:endParaRPr>
-          </a:p>
-        </p:txBody>
-      </p:sp>
-      <p:sp>
-        <p:nvSpPr>
-          <p:cNvPr id="6" name="Title 1">
-            <a:extLst>
-              <a:ext uri="{FF2B5EF4-FFF2-40B4-BE49-F238E27FC236}">
-                <a16:creationId xmlns:a16="http://schemas.microsoft.com/office/drawing/2014/main" id="{B01BC019-A1FB-4099-8C62-EB546866EB2B}"/>
-              </a:ext>
-            </a:extLst>
-          </p:cNvPr>
-          <p:cNvSpPr txBox="1">
-            <a:spLocks/>
-          </p:cNvSpPr>
-          <p:nvPr/>
-        </p:nvSpPr>
-        <p:spPr>
-          <a:xfrm>
-            <a:off x="2319213" y="2495972"/>
-            <a:ext cx="1297280" cy="359523"/>
-          </a:xfrm>
-          <a:prstGeom prst="rect">
-            <a:avLst/>
-          </a:prstGeom>
-          <a:noFill/>
-        </p:spPr>
-        <p:txBody>
-          <a:bodyPr vert="horz" lIns="91440" tIns="45720" rIns="91440" bIns="45720" rtlCol="0" anchor="b">
-            <a:noAutofit/>
-          </a:bodyPr>
-          <a:lstStyle>
-            <a:lvl1pPr algn="l" defTabSz="914400" rtl="0" eaLnBrk="1" latinLnBrk="0" hangingPunct="1">
-              <a:lnSpc>
-                <a:spcPct val="90000"/>
-              </a:lnSpc>
-              <a:spcBef>
-                <a:spcPct val="0"/>
-              </a:spcBef>
-              <a:buNone/>
-              <a:defRPr sz="6000" kern="1200">
-                <a:solidFill>
-                  <a:schemeClr val="tx1"/>
-                </a:solidFill>
-                <a:latin typeface="+mj-lt"/>
-                <a:ea typeface="+mj-ea"/>
-                <a:cs typeface="+mj-cs"/>
-              </a:defRPr>
-            </a:lvl1pPr>
-          </a:lstStyle>
-          <a:p>
-            <a:pPr algn="ctr"/>
-            <a:br>
-              <a:rPr lang="en-US" sz="1600" b="1" dirty="0">
-                <a:solidFill>
-                  <a:schemeClr val="tx1">
-                    <a:lumMod val="65000"/>
-                    <a:lumOff val="35000"/>
-                  </a:schemeClr>
-                </a:solidFill>
-              </a:rPr>
-            </a:br>
-            <a:br>
-              <a:rPr lang="en-US" sz="1600" b="1" dirty="0">
-                <a:solidFill>
-                  <a:schemeClr val="tx1">
-                    <a:lumMod val="65000"/>
-                    <a:lumOff val="35000"/>
-                  </a:schemeClr>
-                </a:solidFill>
-              </a:rPr>
-            </a:br>
-            <a:br>
-              <a:rPr lang="en-US" sz="1600" b="1" dirty="0">
-                <a:solidFill>
-                  <a:schemeClr val="tx1">
-                    <a:lumMod val="65000"/>
-                    <a:lumOff val="35000"/>
-                  </a:schemeClr>
-                </a:solidFill>
-              </a:rPr>
-            </a:br>
-            <a:br>
-              <a:rPr lang="en-US" sz="1600" b="1" dirty="0">
-                <a:solidFill>
-                  <a:schemeClr val="tx1">
-                    <a:lumMod val="65000"/>
-                    <a:lumOff val="35000"/>
-                  </a:schemeClr>
-                </a:solidFill>
-              </a:rPr>
-            </a:br>
-            <a:br>
-              <a:rPr lang="en-US" sz="1600" b="1" dirty="0">
-                <a:solidFill>
-                  <a:schemeClr val="tx1">
-                    <a:lumMod val="65000"/>
-                    <a:lumOff val="35000"/>
-                  </a:schemeClr>
-                </a:solidFill>
-              </a:rPr>
-            </a:br>
-            <a:br>
-              <a:rPr lang="en-US" sz="1600" b="1" dirty="0">
-                <a:solidFill>
-                  <a:schemeClr val="tx1">
-                    <a:lumMod val="65000"/>
-                    <a:lumOff val="35000"/>
-                  </a:schemeClr>
-                </a:solidFill>
-              </a:rPr>
-            </a:br>
-            <a:br>
-              <a:rPr lang="en-US" sz="1600" b="1" dirty="0">
-                <a:solidFill>
-                  <a:schemeClr val="tx1">
-                    <a:lumMod val="65000"/>
-                    <a:lumOff val="35000"/>
-                  </a:schemeClr>
-                </a:solidFill>
-              </a:rPr>
-            </a:br>
-            <a:br>
-              <a:rPr lang="en-US" sz="1600" b="1" dirty="0">
-                <a:solidFill>
-                  <a:schemeClr val="tx1">
-                    <a:lumMod val="65000"/>
-                    <a:lumOff val="35000"/>
-                  </a:schemeClr>
-                </a:solidFill>
-              </a:rPr>
-            </a:br>
-            <a:r>
-              <a:rPr lang="en-US" sz="1600" b="1" dirty="0">
-                <a:solidFill>
-                  <a:schemeClr val="tx1">
-                    <a:lumMod val="65000"/>
-                    <a:lumOff val="35000"/>
-                  </a:schemeClr>
-                </a:solidFill>
-              </a:rPr>
-              <a:t>    </a:t>
-            </a:r>
-            <a:br>
-              <a:rPr lang="en-US" sz="1600" b="1" dirty="0">
-                <a:solidFill>
-                  <a:schemeClr val="tx1">
-                    <a:lumMod val="65000"/>
-                    <a:lumOff val="35000"/>
-                  </a:schemeClr>
-                </a:solidFill>
-              </a:rPr>
-            </a:br>
-            <a:br>
-              <a:rPr lang="en-US" sz="1600" b="1" dirty="0">
-                <a:solidFill>
-                  <a:schemeClr val="tx1">
-                    <a:lumMod val="65000"/>
-                    <a:lumOff val="35000"/>
-                  </a:schemeClr>
-                </a:solidFill>
-              </a:rPr>
-            </a:br>
-            <a:r>
-              <a:rPr lang="en-US" sz="2000" dirty="0">
-                <a:solidFill>
-                  <a:schemeClr val="tx1">
-                    <a:lumMod val="65000"/>
-                    <a:lumOff val="35000"/>
-                  </a:schemeClr>
-                </a:solidFill>
-              </a:rPr>
-              <a:t>Orange</a:t>
-            </a:r>
-            <a:endParaRPr lang="en-US" sz="2000" dirty="0">
-              <a:solidFill>
-                <a:schemeClr val="tx1">
-                  <a:lumMod val="65000"/>
-                  <a:lumOff val="35000"/>
-                </a:schemeClr>
-              </a:solidFill>
-              <a:latin typeface="Palatino Linotype" panose="02040502050505030304" pitchFamily="18" charset="0"/>
-              <a:cs typeface="Segoe UI Light" panose="020B0502040204020203" pitchFamily="34" charset="0"/>
-            </a:endParaRPr>
-          </a:p>
-        </p:txBody>
-      </p:sp>
-      <p:sp>
-        <p:nvSpPr>
-          <p:cNvPr id="7" name="Title 1">
-            <a:extLst>
-              <a:ext uri="{FF2B5EF4-FFF2-40B4-BE49-F238E27FC236}">
-                <a16:creationId xmlns:a16="http://schemas.microsoft.com/office/drawing/2014/main" id="{63276A0C-22E3-4696-96FB-B6A44E1B71C5}"/>
-              </a:ext>
-            </a:extLst>
-          </p:cNvPr>
-          <p:cNvSpPr txBox="1">
-            <a:spLocks/>
-          </p:cNvSpPr>
-          <p:nvPr/>
-        </p:nvSpPr>
-        <p:spPr>
-          <a:xfrm>
-            <a:off x="5298469" y="619045"/>
-            <a:ext cx="1595061" cy="383586"/>
-          </a:xfrm>
-          <a:prstGeom prst="rect">
-            <a:avLst/>
-          </a:prstGeom>
-          <a:noFill/>
-        </p:spPr>
-        <p:txBody>
-          <a:bodyPr vert="horz" lIns="91440" tIns="45720" rIns="91440" bIns="45720" rtlCol="0" anchor="b">
-            <a:noAutofit/>
-          </a:bodyPr>
-          <a:lstStyle>
-            <a:lvl1pPr algn="l" defTabSz="914400" rtl="0" eaLnBrk="1" latinLnBrk="0" hangingPunct="1">
-              <a:lnSpc>
-                <a:spcPct val="90000"/>
-              </a:lnSpc>
-              <a:spcBef>
-                <a:spcPct val="0"/>
-              </a:spcBef>
-              <a:buNone/>
-              <a:defRPr sz="6000" kern="1200">
-                <a:solidFill>
-                  <a:schemeClr val="tx1"/>
-                </a:solidFill>
-                <a:latin typeface="+mj-lt"/>
-                <a:ea typeface="+mj-ea"/>
-                <a:cs typeface="+mj-cs"/>
-              </a:defRPr>
-            </a:lvl1pPr>
-          </a:lstStyle>
-          <a:p>
-            <a:pPr algn="ctr"/>
-            <a:br>
-              <a:rPr lang="en-US" sz="1600" b="1" dirty="0">
-                <a:solidFill>
-                  <a:schemeClr val="tx1">
-                    <a:lumMod val="65000"/>
-                    <a:lumOff val="35000"/>
-                  </a:schemeClr>
-                </a:solidFill>
-              </a:rPr>
-            </a:br>
-            <a:br>
-              <a:rPr lang="en-US" sz="1600" b="1" dirty="0">
-                <a:solidFill>
-                  <a:schemeClr val="tx1">
-                    <a:lumMod val="65000"/>
-                    <a:lumOff val="35000"/>
-                  </a:schemeClr>
-                </a:solidFill>
-              </a:rPr>
-            </a:br>
-            <a:br>
-              <a:rPr lang="en-US" sz="1600" b="1" dirty="0">
-                <a:solidFill>
-                  <a:schemeClr val="tx1">
-                    <a:lumMod val="65000"/>
-                    <a:lumOff val="35000"/>
-                  </a:schemeClr>
-                </a:solidFill>
-              </a:rPr>
-            </a:br>
-            <a:br>
-              <a:rPr lang="en-US" sz="1600" b="1" dirty="0">
-                <a:solidFill>
-                  <a:schemeClr val="tx1">
-                    <a:lumMod val="65000"/>
-                    <a:lumOff val="35000"/>
-                  </a:schemeClr>
-                </a:solidFill>
-              </a:rPr>
-            </a:br>
-            <a:br>
-              <a:rPr lang="en-US" sz="1600" b="1" dirty="0">
-                <a:solidFill>
-                  <a:schemeClr val="tx1">
-                    <a:lumMod val="65000"/>
-                    <a:lumOff val="35000"/>
-                  </a:schemeClr>
-                </a:solidFill>
-              </a:rPr>
-            </a:br>
-            <a:br>
-              <a:rPr lang="en-US" sz="1600" b="1" dirty="0">
-                <a:solidFill>
-                  <a:schemeClr val="tx1">
-                    <a:lumMod val="65000"/>
-                    <a:lumOff val="35000"/>
-                  </a:schemeClr>
-                </a:solidFill>
-              </a:rPr>
-            </a:br>
-            <a:br>
-              <a:rPr lang="en-US" sz="1600" b="1" dirty="0">
-                <a:solidFill>
-                  <a:schemeClr val="tx1">
-                    <a:lumMod val="65000"/>
-                    <a:lumOff val="35000"/>
-                  </a:schemeClr>
-                </a:solidFill>
-              </a:rPr>
-            </a:br>
-            <a:br>
-              <a:rPr lang="en-US" sz="1600" b="1" dirty="0">
-                <a:solidFill>
-                  <a:schemeClr val="tx1">
-                    <a:lumMod val="65000"/>
-                    <a:lumOff val="35000"/>
-                  </a:schemeClr>
-                </a:solidFill>
-              </a:rPr>
-            </a:br>
-            <a:r>
-              <a:rPr lang="en-US" sz="1600" b="1" dirty="0">
-                <a:solidFill>
-                  <a:schemeClr val="tx1">
-                    <a:lumMod val="65000"/>
-                    <a:lumOff val="35000"/>
-                  </a:schemeClr>
-                </a:solidFill>
-              </a:rPr>
-              <a:t>    </a:t>
-            </a:r>
-            <a:br>
-              <a:rPr lang="en-US" sz="1600" b="1" dirty="0">
-                <a:solidFill>
-                  <a:schemeClr val="tx1">
-                    <a:lumMod val="65000"/>
-                    <a:lumOff val="35000"/>
-                  </a:schemeClr>
-                </a:solidFill>
-              </a:rPr>
-            </a:br>
-            <a:br>
-              <a:rPr lang="en-US" sz="1600" b="1" dirty="0">
-                <a:solidFill>
-                  <a:schemeClr val="tx1">
-                    <a:lumMod val="65000"/>
-                    <a:lumOff val="35000"/>
-                  </a:schemeClr>
-                </a:solidFill>
-              </a:rPr>
-            </a:br>
-            <a:r>
-              <a:rPr lang="en-US" sz="2400" dirty="0">
-                <a:solidFill>
-                  <a:schemeClr val="tx1">
-                    <a:lumMod val="65000"/>
-                    <a:lumOff val="35000"/>
-                  </a:schemeClr>
-                </a:solidFill>
-              </a:rPr>
-              <a:t>Citrus</a:t>
-            </a:r>
-            <a:endParaRPr lang="en-US" sz="2400" dirty="0">
-              <a:solidFill>
-                <a:schemeClr val="tx1">
-                  <a:lumMod val="65000"/>
-                  <a:lumOff val="35000"/>
-                </a:schemeClr>
-              </a:solidFill>
-              <a:cs typeface="Segoe UI Light" panose="020B0502040204020203" pitchFamily="34" charset="0"/>
-            </a:endParaRPr>
-          </a:p>
-        </p:txBody>
-      </p:sp>
-      <p:sp>
-        <p:nvSpPr>
-          <p:cNvPr id="8" name="TextBox 7">
-            <a:extLst>
-              <a:ext uri="{FF2B5EF4-FFF2-40B4-BE49-F238E27FC236}">
-                <a16:creationId xmlns:a16="http://schemas.microsoft.com/office/drawing/2014/main" id="{B26E8DCC-039C-4807-AC0F-99503D6BA34B}"/>
-              </a:ext>
-            </a:extLst>
-          </p:cNvPr>
-          <p:cNvSpPr txBox="1"/>
-          <p:nvPr/>
-        </p:nvSpPr>
-        <p:spPr>
-          <a:xfrm>
-            <a:off x="0" y="6550223"/>
-            <a:ext cx="12192000" cy="307777"/>
-          </a:xfrm>
-          <a:prstGeom prst="rect">
-            <a:avLst/>
-          </a:prstGeom>
-          <a:noFill/>
-        </p:spPr>
-        <p:txBody>
-          <a:bodyPr wrap="square" rtlCol="0">
-            <a:spAutoFit/>
-          </a:bodyPr>
-          <a:lstStyle/>
-          <a:p>
-            <a:r>
-              <a:rPr lang="en-US" sz="1400" dirty="0">
-                <a:solidFill>
-                  <a:schemeClr val="tx1">
-                    <a:lumMod val="65000"/>
-                    <a:lumOff val="35000"/>
-                  </a:schemeClr>
-                </a:solidFill>
-                <a:latin typeface="+mj-lt"/>
-                <a:ea typeface="Verdana" panose="020B0604030504040204" pitchFamily="34" charset="0"/>
-              </a:rPr>
-              <a:t>Image Credit: </a:t>
-            </a:r>
-            <a:r>
-              <a:rPr lang="en-US" sz="1400" dirty="0">
-                <a:solidFill>
-                  <a:schemeClr val="tx1">
-                    <a:lumMod val="65000"/>
-                    <a:lumOff val="35000"/>
-                  </a:schemeClr>
-                </a:solidFill>
-              </a:rPr>
-              <a:t>https://www.istockphoto.com/photos/citrus-fruit</a:t>
-            </a:r>
-            <a:r>
-              <a:rPr lang="en-US" sz="1400" dirty="0">
-                <a:solidFill>
-                  <a:schemeClr val="tx1">
-                    <a:lumMod val="65000"/>
-                    <a:lumOff val="35000"/>
-                  </a:schemeClr>
-                </a:solidFill>
-                <a:latin typeface="+mj-lt"/>
-                <a:ea typeface="Verdana" panose="020B0604030504040204" pitchFamily="34" charset="0"/>
-              </a:rPr>
-              <a:t> </a:t>
-            </a:r>
-          </a:p>
-        </p:txBody>
-      </p:sp>
-    </p:spTree>
-    <p:extLst>
-      <p:ext uri="{BB962C8B-B14F-4D97-AF65-F5344CB8AC3E}">
-        <p14:creationId xmlns:p14="http://schemas.microsoft.com/office/powerpoint/2010/main" val="4276783067"/>
-      </p:ext>
-    </p:extLst>
-  </p:cSld>
-  <p:clrMapOvr>
-    <a:masterClrMapping/>
-  </p:clrMapOvr>
-  <mc:AlternateContent xmlns:mc="http://schemas.openxmlformats.org/markup-compatibility/2006" xmlns:p14="http://schemas.microsoft.com/office/powerpoint/2010/main">
-    <mc:Choice Requires="p14">
-      <p:transition spd="med" p14:dur="700">
-        <p:fade/>
-      </p:transition>
-    </mc:Choice>
-    <mc:Fallback xmlns="">
-      <p:transition spd="med">
-        <p:fade/>
-      </p:transition>
-    </mc:Fallback>
-  </mc:AlternateContent>
-</p:sld>
-</file>
-
 <file path=ppt/slides/slide18.xml><?xml version="1.0" encoding="utf-8"?>
 <p:sld xmlns:a="http://schemas.openxmlformats.org/drawingml/2006/main" xmlns:r="http://schemas.openxmlformats.org/officeDocument/2006/relationships" xmlns:p="http://schemas.openxmlformats.org/presentationml/2006/main">
   <p:cSld>
@@ -11107,6 +10931,695 @@
           <a:chExt cx="0" cy="0"/>
         </a:xfrm>
       </p:grpSpPr>
+      <p:pic>
+        <p:nvPicPr>
+          <p:cNvPr id="1026" name="Picture 2" descr="1,813,013 Citrus Fruit Stock Photos, Pictures &amp;amp; Royalty-Free Images - iStock">
+            <a:extLst>
+              <a:ext uri="{FF2B5EF4-FFF2-40B4-BE49-F238E27FC236}">
+                <a16:creationId xmlns:a16="http://schemas.microsoft.com/office/drawing/2014/main" id="{5EA2B817-1E41-496F-B619-C71EFA2478EE}"/>
+              </a:ext>
+            </a:extLst>
+          </p:cNvPr>
+          <p:cNvPicPr>
+            <a:picLocks noChangeAspect="1" noChangeArrowheads="1"/>
+          </p:cNvPicPr>
+          <p:nvPr/>
+        </p:nvPicPr>
+        <p:blipFill>
+          <a:blip r:embed="rId3">
+            <a:extLst>
+              <a:ext uri="{28A0092B-C50C-407E-A947-70E740481C1C}">
+                <a14:useLocalDpi xmlns:a14="http://schemas.microsoft.com/office/drawing/2010/main" val="0"/>
+              </a:ext>
+            </a:extLst>
+          </a:blip>
+          <a:srcRect/>
+          <a:stretch>
+            <a:fillRect/>
+          </a:stretch>
+        </p:blipFill>
+        <p:spPr bwMode="auto">
+          <a:xfrm>
+            <a:off x="3181350" y="1233488"/>
+            <a:ext cx="5829300" cy="4391025"/>
+          </a:xfrm>
+          <a:prstGeom prst="rect">
+            <a:avLst/>
+          </a:prstGeom>
+          <a:noFill/>
+          <a:extLst>
+            <a:ext uri="{909E8E84-426E-40DD-AFC4-6F175D3DCCD1}">
+              <a14:hiddenFill xmlns:a14="http://schemas.microsoft.com/office/drawing/2010/main">
+                <a:solidFill>
+                  <a:srgbClr val="FFFFFF"/>
+                </a:solidFill>
+              </a14:hiddenFill>
+            </a:ext>
+          </a:extLst>
+        </p:spPr>
+      </p:pic>
+      <p:sp>
+        <p:nvSpPr>
+          <p:cNvPr id="5" name="Title 1">
+            <a:extLst>
+              <a:ext uri="{FF2B5EF4-FFF2-40B4-BE49-F238E27FC236}">
+                <a16:creationId xmlns:a16="http://schemas.microsoft.com/office/drawing/2014/main" id="{05F62613-C522-4879-B319-2FF7BE388A1F}"/>
+              </a:ext>
+            </a:extLst>
+          </p:cNvPr>
+          <p:cNvSpPr>
+            <a:spLocks noGrp="1"/>
+          </p:cNvSpPr>
+          <p:nvPr>
+            <p:ph type="title"/>
+          </p:nvPr>
+        </p:nvSpPr>
+        <p:spPr>
+          <a:xfrm>
+            <a:off x="8213119" y="1926477"/>
+            <a:ext cx="1595061" cy="383586"/>
+          </a:xfrm>
+          <a:noFill/>
+        </p:spPr>
+        <p:txBody>
+          <a:bodyPr>
+            <a:noAutofit/>
+          </a:bodyPr>
+          <a:lstStyle/>
+          <a:p>
+            <a:pPr algn="ctr"/>
+            <a:br>
+              <a:rPr lang="en-US" sz="1600" b="1" dirty="0">
+                <a:solidFill>
+                  <a:schemeClr val="tx1">
+                    <a:lumMod val="65000"/>
+                    <a:lumOff val="35000"/>
+                  </a:schemeClr>
+                </a:solidFill>
+              </a:rPr>
+            </a:br>
+            <a:br>
+              <a:rPr lang="en-US" sz="1600" b="1" dirty="0">
+                <a:solidFill>
+                  <a:schemeClr val="tx1">
+                    <a:lumMod val="65000"/>
+                    <a:lumOff val="35000"/>
+                  </a:schemeClr>
+                </a:solidFill>
+              </a:rPr>
+            </a:br>
+            <a:br>
+              <a:rPr lang="en-US" sz="1600" b="1" dirty="0">
+                <a:solidFill>
+                  <a:schemeClr val="tx1">
+                    <a:lumMod val="65000"/>
+                    <a:lumOff val="35000"/>
+                  </a:schemeClr>
+                </a:solidFill>
+              </a:rPr>
+            </a:br>
+            <a:br>
+              <a:rPr lang="en-US" sz="1600" b="1" dirty="0">
+                <a:solidFill>
+                  <a:schemeClr val="tx1">
+                    <a:lumMod val="65000"/>
+                    <a:lumOff val="35000"/>
+                  </a:schemeClr>
+                </a:solidFill>
+              </a:rPr>
+            </a:br>
+            <a:br>
+              <a:rPr lang="en-US" sz="1600" b="1" dirty="0">
+                <a:solidFill>
+                  <a:schemeClr val="tx1">
+                    <a:lumMod val="65000"/>
+                    <a:lumOff val="35000"/>
+                  </a:schemeClr>
+                </a:solidFill>
+              </a:rPr>
+            </a:br>
+            <a:br>
+              <a:rPr lang="en-US" sz="1600" b="1" dirty="0">
+                <a:solidFill>
+                  <a:schemeClr val="tx1">
+                    <a:lumMod val="65000"/>
+                    <a:lumOff val="35000"/>
+                  </a:schemeClr>
+                </a:solidFill>
+              </a:rPr>
+            </a:br>
+            <a:br>
+              <a:rPr lang="en-US" sz="1600" b="1" dirty="0">
+                <a:solidFill>
+                  <a:schemeClr val="tx1">
+                    <a:lumMod val="65000"/>
+                    <a:lumOff val="35000"/>
+                  </a:schemeClr>
+                </a:solidFill>
+              </a:rPr>
+            </a:br>
+            <a:br>
+              <a:rPr lang="en-US" sz="1600" b="1" dirty="0">
+                <a:solidFill>
+                  <a:schemeClr val="tx1">
+                    <a:lumMod val="65000"/>
+                    <a:lumOff val="35000"/>
+                  </a:schemeClr>
+                </a:solidFill>
+              </a:rPr>
+            </a:br>
+            <a:r>
+              <a:rPr lang="en-US" sz="1600" b="1" dirty="0">
+                <a:solidFill>
+                  <a:schemeClr val="tx1">
+                    <a:lumMod val="65000"/>
+                    <a:lumOff val="35000"/>
+                  </a:schemeClr>
+                </a:solidFill>
+              </a:rPr>
+              <a:t>    </a:t>
+            </a:r>
+            <a:br>
+              <a:rPr lang="en-US" sz="1600" b="1" dirty="0">
+                <a:solidFill>
+                  <a:schemeClr val="tx1">
+                    <a:lumMod val="65000"/>
+                    <a:lumOff val="35000"/>
+                  </a:schemeClr>
+                </a:solidFill>
+              </a:rPr>
+            </a:br>
+            <a:br>
+              <a:rPr lang="en-US" sz="1600" b="1" dirty="0">
+                <a:solidFill>
+                  <a:schemeClr val="tx1">
+                    <a:lumMod val="65000"/>
+                    <a:lumOff val="35000"/>
+                  </a:schemeClr>
+                </a:solidFill>
+              </a:rPr>
+            </a:br>
+            <a:r>
+              <a:rPr lang="en-US" sz="2000" dirty="0">
+                <a:solidFill>
+                  <a:schemeClr val="tx1">
+                    <a:lumMod val="65000"/>
+                    <a:lumOff val="35000"/>
+                  </a:schemeClr>
+                </a:solidFill>
+              </a:rPr>
+              <a:t>Grapefruit</a:t>
+            </a:r>
+            <a:endParaRPr lang="en-US" sz="2000" dirty="0">
+              <a:solidFill>
+                <a:schemeClr val="tx1">
+                  <a:lumMod val="65000"/>
+                  <a:lumOff val="35000"/>
+                </a:schemeClr>
+              </a:solidFill>
+              <a:latin typeface="Palatino Linotype" panose="02040502050505030304" pitchFamily="18" charset="0"/>
+              <a:cs typeface="Segoe UI Light" panose="020B0502040204020203" pitchFamily="34" charset="0"/>
+            </a:endParaRPr>
+          </a:p>
+        </p:txBody>
+      </p:sp>
+      <p:sp>
+        <p:nvSpPr>
+          <p:cNvPr id="6" name="Title 1">
+            <a:extLst>
+              <a:ext uri="{FF2B5EF4-FFF2-40B4-BE49-F238E27FC236}">
+                <a16:creationId xmlns:a16="http://schemas.microsoft.com/office/drawing/2014/main" id="{B01BC019-A1FB-4099-8C62-EB546866EB2B}"/>
+              </a:ext>
+            </a:extLst>
+          </p:cNvPr>
+          <p:cNvSpPr txBox="1">
+            <a:spLocks/>
+          </p:cNvSpPr>
+          <p:nvPr/>
+        </p:nvSpPr>
+        <p:spPr>
+          <a:xfrm>
+            <a:off x="2319213" y="2495972"/>
+            <a:ext cx="1297280" cy="359523"/>
+          </a:xfrm>
+          <a:prstGeom prst="rect">
+            <a:avLst/>
+          </a:prstGeom>
+          <a:noFill/>
+        </p:spPr>
+        <p:txBody>
+          <a:bodyPr vert="horz" lIns="91440" tIns="45720" rIns="91440" bIns="45720" rtlCol="0" anchor="b">
+            <a:noAutofit/>
+          </a:bodyPr>
+          <a:lstStyle>
+            <a:lvl1pPr algn="l" defTabSz="914400" rtl="0" eaLnBrk="1" latinLnBrk="0" hangingPunct="1">
+              <a:lnSpc>
+                <a:spcPct val="90000"/>
+              </a:lnSpc>
+              <a:spcBef>
+                <a:spcPct val="0"/>
+              </a:spcBef>
+              <a:buNone/>
+              <a:defRPr sz="6000" kern="1200">
+                <a:solidFill>
+                  <a:schemeClr val="tx1"/>
+                </a:solidFill>
+                <a:latin typeface="+mj-lt"/>
+                <a:ea typeface="+mj-ea"/>
+                <a:cs typeface="+mj-cs"/>
+              </a:defRPr>
+            </a:lvl1pPr>
+          </a:lstStyle>
+          <a:p>
+            <a:pPr algn="ctr"/>
+            <a:br>
+              <a:rPr lang="en-US" sz="1600" b="1" dirty="0">
+                <a:solidFill>
+                  <a:schemeClr val="tx1">
+                    <a:lumMod val="65000"/>
+                    <a:lumOff val="35000"/>
+                  </a:schemeClr>
+                </a:solidFill>
+              </a:rPr>
+            </a:br>
+            <a:br>
+              <a:rPr lang="en-US" sz="1600" b="1" dirty="0">
+                <a:solidFill>
+                  <a:schemeClr val="tx1">
+                    <a:lumMod val="65000"/>
+                    <a:lumOff val="35000"/>
+                  </a:schemeClr>
+                </a:solidFill>
+              </a:rPr>
+            </a:br>
+            <a:br>
+              <a:rPr lang="en-US" sz="1600" b="1" dirty="0">
+                <a:solidFill>
+                  <a:schemeClr val="tx1">
+                    <a:lumMod val="65000"/>
+                    <a:lumOff val="35000"/>
+                  </a:schemeClr>
+                </a:solidFill>
+              </a:rPr>
+            </a:br>
+            <a:br>
+              <a:rPr lang="en-US" sz="1600" b="1" dirty="0">
+                <a:solidFill>
+                  <a:schemeClr val="tx1">
+                    <a:lumMod val="65000"/>
+                    <a:lumOff val="35000"/>
+                  </a:schemeClr>
+                </a:solidFill>
+              </a:rPr>
+            </a:br>
+            <a:br>
+              <a:rPr lang="en-US" sz="1600" b="1" dirty="0">
+                <a:solidFill>
+                  <a:schemeClr val="tx1">
+                    <a:lumMod val="65000"/>
+                    <a:lumOff val="35000"/>
+                  </a:schemeClr>
+                </a:solidFill>
+              </a:rPr>
+            </a:br>
+            <a:br>
+              <a:rPr lang="en-US" sz="1600" b="1" dirty="0">
+                <a:solidFill>
+                  <a:schemeClr val="tx1">
+                    <a:lumMod val="65000"/>
+                    <a:lumOff val="35000"/>
+                  </a:schemeClr>
+                </a:solidFill>
+              </a:rPr>
+            </a:br>
+            <a:br>
+              <a:rPr lang="en-US" sz="1600" b="1" dirty="0">
+                <a:solidFill>
+                  <a:schemeClr val="tx1">
+                    <a:lumMod val="65000"/>
+                    <a:lumOff val="35000"/>
+                  </a:schemeClr>
+                </a:solidFill>
+              </a:rPr>
+            </a:br>
+            <a:br>
+              <a:rPr lang="en-US" sz="1600" b="1" dirty="0">
+                <a:solidFill>
+                  <a:schemeClr val="tx1">
+                    <a:lumMod val="65000"/>
+                    <a:lumOff val="35000"/>
+                  </a:schemeClr>
+                </a:solidFill>
+              </a:rPr>
+            </a:br>
+            <a:r>
+              <a:rPr lang="en-US" sz="1600" b="1" dirty="0">
+                <a:solidFill>
+                  <a:schemeClr val="tx1">
+                    <a:lumMod val="65000"/>
+                    <a:lumOff val="35000"/>
+                  </a:schemeClr>
+                </a:solidFill>
+              </a:rPr>
+              <a:t>    </a:t>
+            </a:r>
+            <a:br>
+              <a:rPr lang="en-US" sz="1600" b="1" dirty="0">
+                <a:solidFill>
+                  <a:schemeClr val="tx1">
+                    <a:lumMod val="65000"/>
+                    <a:lumOff val="35000"/>
+                  </a:schemeClr>
+                </a:solidFill>
+              </a:rPr>
+            </a:br>
+            <a:br>
+              <a:rPr lang="en-US" sz="1600" b="1" dirty="0">
+                <a:solidFill>
+                  <a:schemeClr val="tx1">
+                    <a:lumMod val="65000"/>
+                    <a:lumOff val="35000"/>
+                  </a:schemeClr>
+                </a:solidFill>
+              </a:rPr>
+            </a:br>
+            <a:r>
+              <a:rPr lang="en-US" sz="2000" dirty="0">
+                <a:solidFill>
+                  <a:schemeClr val="tx1">
+                    <a:lumMod val="65000"/>
+                    <a:lumOff val="35000"/>
+                  </a:schemeClr>
+                </a:solidFill>
+              </a:rPr>
+              <a:t>Orange</a:t>
+            </a:r>
+            <a:endParaRPr lang="en-US" sz="2000" dirty="0">
+              <a:solidFill>
+                <a:schemeClr val="tx1">
+                  <a:lumMod val="65000"/>
+                  <a:lumOff val="35000"/>
+                </a:schemeClr>
+              </a:solidFill>
+              <a:latin typeface="Palatino Linotype" panose="02040502050505030304" pitchFamily="18" charset="0"/>
+              <a:cs typeface="Segoe UI Light" panose="020B0502040204020203" pitchFamily="34" charset="0"/>
+            </a:endParaRPr>
+          </a:p>
+        </p:txBody>
+      </p:sp>
+      <p:sp>
+        <p:nvSpPr>
+          <p:cNvPr id="7" name="Title 1">
+            <a:extLst>
+              <a:ext uri="{FF2B5EF4-FFF2-40B4-BE49-F238E27FC236}">
+                <a16:creationId xmlns:a16="http://schemas.microsoft.com/office/drawing/2014/main" id="{63276A0C-22E3-4696-96FB-B6A44E1B71C5}"/>
+              </a:ext>
+            </a:extLst>
+          </p:cNvPr>
+          <p:cNvSpPr txBox="1">
+            <a:spLocks/>
+          </p:cNvSpPr>
+          <p:nvPr/>
+        </p:nvSpPr>
+        <p:spPr>
+          <a:xfrm>
+            <a:off x="5298469" y="619045"/>
+            <a:ext cx="1595061" cy="383586"/>
+          </a:xfrm>
+          <a:prstGeom prst="rect">
+            <a:avLst/>
+          </a:prstGeom>
+          <a:noFill/>
+        </p:spPr>
+        <p:txBody>
+          <a:bodyPr vert="horz" lIns="91440" tIns="45720" rIns="91440" bIns="45720" rtlCol="0" anchor="b">
+            <a:noAutofit/>
+          </a:bodyPr>
+          <a:lstStyle>
+            <a:lvl1pPr algn="l" defTabSz="914400" rtl="0" eaLnBrk="1" latinLnBrk="0" hangingPunct="1">
+              <a:lnSpc>
+                <a:spcPct val="90000"/>
+              </a:lnSpc>
+              <a:spcBef>
+                <a:spcPct val="0"/>
+              </a:spcBef>
+              <a:buNone/>
+              <a:defRPr sz="6000" kern="1200">
+                <a:solidFill>
+                  <a:schemeClr val="tx1"/>
+                </a:solidFill>
+                <a:latin typeface="+mj-lt"/>
+                <a:ea typeface="+mj-ea"/>
+                <a:cs typeface="+mj-cs"/>
+              </a:defRPr>
+            </a:lvl1pPr>
+          </a:lstStyle>
+          <a:p>
+            <a:pPr algn="ctr"/>
+            <a:br>
+              <a:rPr lang="en-US" sz="1600" b="1" dirty="0">
+                <a:solidFill>
+                  <a:schemeClr val="tx1">
+                    <a:lumMod val="65000"/>
+                    <a:lumOff val="35000"/>
+                  </a:schemeClr>
+                </a:solidFill>
+              </a:rPr>
+            </a:br>
+            <a:br>
+              <a:rPr lang="en-US" sz="1600" b="1" dirty="0">
+                <a:solidFill>
+                  <a:schemeClr val="tx1">
+                    <a:lumMod val="65000"/>
+                    <a:lumOff val="35000"/>
+                  </a:schemeClr>
+                </a:solidFill>
+              </a:rPr>
+            </a:br>
+            <a:br>
+              <a:rPr lang="en-US" sz="1600" b="1" dirty="0">
+                <a:solidFill>
+                  <a:schemeClr val="tx1">
+                    <a:lumMod val="65000"/>
+                    <a:lumOff val="35000"/>
+                  </a:schemeClr>
+                </a:solidFill>
+              </a:rPr>
+            </a:br>
+            <a:br>
+              <a:rPr lang="en-US" sz="1600" b="1" dirty="0">
+                <a:solidFill>
+                  <a:schemeClr val="tx1">
+                    <a:lumMod val="65000"/>
+                    <a:lumOff val="35000"/>
+                  </a:schemeClr>
+                </a:solidFill>
+              </a:rPr>
+            </a:br>
+            <a:br>
+              <a:rPr lang="en-US" sz="1600" b="1" dirty="0">
+                <a:solidFill>
+                  <a:schemeClr val="tx1">
+                    <a:lumMod val="65000"/>
+                    <a:lumOff val="35000"/>
+                  </a:schemeClr>
+                </a:solidFill>
+              </a:rPr>
+            </a:br>
+            <a:br>
+              <a:rPr lang="en-US" sz="1600" b="1" dirty="0">
+                <a:solidFill>
+                  <a:schemeClr val="tx1">
+                    <a:lumMod val="65000"/>
+                    <a:lumOff val="35000"/>
+                  </a:schemeClr>
+                </a:solidFill>
+              </a:rPr>
+            </a:br>
+            <a:br>
+              <a:rPr lang="en-US" sz="1600" b="1" dirty="0">
+                <a:solidFill>
+                  <a:schemeClr val="tx1">
+                    <a:lumMod val="65000"/>
+                    <a:lumOff val="35000"/>
+                  </a:schemeClr>
+                </a:solidFill>
+              </a:rPr>
+            </a:br>
+            <a:br>
+              <a:rPr lang="en-US" sz="1600" b="1" dirty="0">
+                <a:solidFill>
+                  <a:schemeClr val="tx1">
+                    <a:lumMod val="65000"/>
+                    <a:lumOff val="35000"/>
+                  </a:schemeClr>
+                </a:solidFill>
+              </a:rPr>
+            </a:br>
+            <a:r>
+              <a:rPr lang="en-US" sz="1600" b="1" dirty="0">
+                <a:solidFill>
+                  <a:schemeClr val="tx1">
+                    <a:lumMod val="65000"/>
+                    <a:lumOff val="35000"/>
+                  </a:schemeClr>
+                </a:solidFill>
+              </a:rPr>
+              <a:t>    </a:t>
+            </a:r>
+            <a:br>
+              <a:rPr lang="en-US" sz="1600" b="1" dirty="0">
+                <a:solidFill>
+                  <a:schemeClr val="tx1">
+                    <a:lumMod val="65000"/>
+                    <a:lumOff val="35000"/>
+                  </a:schemeClr>
+                </a:solidFill>
+              </a:rPr>
+            </a:br>
+            <a:br>
+              <a:rPr lang="en-US" sz="1600" b="1" dirty="0">
+                <a:solidFill>
+                  <a:schemeClr val="tx1">
+                    <a:lumMod val="65000"/>
+                    <a:lumOff val="35000"/>
+                  </a:schemeClr>
+                </a:solidFill>
+              </a:rPr>
+            </a:br>
+            <a:r>
+              <a:rPr lang="en-US" sz="2400" dirty="0">
+                <a:solidFill>
+                  <a:schemeClr val="tx1">
+                    <a:lumMod val="65000"/>
+                    <a:lumOff val="35000"/>
+                  </a:schemeClr>
+                </a:solidFill>
+              </a:rPr>
+              <a:t>Citrus</a:t>
+            </a:r>
+            <a:endParaRPr lang="en-US" sz="2400" dirty="0">
+              <a:solidFill>
+                <a:schemeClr val="tx1">
+                  <a:lumMod val="65000"/>
+                  <a:lumOff val="35000"/>
+                </a:schemeClr>
+              </a:solidFill>
+              <a:cs typeface="Segoe UI Light" panose="020B0502040204020203" pitchFamily="34" charset="0"/>
+            </a:endParaRPr>
+          </a:p>
+        </p:txBody>
+      </p:sp>
+      <p:sp>
+        <p:nvSpPr>
+          <p:cNvPr id="8" name="TextBox 7">
+            <a:extLst>
+              <a:ext uri="{FF2B5EF4-FFF2-40B4-BE49-F238E27FC236}">
+                <a16:creationId xmlns:a16="http://schemas.microsoft.com/office/drawing/2014/main" id="{B26E8DCC-039C-4807-AC0F-99503D6BA34B}"/>
+              </a:ext>
+            </a:extLst>
+          </p:cNvPr>
+          <p:cNvSpPr txBox="1"/>
+          <p:nvPr/>
+        </p:nvSpPr>
+        <p:spPr>
+          <a:xfrm>
+            <a:off x="0" y="6550223"/>
+            <a:ext cx="12192000" cy="307777"/>
+          </a:xfrm>
+          <a:prstGeom prst="rect">
+            <a:avLst/>
+          </a:prstGeom>
+          <a:noFill/>
+        </p:spPr>
+        <p:txBody>
+          <a:bodyPr wrap="square" rtlCol="0">
+            <a:spAutoFit/>
+          </a:bodyPr>
+          <a:lstStyle/>
+          <a:p>
+            <a:r>
+              <a:rPr lang="en-US" sz="1400" dirty="0">
+                <a:solidFill>
+                  <a:schemeClr val="tx1">
+                    <a:lumMod val="65000"/>
+                    <a:lumOff val="35000"/>
+                  </a:schemeClr>
+                </a:solidFill>
+                <a:latin typeface="+mj-lt"/>
+                <a:ea typeface="Verdana" panose="020B0604030504040204" pitchFamily="34" charset="0"/>
+              </a:rPr>
+              <a:t>Image Credit: </a:t>
+            </a:r>
+            <a:r>
+              <a:rPr lang="en-US" sz="1400" dirty="0">
+                <a:solidFill>
+                  <a:schemeClr val="tx1">
+                    <a:lumMod val="65000"/>
+                    <a:lumOff val="35000"/>
+                  </a:schemeClr>
+                </a:solidFill>
+              </a:rPr>
+              <a:t>https://www.istockphoto.com/photos/citrus-fruit</a:t>
+            </a:r>
+            <a:r>
+              <a:rPr lang="en-US" sz="1400" dirty="0">
+                <a:solidFill>
+                  <a:schemeClr val="tx1">
+                    <a:lumMod val="65000"/>
+                    <a:lumOff val="35000"/>
+                  </a:schemeClr>
+                </a:solidFill>
+                <a:latin typeface="+mj-lt"/>
+                <a:ea typeface="Verdana" panose="020B0604030504040204" pitchFamily="34" charset="0"/>
+              </a:rPr>
+              <a:t> </a:t>
+            </a:r>
+          </a:p>
+        </p:txBody>
+      </p:sp>
+    </p:spTree>
+    <p:extLst>
+      <p:ext uri="{BB962C8B-B14F-4D97-AF65-F5344CB8AC3E}">
+        <p14:creationId xmlns:p14="http://schemas.microsoft.com/office/powerpoint/2010/main" val="4276783067"/>
+      </p:ext>
+    </p:extLst>
+  </p:cSld>
+  <p:clrMapOvr>
+    <a:masterClrMapping/>
+  </p:clrMapOvr>
+  <mc:AlternateContent xmlns:mc="http://schemas.openxmlformats.org/markup-compatibility/2006" xmlns:p14="http://schemas.microsoft.com/office/powerpoint/2010/main">
+    <mc:Choice Requires="p14">
+      <p:transition spd="med" p14:dur="700">
+        <p:fade/>
+      </p:transition>
+    </mc:Choice>
+    <mc:Fallback xmlns="">
+      <p:transition spd="med">
+        <p:fade/>
+      </p:transition>
+    </mc:Fallback>
+  </mc:AlternateContent>
+</p:sld>
+</file>
+
+<file path=ppt/slides/slide22.xml><?xml version="1.0" encoding="utf-8"?>
+<p:sld xmlns:a="http://schemas.openxmlformats.org/drawingml/2006/main" xmlns:r="http://schemas.openxmlformats.org/officeDocument/2006/relationships" xmlns:p="http://schemas.openxmlformats.org/presentationml/2006/main">
+  <p:cSld>
+    <p:spTree>
+      <p:nvGrpSpPr>
+        <p:cNvPr id="1" name=""/>
+        <p:cNvGrpSpPr/>
+        <p:nvPr/>
+      </p:nvGrpSpPr>
+      <p:grpSpPr>
+        <a:xfrm>
+          <a:off x="0" y="0"/>
+          <a:ext cx="0" cy="0"/>
+          <a:chOff x="0" y="0"/>
+          <a:chExt cx="0" cy="0"/>
+        </a:xfrm>
+      </p:grpSpPr>
       <p:sp>
         <p:nvSpPr>
           <p:cNvPr id="2" name="Title 1">
@@ -11878,7 +12391,7 @@
 </p:sld>
 </file>
 
-<file path=ppt/slides/slide22.xml><?xml version="1.0" encoding="utf-8"?>
+<file path=ppt/slides/slide23.xml><?xml version="1.0" encoding="utf-8"?>
 <p:sld xmlns:a="http://schemas.openxmlformats.org/drawingml/2006/main" xmlns:r="http://schemas.openxmlformats.org/officeDocument/2006/relationships" xmlns:p="http://schemas.openxmlformats.org/presentationml/2006/main">
   <p:cSld>
     <p:spTree>
@@ -12891,6 +13404,196 @@
           </a:p>
         </p:txBody>
       </p:sp>
+      <p:cxnSp>
+        <p:nvCxnSpPr>
+          <p:cNvPr id="5" name="Straight Connector 4">
+            <a:extLst>
+              <a:ext uri="{FF2B5EF4-FFF2-40B4-BE49-F238E27FC236}">
+                <a16:creationId xmlns:a16="http://schemas.microsoft.com/office/drawing/2014/main" id="{7189903D-DDA7-118C-377A-93233225ADBD}"/>
+              </a:ext>
+            </a:extLst>
+          </p:cNvPr>
+          <p:cNvCxnSpPr>
+            <a:cxnSpLocks/>
+          </p:cNvCxnSpPr>
+          <p:nvPr/>
+        </p:nvCxnSpPr>
+        <p:spPr>
+          <a:xfrm>
+            <a:off x="2149642" y="1844842"/>
+            <a:ext cx="1426154" cy="0"/>
+          </a:xfrm>
+          <a:prstGeom prst="line">
+            <a:avLst/>
+          </a:prstGeom>
+        </p:spPr>
+        <p:style>
+          <a:lnRef idx="1">
+            <a:schemeClr val="accent2"/>
+          </a:lnRef>
+          <a:fillRef idx="0">
+            <a:schemeClr val="accent2"/>
+          </a:fillRef>
+          <a:effectRef idx="0">
+            <a:schemeClr val="accent2"/>
+          </a:effectRef>
+          <a:fontRef idx="minor">
+            <a:schemeClr val="tx1"/>
+          </a:fontRef>
+        </p:style>
+      </p:cxnSp>
+      <p:cxnSp>
+        <p:nvCxnSpPr>
+          <p:cNvPr id="7" name="Straight Connector 6">
+            <a:extLst>
+              <a:ext uri="{FF2B5EF4-FFF2-40B4-BE49-F238E27FC236}">
+                <a16:creationId xmlns:a16="http://schemas.microsoft.com/office/drawing/2014/main" id="{213FFA1E-9A56-97A6-58E6-1FEE21D7CF50}"/>
+              </a:ext>
+            </a:extLst>
+          </p:cNvPr>
+          <p:cNvCxnSpPr>
+            <a:cxnSpLocks/>
+          </p:cNvCxnSpPr>
+          <p:nvPr/>
+        </p:nvCxnSpPr>
+        <p:spPr>
+          <a:xfrm>
+            <a:off x="2149642" y="2703090"/>
+            <a:ext cx="1402092" cy="0"/>
+          </a:xfrm>
+          <a:prstGeom prst="line">
+            <a:avLst/>
+          </a:prstGeom>
+        </p:spPr>
+        <p:style>
+          <a:lnRef idx="1">
+            <a:schemeClr val="accent2"/>
+          </a:lnRef>
+          <a:fillRef idx="0">
+            <a:schemeClr val="accent2"/>
+          </a:fillRef>
+          <a:effectRef idx="0">
+            <a:schemeClr val="accent2"/>
+          </a:effectRef>
+          <a:fontRef idx="minor">
+            <a:schemeClr val="tx1"/>
+          </a:fontRef>
+        </p:style>
+      </p:cxnSp>
+      <p:cxnSp>
+        <p:nvCxnSpPr>
+          <p:cNvPr id="8" name="Straight Connector 7">
+            <a:extLst>
+              <a:ext uri="{FF2B5EF4-FFF2-40B4-BE49-F238E27FC236}">
+                <a16:creationId xmlns:a16="http://schemas.microsoft.com/office/drawing/2014/main" id="{8A860803-E2B9-2ED3-D539-EFCB1E643844}"/>
+              </a:ext>
+            </a:extLst>
+          </p:cNvPr>
+          <p:cNvCxnSpPr>
+            <a:cxnSpLocks/>
+          </p:cNvCxnSpPr>
+          <p:nvPr/>
+        </p:nvCxnSpPr>
+        <p:spPr>
+          <a:xfrm>
+            <a:off x="2149642" y="3561347"/>
+            <a:ext cx="1402092" cy="0"/>
+          </a:xfrm>
+          <a:prstGeom prst="line">
+            <a:avLst/>
+          </a:prstGeom>
+        </p:spPr>
+        <p:style>
+          <a:lnRef idx="1">
+            <a:schemeClr val="accent2"/>
+          </a:lnRef>
+          <a:fillRef idx="0">
+            <a:schemeClr val="accent2"/>
+          </a:fillRef>
+          <a:effectRef idx="0">
+            <a:schemeClr val="accent2"/>
+          </a:effectRef>
+          <a:fontRef idx="minor">
+            <a:schemeClr val="tx1"/>
+          </a:fontRef>
+        </p:style>
+      </p:cxnSp>
+      <p:cxnSp>
+        <p:nvCxnSpPr>
+          <p:cNvPr id="9" name="Straight Connector 8">
+            <a:extLst>
+              <a:ext uri="{FF2B5EF4-FFF2-40B4-BE49-F238E27FC236}">
+                <a16:creationId xmlns:a16="http://schemas.microsoft.com/office/drawing/2014/main" id="{E238CEBB-EFB7-D20A-38EC-EA73624E068E}"/>
+              </a:ext>
+            </a:extLst>
+          </p:cNvPr>
+          <p:cNvCxnSpPr>
+            <a:cxnSpLocks/>
+          </p:cNvCxnSpPr>
+          <p:nvPr/>
+        </p:nvCxnSpPr>
+        <p:spPr>
+          <a:xfrm>
+            <a:off x="2149642" y="4411578"/>
+            <a:ext cx="1402092" cy="0"/>
+          </a:xfrm>
+          <a:prstGeom prst="line">
+            <a:avLst/>
+          </a:prstGeom>
+        </p:spPr>
+        <p:style>
+          <a:lnRef idx="1">
+            <a:schemeClr val="accent2"/>
+          </a:lnRef>
+          <a:fillRef idx="0">
+            <a:schemeClr val="accent2"/>
+          </a:fillRef>
+          <a:effectRef idx="0">
+            <a:schemeClr val="accent2"/>
+          </a:effectRef>
+          <a:fontRef idx="minor">
+            <a:schemeClr val="tx1"/>
+          </a:fontRef>
+        </p:style>
+      </p:cxnSp>
+      <p:cxnSp>
+        <p:nvCxnSpPr>
+          <p:cNvPr id="10" name="Straight Connector 9">
+            <a:extLst>
+              <a:ext uri="{FF2B5EF4-FFF2-40B4-BE49-F238E27FC236}">
+                <a16:creationId xmlns:a16="http://schemas.microsoft.com/office/drawing/2014/main" id="{98A6CDC9-7A5D-97E9-900C-4E4D356F5210}"/>
+              </a:ext>
+            </a:extLst>
+          </p:cNvPr>
+          <p:cNvCxnSpPr>
+            <a:cxnSpLocks/>
+          </p:cNvCxnSpPr>
+          <p:nvPr/>
+        </p:nvCxnSpPr>
+        <p:spPr>
+          <a:xfrm>
+            <a:off x="2149642" y="5261811"/>
+            <a:ext cx="1386050" cy="0"/>
+          </a:xfrm>
+          <a:prstGeom prst="line">
+            <a:avLst/>
+          </a:prstGeom>
+        </p:spPr>
+        <p:style>
+          <a:lnRef idx="1">
+            <a:schemeClr val="accent2"/>
+          </a:lnRef>
+          <a:fillRef idx="0">
+            <a:schemeClr val="accent2"/>
+          </a:fillRef>
+          <a:effectRef idx="0">
+            <a:schemeClr val="accent2"/>
+          </a:effectRef>
+          <a:fontRef idx="minor">
+            <a:schemeClr val="tx1"/>
+          </a:fontRef>
+        </p:style>
+      </p:cxnSp>
     </p:spTree>
     <p:extLst>
       <p:ext uri="{BB962C8B-B14F-4D97-AF65-F5344CB8AC3E}">
@@ -12901,6 +13604,229 @@
   <p:clrMapOvr>
     <a:masterClrMapping/>
   </p:clrMapOvr>
+  <p:timing>
+    <p:tnLst>
+      <p:par>
+        <p:cTn id="1" dur="indefinite" restart="never" nodeType="tmRoot">
+          <p:childTnLst>
+            <p:seq concurrent="1" nextAc="seek">
+              <p:cTn id="2" dur="indefinite" nodeType="mainSeq">
+                <p:childTnLst>
+                  <p:par>
+                    <p:cTn id="3" fill="hold">
+                      <p:stCondLst>
+                        <p:cond delay="indefinite"/>
+                      </p:stCondLst>
+                      <p:childTnLst>
+                        <p:par>
+                          <p:cTn id="4" fill="hold">
+                            <p:stCondLst>
+                              <p:cond delay="0"/>
+                            </p:stCondLst>
+                            <p:childTnLst>
+                              <p:par>
+                                <p:cTn id="5" presetID="10" presetClass="entr" presetSubtype="0" fill="hold" nodeType="clickEffect">
+                                  <p:stCondLst>
+                                    <p:cond delay="0"/>
+                                  </p:stCondLst>
+                                  <p:childTnLst>
+                                    <p:set>
+                                      <p:cBhvr>
+                                        <p:cTn id="6" dur="1" fill="hold">
+                                          <p:stCondLst>
+                                            <p:cond delay="0"/>
+                                          </p:stCondLst>
+                                        </p:cTn>
+                                        <p:tgtEl>
+                                          <p:spTgt spid="5"/>
+                                        </p:tgtEl>
+                                        <p:attrNameLst>
+                                          <p:attrName>style.visibility</p:attrName>
+                                        </p:attrNameLst>
+                                      </p:cBhvr>
+                                      <p:to>
+                                        <p:strVal val="visible"/>
+                                      </p:to>
+                                    </p:set>
+                                    <p:animEffect transition="in" filter="fade">
+                                      <p:cBhvr>
+                                        <p:cTn id="7" dur="500"/>
+                                        <p:tgtEl>
+                                          <p:spTgt spid="5"/>
+                                        </p:tgtEl>
+                                      </p:cBhvr>
+                                    </p:animEffect>
+                                  </p:childTnLst>
+                                </p:cTn>
+                              </p:par>
+                              <p:par>
+                                <p:cTn id="8" presetID="10" presetClass="entr" presetSubtype="0" fill="hold" nodeType="withEffect">
+                                  <p:stCondLst>
+                                    <p:cond delay="0"/>
+                                  </p:stCondLst>
+                                  <p:childTnLst>
+                                    <p:set>
+                                      <p:cBhvr>
+                                        <p:cTn id="9" dur="1" fill="hold">
+                                          <p:stCondLst>
+                                            <p:cond delay="0"/>
+                                          </p:stCondLst>
+                                        </p:cTn>
+                                        <p:tgtEl>
+                                          <p:spTgt spid="10"/>
+                                        </p:tgtEl>
+                                        <p:attrNameLst>
+                                          <p:attrName>style.visibility</p:attrName>
+                                        </p:attrNameLst>
+                                      </p:cBhvr>
+                                      <p:to>
+                                        <p:strVal val="visible"/>
+                                      </p:to>
+                                    </p:set>
+                                    <p:animEffect transition="in" filter="fade">
+                                      <p:cBhvr>
+                                        <p:cTn id="10" dur="500"/>
+                                        <p:tgtEl>
+                                          <p:spTgt spid="10"/>
+                                        </p:tgtEl>
+                                      </p:cBhvr>
+                                    </p:animEffect>
+                                  </p:childTnLst>
+                                </p:cTn>
+                              </p:par>
+                              <p:par>
+                                <p:cTn id="11" presetID="10" presetClass="entr" presetSubtype="0" fill="hold" nodeType="withEffect">
+                                  <p:stCondLst>
+                                    <p:cond delay="0"/>
+                                  </p:stCondLst>
+                                  <p:childTnLst>
+                                    <p:set>
+                                      <p:cBhvr>
+                                        <p:cTn id="12" dur="1" fill="hold">
+                                          <p:stCondLst>
+                                            <p:cond delay="0"/>
+                                          </p:stCondLst>
+                                        </p:cTn>
+                                        <p:tgtEl>
+                                          <p:spTgt spid="9"/>
+                                        </p:tgtEl>
+                                        <p:attrNameLst>
+                                          <p:attrName>style.visibility</p:attrName>
+                                        </p:attrNameLst>
+                                      </p:cBhvr>
+                                      <p:to>
+                                        <p:strVal val="visible"/>
+                                      </p:to>
+                                    </p:set>
+                                    <p:animEffect transition="in" filter="fade">
+                                      <p:cBhvr>
+                                        <p:cTn id="13" dur="500"/>
+                                        <p:tgtEl>
+                                          <p:spTgt spid="9"/>
+                                        </p:tgtEl>
+                                      </p:cBhvr>
+                                    </p:animEffect>
+                                  </p:childTnLst>
+                                </p:cTn>
+                              </p:par>
+                              <p:par>
+                                <p:cTn id="14" presetID="10" presetClass="entr" presetSubtype="0" fill="hold" nodeType="withEffect">
+                                  <p:stCondLst>
+                                    <p:cond delay="0"/>
+                                  </p:stCondLst>
+                                  <p:childTnLst>
+                                    <p:set>
+                                      <p:cBhvr>
+                                        <p:cTn id="15" dur="1" fill="hold">
+                                          <p:stCondLst>
+                                            <p:cond delay="0"/>
+                                          </p:stCondLst>
+                                        </p:cTn>
+                                        <p:tgtEl>
+                                          <p:spTgt spid="8"/>
+                                        </p:tgtEl>
+                                        <p:attrNameLst>
+                                          <p:attrName>style.visibility</p:attrName>
+                                        </p:attrNameLst>
+                                      </p:cBhvr>
+                                      <p:to>
+                                        <p:strVal val="visible"/>
+                                      </p:to>
+                                    </p:set>
+                                    <p:animEffect transition="in" filter="fade">
+                                      <p:cBhvr>
+                                        <p:cTn id="16" dur="500"/>
+                                        <p:tgtEl>
+                                          <p:spTgt spid="8"/>
+                                        </p:tgtEl>
+                                      </p:cBhvr>
+                                    </p:animEffect>
+                                  </p:childTnLst>
+                                </p:cTn>
+                              </p:par>
+                              <p:par>
+                                <p:cTn id="17" presetID="10" presetClass="entr" presetSubtype="0" fill="hold" nodeType="withEffect">
+                                  <p:stCondLst>
+                                    <p:cond delay="0"/>
+                                  </p:stCondLst>
+                                  <p:childTnLst>
+                                    <p:set>
+                                      <p:cBhvr>
+                                        <p:cTn id="18" dur="1" fill="hold">
+                                          <p:stCondLst>
+                                            <p:cond delay="0"/>
+                                          </p:stCondLst>
+                                        </p:cTn>
+                                        <p:tgtEl>
+                                          <p:spTgt spid="7"/>
+                                        </p:tgtEl>
+                                        <p:attrNameLst>
+                                          <p:attrName>style.visibility</p:attrName>
+                                        </p:attrNameLst>
+                                      </p:cBhvr>
+                                      <p:to>
+                                        <p:strVal val="visible"/>
+                                      </p:to>
+                                    </p:set>
+                                    <p:animEffect transition="in" filter="fade">
+                                      <p:cBhvr>
+                                        <p:cTn id="19" dur="500"/>
+                                        <p:tgtEl>
+                                          <p:spTgt spid="7"/>
+                                        </p:tgtEl>
+                                      </p:cBhvr>
+                                    </p:animEffect>
+                                  </p:childTnLst>
+                                </p:cTn>
+                              </p:par>
+                            </p:childTnLst>
+                          </p:cTn>
+                        </p:par>
+                      </p:childTnLst>
+                    </p:cTn>
+                  </p:par>
+                </p:childTnLst>
+              </p:cTn>
+              <p:prevCondLst>
+                <p:cond evt="onPrev" delay="0">
+                  <p:tgtEl>
+                    <p:sldTgt/>
+                  </p:tgtEl>
+                </p:cond>
+              </p:prevCondLst>
+              <p:nextCondLst>
+                <p:cond evt="onNext" delay="0">
+                  <p:tgtEl>
+                    <p:sldTgt/>
+                  </p:tgtEl>
+                </p:cond>
+              </p:nextCondLst>
+            </p:seq>
+          </p:childTnLst>
+        </p:cTn>
+      </p:par>
+    </p:tnLst>
+  </p:timing>
 </p:sld>
 </file>
 

</xml_diff>